<commit_message>
livebook updates in relationship section.
</commit_message>
<xml_diff>
--- a/notebook/Manage_Relationship.pptx
+++ b/notebook/Manage_Relationship.pptx
@@ -104,6 +104,11 @@
       </a:defRPr>
     </a:lvl9pPr>
   </p:defaultTextStyle>
+  <p:extLst>
+    <p:ext uri="{EFAFB233-063F-42B5-8137-9DF3F51BA10A}">
+      <p15:sldGuideLst xmlns:p15="http://schemas.microsoft.com/office/powerpoint/2012/main"/>
+    </p:ext>
+  </p:extLst>
 </p:presentation>
 </file>
 
@@ -254,7 +259,7 @@
           <a:p>
             <a:fld id="{84D0F679-15B9-A74E-80E9-92AFB46C344A}" type="datetimeFigureOut">
               <a:rPr lang="en-US" smtClean="0"/>
-              <a:t>7/3/22</a:t>
+              <a:t>7/4/22</a:t>
             </a:fld>
             <a:endParaRPr lang="en-US"/>
           </a:p>
@@ -452,7 +457,7 @@
           <a:p>
             <a:fld id="{84D0F679-15B9-A74E-80E9-92AFB46C344A}" type="datetimeFigureOut">
               <a:rPr lang="en-US" smtClean="0"/>
-              <a:t>7/3/22</a:t>
+              <a:t>7/4/22</a:t>
             </a:fld>
             <a:endParaRPr lang="en-US"/>
           </a:p>
@@ -660,7 +665,7 @@
           <a:p>
             <a:fld id="{84D0F679-15B9-A74E-80E9-92AFB46C344A}" type="datetimeFigureOut">
               <a:rPr lang="en-US" smtClean="0"/>
-              <a:t>7/3/22</a:t>
+              <a:t>7/4/22</a:t>
             </a:fld>
             <a:endParaRPr lang="en-US"/>
           </a:p>
@@ -858,7 +863,7 @@
           <a:p>
             <a:fld id="{84D0F679-15B9-A74E-80E9-92AFB46C344A}" type="datetimeFigureOut">
               <a:rPr lang="en-US" smtClean="0"/>
-              <a:t>7/3/22</a:t>
+              <a:t>7/4/22</a:t>
             </a:fld>
             <a:endParaRPr lang="en-US"/>
           </a:p>
@@ -1133,7 +1138,7 @@
           <a:p>
             <a:fld id="{84D0F679-15B9-A74E-80E9-92AFB46C344A}" type="datetimeFigureOut">
               <a:rPr lang="en-US" smtClean="0"/>
-              <a:t>7/3/22</a:t>
+              <a:t>7/4/22</a:t>
             </a:fld>
             <a:endParaRPr lang="en-US"/>
           </a:p>
@@ -1398,7 +1403,7 @@
           <a:p>
             <a:fld id="{84D0F679-15B9-A74E-80E9-92AFB46C344A}" type="datetimeFigureOut">
               <a:rPr lang="en-US" smtClean="0"/>
-              <a:t>7/3/22</a:t>
+              <a:t>7/4/22</a:t>
             </a:fld>
             <a:endParaRPr lang="en-US"/>
           </a:p>
@@ -1810,7 +1815,7 @@
           <a:p>
             <a:fld id="{84D0F679-15B9-A74E-80E9-92AFB46C344A}" type="datetimeFigureOut">
               <a:rPr lang="en-US" smtClean="0"/>
-              <a:t>7/3/22</a:t>
+              <a:t>7/4/22</a:t>
             </a:fld>
             <a:endParaRPr lang="en-US"/>
           </a:p>
@@ -1951,7 +1956,7 @@
           <a:p>
             <a:fld id="{84D0F679-15B9-A74E-80E9-92AFB46C344A}" type="datetimeFigureOut">
               <a:rPr lang="en-US" smtClean="0"/>
-              <a:t>7/3/22</a:t>
+              <a:t>7/4/22</a:t>
             </a:fld>
             <a:endParaRPr lang="en-US"/>
           </a:p>
@@ -2064,7 +2069,7 @@
           <a:p>
             <a:fld id="{84D0F679-15B9-A74E-80E9-92AFB46C344A}" type="datetimeFigureOut">
               <a:rPr lang="en-US" smtClean="0"/>
-              <a:t>7/3/22</a:t>
+              <a:t>7/4/22</a:t>
             </a:fld>
             <a:endParaRPr lang="en-US"/>
           </a:p>
@@ -2375,7 +2380,7 @@
           <a:p>
             <a:fld id="{84D0F679-15B9-A74E-80E9-92AFB46C344A}" type="datetimeFigureOut">
               <a:rPr lang="en-US" smtClean="0"/>
-              <a:t>7/3/22</a:t>
+              <a:t>7/4/22</a:t>
             </a:fld>
             <a:endParaRPr lang="en-US"/>
           </a:p>
@@ -2663,7 +2668,7 @@
           <a:p>
             <a:fld id="{84D0F679-15B9-A74E-80E9-92AFB46C344A}" type="datetimeFigureOut">
               <a:rPr lang="en-US" smtClean="0"/>
-              <a:t>7/3/22</a:t>
+              <a:t>7/4/22</a:t>
             </a:fld>
             <a:endParaRPr lang="en-US"/>
           </a:p>
@@ -2904,7 +2909,7 @@
           <a:p>
             <a:fld id="{84D0F679-15B9-A74E-80E9-92AFB46C344A}" type="datetimeFigureOut">
               <a:rPr lang="en-US" smtClean="0"/>
-              <a:t>7/3/22</a:t>
+              <a:t>7/4/22</a:t>
             </a:fld>
             <a:endParaRPr lang="en-US"/>
           </a:p>
@@ -3501,7 +3506,11 @@
             <a:pPr algn="ctr"/>
             <a:r>
               <a:rPr lang="en-US" sz="1100" dirty="0"/>
-              <a:t>%{} or [%{map}]</a:t>
+              <a:t>%{} or [map] or </a:t>
+            </a:r>
+            <a:r>
+              <a:rPr lang="en-US" sz="1100" dirty="0" err="1"/>
+              <a:t>Ash.Identity</a:t>
             </a:r>
             <a:endParaRPr lang="en-US" sz="1400" dirty="0"/>
           </a:p>

</xml_diff>

<commit_message>
updated powerpoint and livebook
</commit_message>
<xml_diff>
--- a/notebook/Manage_Relationship.pptx
+++ b/notebook/Manage_Relationship.pptx
@@ -6,6 +6,13 @@
   </p:sldMasterIdLst>
   <p:sldIdLst>
     <p:sldId id="256" r:id="rId2"/>
+    <p:sldId id="257" r:id="rId3"/>
+    <p:sldId id="263" r:id="rId4"/>
+    <p:sldId id="258" r:id="rId5"/>
+    <p:sldId id="259" r:id="rId6"/>
+    <p:sldId id="266" r:id="rId7"/>
+    <p:sldId id="265" r:id="rId8"/>
+    <p:sldId id="264" r:id="rId9"/>
   </p:sldIdLst>
   <p:sldSz cx="12192000" cy="6858000"/>
   <p:notesSz cx="6858000" cy="9144000"/>
@@ -3737,6 +3744,1061 @@
 </p:sld>
 </file>
 
+<file path=ppt/slides/slide2.xml><?xml version="1.0" encoding="utf-8"?>
+<p:sld xmlns:a="http://schemas.openxmlformats.org/drawingml/2006/main" xmlns:r="http://schemas.openxmlformats.org/officeDocument/2006/relationships" xmlns:p="http://schemas.openxmlformats.org/presentationml/2006/main">
+  <p:cSld>
+    <p:spTree>
+      <p:nvGrpSpPr>
+        <p:cNvPr id="1" name=""/>
+        <p:cNvGrpSpPr/>
+        <p:nvPr/>
+      </p:nvGrpSpPr>
+      <p:grpSpPr>
+        <a:xfrm>
+          <a:off x="0" y="0"/>
+          <a:ext cx="0" cy="0"/>
+          <a:chOff x="0" y="0"/>
+          <a:chExt cx="0" cy="0"/>
+        </a:xfrm>
+      </p:grpSpPr>
+      <p:sp>
+        <p:nvSpPr>
+          <p:cNvPr id="6" name="TextBox 5">
+            <a:extLst>
+              <a:ext uri="{FF2B5EF4-FFF2-40B4-BE49-F238E27FC236}">
+                <a16:creationId xmlns:a16="http://schemas.microsoft.com/office/drawing/2014/main" id="{9399A366-7517-3584-26FF-1EF0A7097BE9}"/>
+              </a:ext>
+            </a:extLst>
+          </p:cNvPr>
+          <p:cNvSpPr txBox="1"/>
+          <p:nvPr/>
+        </p:nvSpPr>
+        <p:spPr>
+          <a:xfrm>
+            <a:off x="158755" y="466672"/>
+            <a:ext cx="4891792" cy="246221"/>
+          </a:xfrm>
+          <a:prstGeom prst="rect">
+            <a:avLst/>
+          </a:prstGeom>
+          <a:noFill/>
+        </p:spPr>
+        <p:txBody>
+          <a:bodyPr wrap="square" rtlCol="0">
+            <a:spAutoFit/>
+          </a:bodyPr>
+          <a:lstStyle/>
+          <a:p>
+            <a:pPr algn="ctr"/>
+            <a:r>
+              <a:rPr lang="en-US" sz="1000" dirty="0" err="1">
+                <a:latin typeface="Courier New" panose="02070309020205020404" pitchFamily="49" charset="0"/>
+                <a:cs typeface="Courier New" panose="02070309020205020404" pitchFamily="49" charset="0"/>
+              </a:rPr>
+              <a:t>Form.for_update</a:t>
+            </a:r>
+            <a:r>
+              <a:rPr lang="en-US" sz="1000" dirty="0">
+                <a:latin typeface="Courier New" panose="02070309020205020404" pitchFamily="49" charset="0"/>
+                <a:cs typeface="Courier New" panose="02070309020205020404" pitchFamily="49" charset="0"/>
+              </a:rPr>
+              <a:t>(resource, action, </a:t>
+            </a:r>
+            <a:r>
+              <a:rPr lang="en-US" sz="1000" dirty="0" err="1">
+                <a:latin typeface="Courier New" panose="02070309020205020404" pitchFamily="49" charset="0"/>
+                <a:cs typeface="Courier New" panose="02070309020205020404" pitchFamily="49" charset="0"/>
+              </a:rPr>
+              <a:t>api</a:t>
+            </a:r>
+            <a:r>
+              <a:rPr lang="en-US" sz="1000" dirty="0">
+                <a:latin typeface="Courier New" panose="02070309020205020404" pitchFamily="49" charset="0"/>
+                <a:cs typeface="Courier New" panose="02070309020205020404" pitchFamily="49" charset="0"/>
+              </a:rPr>
+              <a:t>, form: [auto?: true[)</a:t>
+            </a:r>
+          </a:p>
+        </p:txBody>
+      </p:sp>
+      <p:sp>
+        <p:nvSpPr>
+          <p:cNvPr id="7" name="TextBox 6">
+            <a:extLst>
+              <a:ext uri="{FF2B5EF4-FFF2-40B4-BE49-F238E27FC236}">
+                <a16:creationId xmlns:a16="http://schemas.microsoft.com/office/drawing/2014/main" id="{4C6415AF-217F-E74C-5DA2-E232C6BF4E4E}"/>
+              </a:ext>
+            </a:extLst>
+          </p:cNvPr>
+          <p:cNvSpPr txBox="1"/>
+          <p:nvPr/>
+        </p:nvSpPr>
+        <p:spPr>
+          <a:xfrm>
+            <a:off x="9817688" y="151200"/>
+            <a:ext cx="2311150" cy="477054"/>
+          </a:xfrm>
+          <a:prstGeom prst="rect">
+            <a:avLst/>
+          </a:prstGeom>
+          <a:noFill/>
+        </p:spPr>
+        <p:txBody>
+          <a:bodyPr wrap="square" rtlCol="0">
+            <a:spAutoFit/>
+          </a:bodyPr>
+          <a:lstStyle/>
+          <a:p>
+            <a:pPr algn="ctr"/>
+            <a:r>
+              <a:rPr lang="en-US" sz="1400" b="1" dirty="0"/>
+              <a:t>Relationship Input Params</a:t>
+            </a:r>
+          </a:p>
+          <a:p>
+            <a:pPr algn="ctr"/>
+            <a:r>
+              <a:rPr lang="en-US" sz="1100" dirty="0"/>
+              <a:t>%{} or [map] or Ash.Identity</a:t>
+            </a:r>
+            <a:endParaRPr lang="en-US" sz="1400" dirty="0"/>
+          </a:p>
+        </p:txBody>
+      </p:sp>
+      <p:pic>
+        <p:nvPicPr>
+          <p:cNvPr id="2" name="Picture 1">
+            <a:extLst>
+              <a:ext uri="{FF2B5EF4-FFF2-40B4-BE49-F238E27FC236}">
+                <a16:creationId xmlns:a16="http://schemas.microsoft.com/office/drawing/2014/main" id="{4E7F7B9F-D6E0-EF06-FF02-7E4CEBB95123}"/>
+              </a:ext>
+            </a:extLst>
+          </p:cNvPr>
+          <p:cNvPicPr>
+            <a:picLocks noChangeAspect="1"/>
+          </p:cNvPicPr>
+          <p:nvPr/>
+        </p:nvPicPr>
+        <p:blipFill>
+          <a:blip r:embed="rId2"/>
+          <a:stretch>
+            <a:fillRect/>
+          </a:stretch>
+        </p:blipFill>
+        <p:spPr>
+          <a:xfrm>
+            <a:off x="158755" y="712893"/>
+            <a:ext cx="4990114" cy="5891107"/>
+          </a:xfrm>
+          <a:prstGeom prst="rect">
+            <a:avLst/>
+          </a:prstGeom>
+        </p:spPr>
+      </p:pic>
+      <p:pic>
+        <p:nvPicPr>
+          <p:cNvPr id="11" name="Picture 10">
+            <a:extLst>
+              <a:ext uri="{FF2B5EF4-FFF2-40B4-BE49-F238E27FC236}">
+                <a16:creationId xmlns:a16="http://schemas.microsoft.com/office/drawing/2014/main" id="{B5E811E4-C951-603C-3B4F-B2D24F68BB97}"/>
+              </a:ext>
+            </a:extLst>
+          </p:cNvPr>
+          <p:cNvPicPr>
+            <a:picLocks noChangeAspect="1"/>
+          </p:cNvPicPr>
+          <p:nvPr/>
+        </p:nvPicPr>
+        <p:blipFill>
+          <a:blip r:embed="rId3"/>
+          <a:stretch>
+            <a:fillRect/>
+          </a:stretch>
+        </p:blipFill>
+        <p:spPr>
+          <a:xfrm>
+            <a:off x="5317199" y="712893"/>
+            <a:ext cx="6279365" cy="2869223"/>
+          </a:xfrm>
+          <a:prstGeom prst="rect">
+            <a:avLst/>
+          </a:prstGeom>
+        </p:spPr>
+      </p:pic>
+    </p:spTree>
+    <p:extLst>
+      <p:ext uri="{BB962C8B-B14F-4D97-AF65-F5344CB8AC3E}">
+        <p14:creationId xmlns:p14="http://schemas.microsoft.com/office/powerpoint/2010/main" val="2394609192"/>
+      </p:ext>
+    </p:extLst>
+  </p:cSld>
+  <p:clrMapOvr>
+    <a:masterClrMapping/>
+  </p:clrMapOvr>
+</p:sld>
+</file>
+
+<file path=ppt/slides/slide3.xml><?xml version="1.0" encoding="utf-8"?>
+<p:sld xmlns:a="http://schemas.openxmlformats.org/drawingml/2006/main" xmlns:r="http://schemas.openxmlformats.org/officeDocument/2006/relationships" xmlns:p="http://schemas.openxmlformats.org/presentationml/2006/main">
+  <p:cSld>
+    <p:spTree>
+      <p:nvGrpSpPr>
+        <p:cNvPr id="1" name=""/>
+        <p:cNvGrpSpPr/>
+        <p:nvPr/>
+      </p:nvGrpSpPr>
+      <p:grpSpPr>
+        <a:xfrm>
+          <a:off x="0" y="0"/>
+          <a:ext cx="0" cy="0"/>
+          <a:chOff x="0" y="0"/>
+          <a:chExt cx="0" cy="0"/>
+        </a:xfrm>
+      </p:grpSpPr>
+      <p:sp>
+        <p:nvSpPr>
+          <p:cNvPr id="6" name="TextBox 5">
+            <a:extLst>
+              <a:ext uri="{FF2B5EF4-FFF2-40B4-BE49-F238E27FC236}">
+                <a16:creationId xmlns:a16="http://schemas.microsoft.com/office/drawing/2014/main" id="{9399A366-7517-3584-26FF-1EF0A7097BE9}"/>
+              </a:ext>
+            </a:extLst>
+          </p:cNvPr>
+          <p:cNvSpPr txBox="1"/>
+          <p:nvPr/>
+        </p:nvSpPr>
+        <p:spPr>
+          <a:xfrm>
+            <a:off x="6014127" y="1051114"/>
+            <a:ext cx="1449565" cy="246221"/>
+          </a:xfrm>
+          <a:prstGeom prst="rect">
+            <a:avLst/>
+          </a:prstGeom>
+          <a:noFill/>
+        </p:spPr>
+        <p:txBody>
+          <a:bodyPr wrap="square" rtlCol="0">
+            <a:spAutoFit/>
+          </a:bodyPr>
+          <a:lstStyle/>
+          <a:p>
+            <a:pPr algn="ctr"/>
+            <a:r>
+              <a:rPr lang="en-US" sz="1000" dirty="0">
+                <a:latin typeface="Courier New" panose="02070309020205020404" pitchFamily="49" charset="0"/>
+                <a:cs typeface="Courier New" panose="02070309020205020404" pitchFamily="49" charset="0"/>
+              </a:rPr>
+              <a:t>Event handlers</a:t>
+            </a:r>
+          </a:p>
+        </p:txBody>
+      </p:sp>
+      <p:sp>
+        <p:nvSpPr>
+          <p:cNvPr id="7" name="TextBox 6">
+            <a:extLst>
+              <a:ext uri="{FF2B5EF4-FFF2-40B4-BE49-F238E27FC236}">
+                <a16:creationId xmlns:a16="http://schemas.microsoft.com/office/drawing/2014/main" id="{4C6415AF-217F-E74C-5DA2-E232C6BF4E4E}"/>
+              </a:ext>
+            </a:extLst>
+          </p:cNvPr>
+          <p:cNvSpPr txBox="1"/>
+          <p:nvPr/>
+        </p:nvSpPr>
+        <p:spPr>
+          <a:xfrm>
+            <a:off x="9817688" y="151200"/>
+            <a:ext cx="2311150" cy="477054"/>
+          </a:xfrm>
+          <a:prstGeom prst="rect">
+            <a:avLst/>
+          </a:prstGeom>
+          <a:noFill/>
+        </p:spPr>
+        <p:txBody>
+          <a:bodyPr wrap="square" rtlCol="0">
+            <a:spAutoFit/>
+          </a:bodyPr>
+          <a:lstStyle/>
+          <a:p>
+            <a:pPr algn="ctr"/>
+            <a:r>
+              <a:rPr lang="en-US" sz="1400" b="1" dirty="0"/>
+              <a:t>Relationship Input Params</a:t>
+            </a:r>
+          </a:p>
+          <a:p>
+            <a:pPr algn="ctr"/>
+            <a:r>
+              <a:rPr lang="en-US" sz="1100" dirty="0"/>
+              <a:t>%{} or [map] or Ash.Identity</a:t>
+            </a:r>
+            <a:endParaRPr lang="en-US" sz="1400" dirty="0"/>
+          </a:p>
+        </p:txBody>
+      </p:sp>
+      <p:pic>
+        <p:nvPicPr>
+          <p:cNvPr id="3" name="Picture 2">
+            <a:extLst>
+              <a:ext uri="{FF2B5EF4-FFF2-40B4-BE49-F238E27FC236}">
+                <a16:creationId xmlns:a16="http://schemas.microsoft.com/office/drawing/2014/main" id="{43EF9DD1-8AB6-F7B1-2362-CEE69DF1E162}"/>
+              </a:ext>
+            </a:extLst>
+          </p:cNvPr>
+          <p:cNvPicPr>
+            <a:picLocks noChangeAspect="1"/>
+          </p:cNvPicPr>
+          <p:nvPr/>
+        </p:nvPicPr>
+        <p:blipFill>
+          <a:blip r:embed="rId2"/>
+          <a:stretch>
+            <a:fillRect/>
+          </a:stretch>
+        </p:blipFill>
+        <p:spPr>
+          <a:xfrm>
+            <a:off x="0" y="712893"/>
+            <a:ext cx="5369715" cy="5983574"/>
+          </a:xfrm>
+          <a:prstGeom prst="rect">
+            <a:avLst/>
+          </a:prstGeom>
+        </p:spPr>
+      </p:pic>
+      <p:pic>
+        <p:nvPicPr>
+          <p:cNvPr id="4" name="Picture 3">
+            <a:extLst>
+              <a:ext uri="{FF2B5EF4-FFF2-40B4-BE49-F238E27FC236}">
+                <a16:creationId xmlns:a16="http://schemas.microsoft.com/office/drawing/2014/main" id="{AF4E6C0B-C1DB-F690-F00F-129C7496FBF5}"/>
+              </a:ext>
+            </a:extLst>
+          </p:cNvPr>
+          <p:cNvPicPr>
+            <a:picLocks noChangeAspect="1"/>
+          </p:cNvPicPr>
+          <p:nvPr/>
+        </p:nvPicPr>
+        <p:blipFill>
+          <a:blip r:embed="rId3"/>
+          <a:stretch>
+            <a:fillRect/>
+          </a:stretch>
+        </p:blipFill>
+        <p:spPr>
+          <a:xfrm>
+            <a:off x="6014128" y="1344246"/>
+            <a:ext cx="5420268" cy="2947865"/>
+          </a:xfrm>
+          <a:prstGeom prst="rect">
+            <a:avLst/>
+          </a:prstGeom>
+        </p:spPr>
+      </p:pic>
+      <p:sp>
+        <p:nvSpPr>
+          <p:cNvPr id="8" name="TextBox 7">
+            <a:extLst>
+              <a:ext uri="{FF2B5EF4-FFF2-40B4-BE49-F238E27FC236}">
+                <a16:creationId xmlns:a16="http://schemas.microsoft.com/office/drawing/2014/main" id="{7A43F4EB-76C9-7A3E-A045-0D0A3E58F4D8}"/>
+              </a:ext>
+            </a:extLst>
+          </p:cNvPr>
+          <p:cNvSpPr txBox="1"/>
+          <p:nvPr/>
+        </p:nvSpPr>
+        <p:spPr>
+          <a:xfrm>
+            <a:off x="311155" y="619072"/>
+            <a:ext cx="4891792" cy="246221"/>
+          </a:xfrm>
+          <a:prstGeom prst="rect">
+            <a:avLst/>
+          </a:prstGeom>
+          <a:noFill/>
+        </p:spPr>
+        <p:txBody>
+          <a:bodyPr wrap="square" rtlCol="0">
+            <a:spAutoFit/>
+          </a:bodyPr>
+          <a:lstStyle/>
+          <a:p>
+            <a:pPr algn="ctr"/>
+            <a:r>
+              <a:rPr lang="en-US" sz="1000" dirty="0" err="1">
+                <a:latin typeface="Courier New" panose="02070309020205020404" pitchFamily="49" charset="0"/>
+                <a:cs typeface="Courier New" panose="02070309020205020404" pitchFamily="49" charset="0"/>
+              </a:rPr>
+              <a:t>Form.add_form</a:t>
+            </a:r>
+            <a:r>
+              <a:rPr lang="en-US" sz="1000" dirty="0">
+                <a:latin typeface="Courier New" panose="02070309020205020404" pitchFamily="49" charset="0"/>
+                <a:cs typeface="Courier New" panose="02070309020205020404" pitchFamily="49" charset="0"/>
+              </a:rPr>
+              <a:t>() // for :new</a:t>
+            </a:r>
+          </a:p>
+        </p:txBody>
+      </p:sp>
+      <p:sp>
+        <p:nvSpPr>
+          <p:cNvPr id="9" name="TextBox 8">
+            <a:extLst>
+              <a:ext uri="{FF2B5EF4-FFF2-40B4-BE49-F238E27FC236}">
+                <a16:creationId xmlns:a16="http://schemas.microsoft.com/office/drawing/2014/main" id="{19741378-0132-B47D-F466-17F170E2C59E}"/>
+              </a:ext>
+            </a:extLst>
+          </p:cNvPr>
+          <p:cNvSpPr txBox="1"/>
+          <p:nvPr/>
+        </p:nvSpPr>
+        <p:spPr>
+          <a:xfrm>
+            <a:off x="191279" y="389727"/>
+            <a:ext cx="5904721" cy="246221"/>
+          </a:xfrm>
+          <a:prstGeom prst="rect">
+            <a:avLst/>
+          </a:prstGeom>
+          <a:noFill/>
+        </p:spPr>
+        <p:txBody>
+          <a:bodyPr wrap="square" rtlCol="0">
+            <a:spAutoFit/>
+          </a:bodyPr>
+          <a:lstStyle/>
+          <a:p>
+            <a:r>
+              <a:rPr lang="en-US" sz="1000" dirty="0">
+                <a:latin typeface="Courier New" panose="02070309020205020404" pitchFamily="49" charset="0"/>
+                <a:cs typeface="Courier New" panose="02070309020205020404" pitchFamily="49" charset="0"/>
+              </a:rPr>
+              <a:t>One HTML form with </a:t>
+            </a:r>
+            <a:r>
+              <a:rPr lang="en-US" sz="1000" dirty="0" err="1">
+                <a:latin typeface="Courier New" panose="02070309020205020404" pitchFamily="49" charset="0"/>
+                <a:cs typeface="Courier New" panose="02070309020205020404" pitchFamily="49" charset="0"/>
+              </a:rPr>
+              <a:t>phx</a:t>
+            </a:r>
+            <a:r>
+              <a:rPr lang="en-US" sz="1000" dirty="0">
+                <a:latin typeface="Courier New" panose="02070309020205020404" pitchFamily="49" charset="0"/>
+                <a:cs typeface="Courier New" panose="02070309020205020404" pitchFamily="49" charset="0"/>
+              </a:rPr>
+              <a:t>-click for each line item and one save</a:t>
+            </a:r>
+          </a:p>
+        </p:txBody>
+      </p:sp>
+    </p:spTree>
+    <p:extLst>
+      <p:ext uri="{BB962C8B-B14F-4D97-AF65-F5344CB8AC3E}">
+        <p14:creationId xmlns:p14="http://schemas.microsoft.com/office/powerpoint/2010/main" val="1386563943"/>
+      </p:ext>
+    </p:extLst>
+  </p:cSld>
+  <p:clrMapOvr>
+    <a:masterClrMapping/>
+  </p:clrMapOvr>
+</p:sld>
+</file>
+
+<file path=ppt/slides/slide4.xml><?xml version="1.0" encoding="utf-8"?>
+<p:sld xmlns:a="http://schemas.openxmlformats.org/drawingml/2006/main" xmlns:r="http://schemas.openxmlformats.org/officeDocument/2006/relationships" xmlns:p="http://schemas.openxmlformats.org/presentationml/2006/main">
+  <p:cSld>
+    <p:spTree>
+      <p:nvGrpSpPr>
+        <p:cNvPr id="1" name=""/>
+        <p:cNvGrpSpPr/>
+        <p:nvPr/>
+      </p:nvGrpSpPr>
+      <p:grpSpPr>
+        <a:xfrm>
+          <a:off x="0" y="0"/>
+          <a:ext cx="0" cy="0"/>
+          <a:chOff x="0" y="0"/>
+          <a:chExt cx="0" cy="0"/>
+        </a:xfrm>
+      </p:grpSpPr>
+      <p:pic>
+        <p:nvPicPr>
+          <p:cNvPr id="2" name="Picture 1">
+            <a:extLst>
+              <a:ext uri="{FF2B5EF4-FFF2-40B4-BE49-F238E27FC236}">
+                <a16:creationId xmlns:a16="http://schemas.microsoft.com/office/drawing/2014/main" id="{1581E0DA-FD0B-2B86-06F5-D509AE539D6C}"/>
+              </a:ext>
+            </a:extLst>
+          </p:cNvPr>
+          <p:cNvPicPr>
+            <a:picLocks noChangeAspect="1"/>
+          </p:cNvPicPr>
+          <p:nvPr/>
+        </p:nvPicPr>
+        <p:blipFill>
+          <a:blip r:embed="rId2"/>
+          <a:stretch>
+            <a:fillRect/>
+          </a:stretch>
+        </p:blipFill>
+        <p:spPr>
+          <a:xfrm>
+            <a:off x="393738" y="1445847"/>
+            <a:ext cx="5738781" cy="4364892"/>
+          </a:xfrm>
+          <a:prstGeom prst="rect">
+            <a:avLst/>
+          </a:prstGeom>
+        </p:spPr>
+      </p:pic>
+      <p:sp>
+        <p:nvSpPr>
+          <p:cNvPr id="5" name="TextBox 4">
+            <a:extLst>
+              <a:ext uri="{FF2B5EF4-FFF2-40B4-BE49-F238E27FC236}">
+                <a16:creationId xmlns:a16="http://schemas.microsoft.com/office/drawing/2014/main" id="{5D2E1B6D-0C2C-A282-648B-B22B199C7735}"/>
+              </a:ext>
+            </a:extLst>
+          </p:cNvPr>
+          <p:cNvSpPr txBox="1"/>
+          <p:nvPr/>
+        </p:nvSpPr>
+        <p:spPr>
+          <a:xfrm>
+            <a:off x="496466" y="1199626"/>
+            <a:ext cx="4356888" cy="246221"/>
+          </a:xfrm>
+          <a:prstGeom prst="rect">
+            <a:avLst/>
+          </a:prstGeom>
+          <a:noFill/>
+        </p:spPr>
+        <p:txBody>
+          <a:bodyPr wrap="square" rtlCol="0">
+            <a:spAutoFit/>
+          </a:bodyPr>
+          <a:lstStyle/>
+          <a:p>
+            <a:pPr algn="ctr"/>
+            <a:r>
+              <a:rPr lang="en-US" sz="1000" dirty="0">
+                <a:latin typeface="Courier New" panose="02070309020205020404" pitchFamily="49" charset="0"/>
+                <a:cs typeface="Courier New" panose="02070309020205020404" pitchFamily="49" charset="0"/>
+              </a:rPr>
+              <a:t>Submission body of parent with inline children:</a:t>
+            </a:r>
+          </a:p>
+        </p:txBody>
+      </p:sp>
+      <p:pic>
+        <p:nvPicPr>
+          <p:cNvPr id="3" name="Picture 2">
+            <a:extLst>
+              <a:ext uri="{FF2B5EF4-FFF2-40B4-BE49-F238E27FC236}">
+                <a16:creationId xmlns:a16="http://schemas.microsoft.com/office/drawing/2014/main" id="{1F7EEEB6-2BE7-1824-04C9-237B7116BC65}"/>
+              </a:ext>
+            </a:extLst>
+          </p:cNvPr>
+          <p:cNvPicPr>
+            <a:picLocks noChangeAspect="1"/>
+          </p:cNvPicPr>
+          <p:nvPr/>
+        </p:nvPicPr>
+        <p:blipFill>
+          <a:blip r:embed="rId3"/>
+          <a:stretch>
+            <a:fillRect/>
+          </a:stretch>
+        </p:blipFill>
+        <p:spPr>
+          <a:xfrm>
+            <a:off x="6550672" y="299147"/>
+            <a:ext cx="5464504" cy="1800958"/>
+          </a:xfrm>
+          <a:prstGeom prst="rect">
+            <a:avLst/>
+          </a:prstGeom>
+        </p:spPr>
+      </p:pic>
+    </p:spTree>
+    <p:extLst>
+      <p:ext uri="{BB962C8B-B14F-4D97-AF65-F5344CB8AC3E}">
+        <p14:creationId xmlns:p14="http://schemas.microsoft.com/office/powerpoint/2010/main" val="2590567907"/>
+      </p:ext>
+    </p:extLst>
+  </p:cSld>
+  <p:clrMapOvr>
+    <a:masterClrMapping/>
+  </p:clrMapOvr>
+</p:sld>
+</file>
+
+<file path=ppt/slides/slide5.xml><?xml version="1.0" encoding="utf-8"?>
+<p:sld xmlns:a="http://schemas.openxmlformats.org/drawingml/2006/main" xmlns:r="http://schemas.openxmlformats.org/officeDocument/2006/relationships" xmlns:p="http://schemas.openxmlformats.org/presentationml/2006/main">
+  <p:cSld>
+    <p:spTree>
+      <p:nvGrpSpPr>
+        <p:cNvPr id="1" name=""/>
+        <p:cNvGrpSpPr/>
+        <p:nvPr/>
+      </p:nvGrpSpPr>
+      <p:grpSpPr>
+        <a:xfrm>
+          <a:off x="0" y="0"/>
+          <a:ext cx="0" cy="0"/>
+          <a:chOff x="0" y="0"/>
+          <a:chExt cx="0" cy="0"/>
+        </a:xfrm>
+      </p:grpSpPr>
+      <p:sp>
+        <p:nvSpPr>
+          <p:cNvPr id="4" name="TextBox 3">
+            <a:extLst>
+              <a:ext uri="{FF2B5EF4-FFF2-40B4-BE49-F238E27FC236}">
+                <a16:creationId xmlns:a16="http://schemas.microsoft.com/office/drawing/2014/main" id="{0E0CD6D6-5D5E-C395-EA03-F1F7724A3FC5}"/>
+              </a:ext>
+            </a:extLst>
+          </p:cNvPr>
+          <p:cNvSpPr txBox="1"/>
+          <p:nvPr/>
+        </p:nvSpPr>
+        <p:spPr>
+          <a:xfrm>
+            <a:off x="355211" y="121103"/>
+            <a:ext cx="1050980" cy="246221"/>
+          </a:xfrm>
+          <a:prstGeom prst="rect">
+            <a:avLst/>
+          </a:prstGeom>
+          <a:noFill/>
+        </p:spPr>
+        <p:txBody>
+          <a:bodyPr wrap="square" rtlCol="0">
+            <a:spAutoFit/>
+          </a:bodyPr>
+          <a:lstStyle/>
+          <a:p>
+            <a:pPr algn="ctr"/>
+            <a:r>
+              <a:rPr lang="en-US" sz="1000" dirty="0">
+                <a:latin typeface="Courier New" panose="02070309020205020404" pitchFamily="49" charset="0"/>
+                <a:cs typeface="Courier New" panose="02070309020205020404" pitchFamily="49" charset="0"/>
+              </a:rPr>
+              <a:t>Saving…</a:t>
+            </a:r>
+          </a:p>
+        </p:txBody>
+      </p:sp>
+      <p:pic>
+        <p:nvPicPr>
+          <p:cNvPr id="2" name="Picture 1">
+            <a:extLst>
+              <a:ext uri="{FF2B5EF4-FFF2-40B4-BE49-F238E27FC236}">
+                <a16:creationId xmlns:a16="http://schemas.microsoft.com/office/drawing/2014/main" id="{A8DEDBA3-5C1E-401A-74B5-DC5D08689316}"/>
+              </a:ext>
+            </a:extLst>
+          </p:cNvPr>
+          <p:cNvPicPr>
+            <a:picLocks noChangeAspect="1"/>
+          </p:cNvPicPr>
+          <p:nvPr/>
+        </p:nvPicPr>
+        <p:blipFill>
+          <a:blip r:embed="rId2"/>
+          <a:stretch>
+            <a:fillRect/>
+          </a:stretch>
+        </p:blipFill>
+        <p:spPr>
+          <a:xfrm>
+            <a:off x="409920" y="367324"/>
+            <a:ext cx="5021774" cy="2255000"/>
+          </a:xfrm>
+          <a:prstGeom prst="rect">
+            <a:avLst/>
+          </a:prstGeom>
+        </p:spPr>
+      </p:pic>
+      <p:pic>
+        <p:nvPicPr>
+          <p:cNvPr id="3" name="Picture 2">
+            <a:extLst>
+              <a:ext uri="{FF2B5EF4-FFF2-40B4-BE49-F238E27FC236}">
+                <a16:creationId xmlns:a16="http://schemas.microsoft.com/office/drawing/2014/main" id="{082F5D0C-E701-6AEE-3000-4435334A5570}"/>
+              </a:ext>
+            </a:extLst>
+          </p:cNvPr>
+          <p:cNvPicPr>
+            <a:picLocks noChangeAspect="1"/>
+          </p:cNvPicPr>
+          <p:nvPr/>
+        </p:nvPicPr>
+        <p:blipFill>
+          <a:blip r:embed="rId3"/>
+          <a:stretch>
+            <a:fillRect/>
+          </a:stretch>
+        </p:blipFill>
+        <p:spPr>
+          <a:xfrm>
+            <a:off x="469900" y="2743200"/>
+            <a:ext cx="6861098" cy="3810000"/>
+          </a:xfrm>
+          <a:prstGeom prst="rect">
+            <a:avLst/>
+          </a:prstGeom>
+        </p:spPr>
+      </p:pic>
+    </p:spTree>
+    <p:extLst>
+      <p:ext uri="{BB962C8B-B14F-4D97-AF65-F5344CB8AC3E}">
+        <p14:creationId xmlns:p14="http://schemas.microsoft.com/office/powerpoint/2010/main" val="3137771160"/>
+      </p:ext>
+    </p:extLst>
+  </p:cSld>
+  <p:clrMapOvr>
+    <a:masterClrMapping/>
+  </p:clrMapOvr>
+</p:sld>
+</file>
+
+<file path=ppt/slides/slide6.xml><?xml version="1.0" encoding="utf-8"?>
+<p:sld xmlns:a="http://schemas.openxmlformats.org/drawingml/2006/main" xmlns:r="http://schemas.openxmlformats.org/officeDocument/2006/relationships" xmlns:p="http://schemas.openxmlformats.org/presentationml/2006/main">
+  <p:cSld>
+    <p:spTree>
+      <p:nvGrpSpPr>
+        <p:cNvPr id="1" name=""/>
+        <p:cNvGrpSpPr/>
+        <p:nvPr/>
+      </p:nvGrpSpPr>
+      <p:grpSpPr>
+        <a:xfrm>
+          <a:off x="0" y="0"/>
+          <a:ext cx="0" cy="0"/>
+          <a:chOff x="0" y="0"/>
+          <a:chExt cx="0" cy="0"/>
+        </a:xfrm>
+      </p:grpSpPr>
+      <p:sp>
+        <p:nvSpPr>
+          <p:cNvPr id="4" name="TextBox 3">
+            <a:extLst>
+              <a:ext uri="{FF2B5EF4-FFF2-40B4-BE49-F238E27FC236}">
+                <a16:creationId xmlns:a16="http://schemas.microsoft.com/office/drawing/2014/main" id="{0E0CD6D6-5D5E-C395-EA03-F1F7724A3FC5}"/>
+              </a:ext>
+            </a:extLst>
+          </p:cNvPr>
+          <p:cNvSpPr txBox="1"/>
+          <p:nvPr/>
+        </p:nvSpPr>
+        <p:spPr>
+          <a:xfrm>
+            <a:off x="82251" y="183626"/>
+            <a:ext cx="3848887" cy="246221"/>
+          </a:xfrm>
+          <a:prstGeom prst="rect">
+            <a:avLst/>
+          </a:prstGeom>
+          <a:noFill/>
+        </p:spPr>
+        <p:txBody>
+          <a:bodyPr wrap="square" rtlCol="0">
+            <a:spAutoFit/>
+          </a:bodyPr>
+          <a:lstStyle/>
+          <a:p>
+            <a:pPr algn="ctr"/>
+            <a:r>
+              <a:rPr lang="en-US" sz="1000" dirty="0">
+                <a:latin typeface="Courier New" panose="02070309020205020404" pitchFamily="49" charset="0"/>
+                <a:cs typeface="Courier New" panose="02070309020205020404" pitchFamily="49" charset="0"/>
+              </a:rPr>
+              <a:t>Submission body of parent with inline children:</a:t>
+            </a:r>
+          </a:p>
+        </p:txBody>
+      </p:sp>
+      <p:pic>
+        <p:nvPicPr>
+          <p:cNvPr id="2" name="Picture 1">
+            <a:extLst>
+              <a:ext uri="{FF2B5EF4-FFF2-40B4-BE49-F238E27FC236}">
+                <a16:creationId xmlns:a16="http://schemas.microsoft.com/office/drawing/2014/main" id="{EFAD0CD4-E82B-38C6-73E9-4DAFEF6A7A97}"/>
+              </a:ext>
+            </a:extLst>
+          </p:cNvPr>
+          <p:cNvPicPr>
+            <a:picLocks noChangeAspect="1"/>
+          </p:cNvPicPr>
+          <p:nvPr/>
+        </p:nvPicPr>
+        <p:blipFill>
+          <a:blip r:embed="rId2"/>
+          <a:stretch>
+            <a:fillRect/>
+          </a:stretch>
+        </p:blipFill>
+        <p:spPr>
+          <a:xfrm>
+            <a:off x="169043" y="519764"/>
+            <a:ext cx="6518439" cy="3451793"/>
+          </a:xfrm>
+          <a:prstGeom prst="rect">
+            <a:avLst/>
+          </a:prstGeom>
+        </p:spPr>
+      </p:pic>
+    </p:spTree>
+    <p:extLst>
+      <p:ext uri="{BB962C8B-B14F-4D97-AF65-F5344CB8AC3E}">
+        <p14:creationId xmlns:p14="http://schemas.microsoft.com/office/powerpoint/2010/main" val="1261168459"/>
+      </p:ext>
+    </p:extLst>
+  </p:cSld>
+  <p:clrMapOvr>
+    <a:masterClrMapping/>
+  </p:clrMapOvr>
+</p:sld>
+</file>
+
+<file path=ppt/slides/slide7.xml><?xml version="1.0" encoding="utf-8"?>
+<p:sld xmlns:a="http://schemas.openxmlformats.org/drawingml/2006/main" xmlns:r="http://schemas.openxmlformats.org/officeDocument/2006/relationships" xmlns:p="http://schemas.openxmlformats.org/presentationml/2006/main">
+  <p:cSld>
+    <p:spTree>
+      <p:nvGrpSpPr>
+        <p:cNvPr id="1" name=""/>
+        <p:cNvGrpSpPr/>
+        <p:nvPr/>
+      </p:nvGrpSpPr>
+      <p:grpSpPr>
+        <a:xfrm>
+          <a:off x="0" y="0"/>
+          <a:ext cx="0" cy="0"/>
+          <a:chOff x="0" y="0"/>
+          <a:chExt cx="0" cy="0"/>
+        </a:xfrm>
+      </p:grpSpPr>
+      <p:sp>
+        <p:nvSpPr>
+          <p:cNvPr id="4" name="TextBox 3">
+            <a:extLst>
+              <a:ext uri="{FF2B5EF4-FFF2-40B4-BE49-F238E27FC236}">
+                <a16:creationId xmlns:a16="http://schemas.microsoft.com/office/drawing/2014/main" id="{0E0CD6D6-5D5E-C395-EA03-F1F7724A3FC5}"/>
+              </a:ext>
+            </a:extLst>
+          </p:cNvPr>
+          <p:cNvSpPr txBox="1"/>
+          <p:nvPr/>
+        </p:nvSpPr>
+        <p:spPr>
+          <a:xfrm>
+            <a:off x="308897" y="113288"/>
+            <a:ext cx="4356888" cy="246221"/>
+          </a:xfrm>
+          <a:prstGeom prst="rect">
+            <a:avLst/>
+          </a:prstGeom>
+          <a:noFill/>
+        </p:spPr>
+        <p:txBody>
+          <a:bodyPr wrap="square" rtlCol="0">
+            <a:spAutoFit/>
+          </a:bodyPr>
+          <a:lstStyle/>
+          <a:p>
+            <a:r>
+              <a:rPr lang="en-US" sz="1000" dirty="0">
+                <a:latin typeface="Courier New" panose="02070309020205020404" pitchFamily="49" charset="0"/>
+                <a:cs typeface="Courier New" panose="02070309020205020404" pitchFamily="49" charset="0"/>
+              </a:rPr>
+              <a:t>Pagination </a:t>
+            </a:r>
+          </a:p>
+        </p:txBody>
+      </p:sp>
+      <p:pic>
+        <p:nvPicPr>
+          <p:cNvPr id="2" name="Picture 1">
+            <a:extLst>
+              <a:ext uri="{FF2B5EF4-FFF2-40B4-BE49-F238E27FC236}">
+                <a16:creationId xmlns:a16="http://schemas.microsoft.com/office/drawing/2014/main" id="{E30FF01F-5649-C510-5F70-7ED65F834A8F}"/>
+              </a:ext>
+            </a:extLst>
+          </p:cNvPr>
+          <p:cNvPicPr>
+            <a:picLocks noChangeAspect="1"/>
+          </p:cNvPicPr>
+          <p:nvPr/>
+        </p:nvPicPr>
+        <p:blipFill>
+          <a:blip r:embed="rId2"/>
+          <a:stretch>
+            <a:fillRect/>
+          </a:stretch>
+        </p:blipFill>
+        <p:spPr>
+          <a:xfrm>
+            <a:off x="193159" y="519763"/>
+            <a:ext cx="3709454" cy="3816417"/>
+          </a:xfrm>
+          <a:prstGeom prst="rect">
+            <a:avLst/>
+          </a:prstGeom>
+        </p:spPr>
+      </p:pic>
+    </p:spTree>
+    <p:extLst>
+      <p:ext uri="{BB962C8B-B14F-4D97-AF65-F5344CB8AC3E}">
+        <p14:creationId xmlns:p14="http://schemas.microsoft.com/office/powerpoint/2010/main" val="2585135265"/>
+      </p:ext>
+    </p:extLst>
+  </p:cSld>
+  <p:clrMapOvr>
+    <a:masterClrMapping/>
+  </p:clrMapOvr>
+</p:sld>
+</file>
+
+<file path=ppt/slides/slide8.xml><?xml version="1.0" encoding="utf-8"?>
+<p:sld xmlns:a="http://schemas.openxmlformats.org/drawingml/2006/main" xmlns:r="http://schemas.openxmlformats.org/officeDocument/2006/relationships" xmlns:p="http://schemas.openxmlformats.org/presentationml/2006/main">
+  <p:cSld>
+    <p:spTree>
+      <p:nvGrpSpPr>
+        <p:cNvPr id="1" name=""/>
+        <p:cNvGrpSpPr/>
+        <p:nvPr/>
+      </p:nvGrpSpPr>
+      <p:grpSpPr>
+        <a:xfrm>
+          <a:off x="0" y="0"/>
+          <a:ext cx="0" cy="0"/>
+          <a:chOff x="0" y="0"/>
+          <a:chExt cx="0" cy="0"/>
+        </a:xfrm>
+      </p:grpSpPr>
+      <p:sp>
+        <p:nvSpPr>
+          <p:cNvPr id="4" name="TextBox 3">
+            <a:extLst>
+              <a:ext uri="{FF2B5EF4-FFF2-40B4-BE49-F238E27FC236}">
+                <a16:creationId xmlns:a16="http://schemas.microsoft.com/office/drawing/2014/main" id="{0E0CD6D6-5D5E-C395-EA03-F1F7724A3FC5}"/>
+              </a:ext>
+            </a:extLst>
+          </p:cNvPr>
+          <p:cNvSpPr txBox="1"/>
+          <p:nvPr/>
+        </p:nvSpPr>
+        <p:spPr>
+          <a:xfrm>
+            <a:off x="294335" y="198598"/>
+            <a:ext cx="4356888" cy="246221"/>
+          </a:xfrm>
+          <a:prstGeom prst="rect">
+            <a:avLst/>
+          </a:prstGeom>
+          <a:noFill/>
+        </p:spPr>
+        <p:txBody>
+          <a:bodyPr wrap="square" rtlCol="0">
+            <a:spAutoFit/>
+          </a:bodyPr>
+          <a:lstStyle/>
+          <a:p>
+            <a:r>
+              <a:rPr lang="en-US" sz="1000" dirty="0" err="1">
+                <a:latin typeface="Courier New" panose="02070309020205020404" pitchFamily="49" charset="0"/>
+                <a:cs typeface="Courier New" panose="02070309020205020404" pitchFamily="49" charset="0"/>
+              </a:rPr>
+              <a:t>AshPhoenix.FilterForm.new</a:t>
+            </a:r>
+            <a:r>
+              <a:rPr lang="en-US" sz="1000" dirty="0">
+                <a:latin typeface="Courier New" panose="02070309020205020404" pitchFamily="49" charset="0"/>
+                <a:cs typeface="Courier New" panose="02070309020205020404" pitchFamily="49" charset="0"/>
+              </a:rPr>
+              <a:t>(resource)</a:t>
+            </a:r>
+          </a:p>
+        </p:txBody>
+      </p:sp>
+      <p:pic>
+        <p:nvPicPr>
+          <p:cNvPr id="2" name="Picture 1">
+            <a:extLst>
+              <a:ext uri="{FF2B5EF4-FFF2-40B4-BE49-F238E27FC236}">
+                <a16:creationId xmlns:a16="http://schemas.microsoft.com/office/drawing/2014/main" id="{327CBF45-B090-9A7F-B26E-1080AF2F6D08}"/>
+              </a:ext>
+            </a:extLst>
+          </p:cNvPr>
+          <p:cNvPicPr>
+            <a:picLocks noChangeAspect="1"/>
+          </p:cNvPicPr>
+          <p:nvPr/>
+        </p:nvPicPr>
+        <p:blipFill>
+          <a:blip r:embed="rId2"/>
+          <a:stretch>
+            <a:fillRect/>
+          </a:stretch>
+        </p:blipFill>
+        <p:spPr>
+          <a:xfrm>
+            <a:off x="307168" y="519763"/>
+            <a:ext cx="5788831" cy="6272337"/>
+          </a:xfrm>
+          <a:prstGeom prst="rect">
+            <a:avLst/>
+          </a:prstGeom>
+        </p:spPr>
+      </p:pic>
+      <p:pic>
+        <p:nvPicPr>
+          <p:cNvPr id="3" name="Picture 2">
+            <a:extLst>
+              <a:ext uri="{FF2B5EF4-FFF2-40B4-BE49-F238E27FC236}">
+                <a16:creationId xmlns:a16="http://schemas.microsoft.com/office/drawing/2014/main" id="{18597963-739C-A7CE-4D1E-B5602FCD1638}"/>
+              </a:ext>
+            </a:extLst>
+          </p:cNvPr>
+          <p:cNvPicPr>
+            <a:picLocks noChangeAspect="1"/>
+          </p:cNvPicPr>
+          <p:nvPr/>
+        </p:nvPicPr>
+        <p:blipFill>
+          <a:blip r:embed="rId3"/>
+          <a:stretch>
+            <a:fillRect/>
+          </a:stretch>
+        </p:blipFill>
+        <p:spPr>
+          <a:xfrm>
+            <a:off x="6243989" y="519763"/>
+            <a:ext cx="5472745" cy="3213300"/>
+          </a:xfrm>
+          <a:prstGeom prst="rect">
+            <a:avLst/>
+          </a:prstGeom>
+        </p:spPr>
+      </p:pic>
+    </p:spTree>
+    <p:extLst>
+      <p:ext uri="{BB962C8B-B14F-4D97-AF65-F5344CB8AC3E}">
+        <p14:creationId xmlns:p14="http://schemas.microsoft.com/office/powerpoint/2010/main" val="4172971133"/>
+      </p:ext>
+    </p:extLst>
+  </p:cSld>
+  <p:clrMapOvr>
+    <a:masterClrMapping/>
+  </p:clrMapOvr>
+</p:sld>
+</file>
+
 <file path=ppt/theme/theme1.xml><?xml version="1.0" encoding="utf-8"?>
 <a:theme xmlns:a="http://schemas.openxmlformats.org/drawingml/2006/main" name="Office Theme">
   <a:themeElements>

</xml_diff>

<commit_message>
initial take on AshPhoenix.Form
</commit_message>
<xml_diff>
--- a/notebook/Manage_Relationship.pptx
+++ b/notebook/Manage_Relationship.pptx
@@ -5,20 +5,23 @@
     <p:sldMasterId id="2147483648" r:id="rId1"/>
   </p:sldMasterIdLst>
   <p:notesMasterIdLst>
-    <p:notesMasterId r:id="rId13"/>
+    <p:notesMasterId r:id="rId16"/>
   </p:notesMasterIdLst>
   <p:sldIdLst>
     <p:sldId id="256" r:id="rId2"/>
-    <p:sldId id="257" r:id="rId3"/>
-    <p:sldId id="263" r:id="rId4"/>
-    <p:sldId id="258" r:id="rId5"/>
-    <p:sldId id="259" r:id="rId6"/>
-    <p:sldId id="266" r:id="rId7"/>
-    <p:sldId id="265" r:id="rId8"/>
-    <p:sldId id="264" r:id="rId9"/>
-    <p:sldId id="267" r:id="rId10"/>
-    <p:sldId id="268" r:id="rId11"/>
-    <p:sldId id="269" r:id="rId12"/>
+    <p:sldId id="272" r:id="rId3"/>
+    <p:sldId id="257" r:id="rId4"/>
+    <p:sldId id="263" r:id="rId5"/>
+    <p:sldId id="258" r:id="rId6"/>
+    <p:sldId id="259" r:id="rId7"/>
+    <p:sldId id="266" r:id="rId8"/>
+    <p:sldId id="265" r:id="rId9"/>
+    <p:sldId id="264" r:id="rId10"/>
+    <p:sldId id="267" r:id="rId11"/>
+    <p:sldId id="268" r:id="rId12"/>
+    <p:sldId id="269" r:id="rId13"/>
+    <p:sldId id="270" r:id="rId14"/>
+    <p:sldId id="271" r:id="rId15"/>
   </p:sldIdLst>
   <p:sldSz cx="12192000" cy="6858000"/>
   <p:notesSz cx="6858000" cy="9144000"/>
@@ -539,7 +542,7 @@
           <a:p>
             <a:fld id="{49C56B89-E7F8-6D45-A55C-BA1890EBCD81}" type="slidenum">
               <a:rPr lang="en-US" smtClean="0"/>
-              <a:t>2</a:t>
+              <a:t>3</a:t>
             </a:fld>
             <a:endParaRPr lang="en-US"/>
           </a:p>
@@ -4214,8 +4217,8 @@
         </p:nvSpPr>
         <p:spPr>
           <a:xfrm>
-            <a:off x="460590" y="298351"/>
-            <a:ext cx="4356888" cy="4093428"/>
+            <a:off x="294335" y="198598"/>
+            <a:ext cx="4356888" cy="246221"/>
           </a:xfrm>
           <a:prstGeom prst="rect">
             <a:avLst/>
@@ -4233,641 +4236,75 @@
                 <a:latin typeface="Courier New" panose="02070309020205020404" pitchFamily="49" charset="0"/>
                 <a:cs typeface="Courier New" panose="02070309020205020404" pitchFamily="49" charset="0"/>
               </a:rPr>
-              <a:t>Form Socket</a:t>
-            </a:r>
-          </a:p>
-          <a:p>
-            <a:endParaRPr lang="en-US" sz="1000" dirty="0">
-              <a:latin typeface="Courier New" panose="02070309020205020404" pitchFamily="49" charset="0"/>
-              <a:cs typeface="Courier New" panose="02070309020205020404" pitchFamily="49" charset="0"/>
-            </a:endParaRPr>
-          </a:p>
-          <a:p>
-            <a:r>
-              <a:rPr lang="en-US" sz="1000" dirty="0" err="1">
-                <a:latin typeface="Courier New" panose="02070309020205020404" pitchFamily="49" charset="0"/>
-                <a:cs typeface="Courier New" panose="02070309020205020404" pitchFamily="49" charset="0"/>
-              </a:rPr>
-              <a:t>Assign.form_assign</a:t>
-            </a:r>
-            <a:endParaRPr lang="en-US" sz="1000" dirty="0">
-              <a:latin typeface="Courier New" panose="02070309020205020404" pitchFamily="49" charset="0"/>
-              <a:cs typeface="Courier New" panose="02070309020205020404" pitchFamily="49" charset="0"/>
-            </a:endParaRPr>
-          </a:p>
-          <a:p>
-            <a:r>
-              <a:rPr lang="en-US" sz="1000" dirty="0">
-                <a:latin typeface="Courier New" panose="02070309020205020404" pitchFamily="49" charset="0"/>
-                <a:cs typeface="Courier New" panose="02070309020205020404" pitchFamily="49" charset="0"/>
-              </a:rPr>
-              <a:t> - action</a:t>
-            </a:r>
-          </a:p>
-          <a:p>
-            <a:r>
-              <a:rPr lang="en-US" sz="1000" dirty="0">
-                <a:latin typeface="Courier New" panose="02070309020205020404" pitchFamily="49" charset="0"/>
-                <a:cs typeface="Courier New" panose="02070309020205020404" pitchFamily="49" charset="0"/>
-              </a:rPr>
-              <a:t> - added?</a:t>
-            </a:r>
-          </a:p>
-          <a:p>
-            <a:r>
-              <a:rPr lang="en-US" sz="1000" dirty="0">
-                <a:latin typeface="Courier New" panose="02070309020205020404" pitchFamily="49" charset="0"/>
-                <a:cs typeface="Courier New" panose="02070309020205020404" pitchFamily="49" charset="0"/>
-              </a:rPr>
-              <a:t> - </a:t>
-            </a:r>
-            <a:r>
-              <a:rPr lang="en-US" sz="1000" dirty="0" err="1">
-                <a:latin typeface="Courier New" panose="02070309020205020404" pitchFamily="49" charset="0"/>
-                <a:cs typeface="Courier New" panose="02070309020205020404" pitchFamily="49" charset="0"/>
-              </a:rPr>
-              <a:t>any_removed</a:t>
-            </a:r>
-            <a:r>
-              <a:rPr lang="en-US" sz="1000" dirty="0">
-                <a:latin typeface="Courier New" panose="02070309020205020404" pitchFamily="49" charset="0"/>
-                <a:cs typeface="Courier New" panose="02070309020205020404" pitchFamily="49" charset="0"/>
-              </a:rPr>
-              <a:t>?</a:t>
-            </a:r>
-          </a:p>
-          <a:p>
-            <a:r>
-              <a:rPr lang="en-US" sz="1000" dirty="0">
-                <a:latin typeface="Courier New" panose="02070309020205020404" pitchFamily="49" charset="0"/>
-                <a:cs typeface="Courier New" panose="02070309020205020404" pitchFamily="49" charset="0"/>
-              </a:rPr>
-              <a:t> - </a:t>
-            </a:r>
-            <a:r>
-              <a:rPr lang="en-US" sz="1000" dirty="0" err="1">
-                <a:latin typeface="Courier New" panose="02070309020205020404" pitchFamily="49" charset="0"/>
-                <a:cs typeface="Courier New" panose="02070309020205020404" pitchFamily="49" charset="0"/>
-              </a:rPr>
-              <a:t>api</a:t>
-            </a:r>
-            <a:endParaRPr lang="en-US" sz="1000" dirty="0">
-              <a:latin typeface="Courier New" panose="02070309020205020404" pitchFamily="49" charset="0"/>
-              <a:cs typeface="Courier New" panose="02070309020205020404" pitchFamily="49" charset="0"/>
-            </a:endParaRPr>
-          </a:p>
-          <a:p>
-            <a:r>
-              <a:rPr lang="en-US" sz="1000" dirty="0">
-                <a:latin typeface="Courier New" panose="02070309020205020404" pitchFamily="49" charset="0"/>
-                <a:cs typeface="Courier New" panose="02070309020205020404" pitchFamily="49" charset="0"/>
-              </a:rPr>
-              <a:t> - </a:t>
-            </a:r>
-            <a:r>
-              <a:rPr lang="en-US" sz="1000" dirty="0" err="1">
-                <a:latin typeface="Courier New" panose="02070309020205020404" pitchFamily="49" charset="0"/>
-                <a:cs typeface="Courier New" panose="02070309020205020404" pitchFamily="49" charset="0"/>
-              </a:rPr>
-              <a:t>data.user.email</a:t>
-            </a:r>
-            <a:endParaRPr lang="en-US" sz="1000" dirty="0">
-              <a:latin typeface="Courier New" panose="02070309020205020404" pitchFamily="49" charset="0"/>
-              <a:cs typeface="Courier New" panose="02070309020205020404" pitchFamily="49" charset="0"/>
-            </a:endParaRPr>
-          </a:p>
-          <a:p>
-            <a:r>
-              <a:rPr lang="en-US" sz="1000" dirty="0">
-                <a:latin typeface="Courier New" panose="02070309020205020404" pitchFamily="49" charset="0"/>
-                <a:cs typeface="Courier New" panose="02070309020205020404" pitchFamily="49" charset="0"/>
-              </a:rPr>
-              <a:t> - </a:t>
-            </a:r>
-            <a:r>
-              <a:rPr lang="en-US" sz="1000" dirty="0" err="1">
-                <a:latin typeface="Courier New" panose="02070309020205020404" pitchFamily="49" charset="0"/>
-                <a:cs typeface="Courier New" panose="02070309020205020404" pitchFamily="49" charset="0"/>
-              </a:rPr>
-              <a:t>data.user.tweets</a:t>
-            </a:r>
-            <a:r>
-              <a:rPr lang="en-US" sz="1000" dirty="0">
-                <a:latin typeface="Courier New" panose="02070309020205020404" pitchFamily="49" charset="0"/>
-                <a:cs typeface="Courier New" panose="02070309020205020404" pitchFamily="49" charset="0"/>
-              </a:rPr>
-              <a:t>[tweet, tweet2, …]</a:t>
-            </a:r>
-          </a:p>
-          <a:p>
-            <a:r>
-              <a:rPr lang="en-US" sz="1000" dirty="0">
-                <a:latin typeface="Courier New" panose="02070309020205020404" pitchFamily="49" charset="0"/>
-                <a:cs typeface="Courier New" panose="02070309020205020404" pitchFamily="49" charset="0"/>
-              </a:rPr>
-              <a:t> - errors: int</a:t>
-            </a:r>
-          </a:p>
-          <a:p>
-            <a:r>
-              <a:rPr lang="en-US" sz="1000" dirty="0">
-                <a:latin typeface="Courier New" panose="02070309020205020404" pitchFamily="49" charset="0"/>
-                <a:cs typeface="Courier New" panose="02070309020205020404" pitchFamily="49" charset="0"/>
-              </a:rPr>
-              <a:t> - forms: map</a:t>
-            </a:r>
-          </a:p>
-          <a:p>
-            <a:r>
-              <a:rPr lang="en-US" sz="1000" dirty="0">
-                <a:latin typeface="Courier New" panose="02070309020205020404" pitchFamily="49" charset="0"/>
-                <a:cs typeface="Courier New" panose="02070309020205020404" pitchFamily="49" charset="0"/>
-              </a:rPr>
-              <a:t> - id: “form”</a:t>
-            </a:r>
-          </a:p>
-          <a:p>
-            <a:r>
-              <a:rPr lang="en-US" sz="1000" dirty="0">
-                <a:latin typeface="Courier New" panose="02070309020205020404" pitchFamily="49" charset="0"/>
-                <a:cs typeface="Courier New" panose="02070309020205020404" pitchFamily="49" charset="0"/>
-              </a:rPr>
-              <a:t> - name: “form”</a:t>
-            </a:r>
-          </a:p>
-          <a:p>
-            <a:r>
-              <a:rPr lang="en-US" sz="1000" dirty="0">
-                <a:latin typeface="Courier New" panose="02070309020205020404" pitchFamily="49" charset="0"/>
-                <a:cs typeface="Courier New" panose="02070309020205020404" pitchFamily="49" charset="0"/>
-              </a:rPr>
-              <a:t> - </a:t>
-            </a:r>
-            <a:r>
-              <a:rPr lang="en-US" sz="1000" dirty="0" err="1">
-                <a:latin typeface="Courier New" panose="02070309020205020404" pitchFamily="49" charset="0"/>
-                <a:cs typeface="Courier New" panose="02070309020205020404" pitchFamily="49" charset="0"/>
-              </a:rPr>
-              <a:t>just_submitted</a:t>
-            </a:r>
-            <a:r>
-              <a:rPr lang="en-US" sz="1000" dirty="0">
-                <a:latin typeface="Courier New" panose="02070309020205020404" pitchFamily="49" charset="0"/>
-                <a:cs typeface="Courier New" panose="02070309020205020404" pitchFamily="49" charset="0"/>
-              </a:rPr>
-              <a:t>? True/false</a:t>
-            </a:r>
-          </a:p>
-          <a:p>
-            <a:r>
-              <a:rPr lang="en-US" sz="1000" dirty="0">
-                <a:latin typeface="Courier New" panose="02070309020205020404" pitchFamily="49" charset="0"/>
-                <a:cs typeface="Courier New" panose="02070309020205020404" pitchFamily="49" charset="0"/>
-              </a:rPr>
-              <a:t> - method: “put”</a:t>
-            </a:r>
-          </a:p>
-          <a:p>
-            <a:r>
-              <a:rPr lang="en-US" sz="1000" dirty="0">
-                <a:latin typeface="Courier New" panose="02070309020205020404" pitchFamily="49" charset="0"/>
-                <a:cs typeface="Courier New" panose="02070309020205020404" pitchFamily="49" charset="0"/>
-              </a:rPr>
-              <a:t> - opts [as: , </a:t>
-            </a:r>
-            <a:r>
-              <a:rPr lang="en-US" sz="1000" dirty="0" err="1">
-                <a:latin typeface="Courier New" panose="02070309020205020404" pitchFamily="49" charset="0"/>
-                <a:cs typeface="Courier New" panose="02070309020205020404" pitchFamily="49" charset="0"/>
-              </a:rPr>
-              <a:t>api</a:t>
-            </a:r>
-            <a:r>
-              <a:rPr lang="en-US" sz="1000" dirty="0">
-                <a:latin typeface="Courier New" panose="02070309020205020404" pitchFamily="49" charset="0"/>
-                <a:cs typeface="Courier New" panose="02070309020205020404" pitchFamily="49" charset="0"/>
-              </a:rPr>
-              <a:t>: forms []]</a:t>
-            </a:r>
-          </a:p>
-          <a:p>
-            <a:r>
-              <a:rPr lang="en-US" sz="1000" dirty="0">
-                <a:latin typeface="Courier New" panose="02070309020205020404" pitchFamily="49" charset="0"/>
-                <a:cs typeface="Courier New" panose="02070309020205020404" pitchFamily="49" charset="0"/>
-              </a:rPr>
-              <a:t> - </a:t>
-            </a:r>
-            <a:r>
-              <a:rPr lang="en-US" sz="1000" dirty="0" err="1">
-                <a:latin typeface="Courier New" panose="02070309020205020404" pitchFamily="49" charset="0"/>
-                <a:cs typeface="Courier New" panose="02070309020205020404" pitchFamily="49" charset="0"/>
-              </a:rPr>
-              <a:t>original_data</a:t>
-            </a:r>
-            <a:r>
-              <a:rPr lang="en-US" sz="1000" dirty="0">
-                <a:latin typeface="Courier New" panose="02070309020205020404" pitchFamily="49" charset="0"/>
-                <a:cs typeface="Courier New" panose="02070309020205020404" pitchFamily="49" charset="0"/>
-              </a:rPr>
-              <a:t>: &lt;data&gt;</a:t>
-            </a:r>
-          </a:p>
-          <a:p>
-            <a:r>
-              <a:rPr lang="en-US" sz="1000" dirty="0">
-                <a:latin typeface="Courier New" panose="02070309020205020404" pitchFamily="49" charset="0"/>
-                <a:cs typeface="Courier New" panose="02070309020205020404" pitchFamily="49" charset="0"/>
-              </a:rPr>
-              <a:t> - params: map</a:t>
-            </a:r>
-          </a:p>
-          <a:p>
-            <a:r>
-              <a:rPr lang="en-US" sz="1000" dirty="0">
-                <a:latin typeface="Courier New" panose="02070309020205020404" pitchFamily="49" charset="0"/>
-                <a:cs typeface="Courier New" panose="02070309020205020404" pitchFamily="49" charset="0"/>
-              </a:rPr>
-              <a:t> - source: Ash.Changeset</a:t>
-            </a:r>
-          </a:p>
-          <a:p>
-            <a:r>
-              <a:rPr lang="en-US" sz="1000" dirty="0">
-                <a:latin typeface="Courier New" panose="02070309020205020404" pitchFamily="49" charset="0"/>
-                <a:cs typeface="Courier New" panose="02070309020205020404" pitchFamily="49" charset="0"/>
-              </a:rPr>
-              <a:t> - </a:t>
-            </a:r>
-            <a:r>
-              <a:rPr lang="en-US" sz="1000" dirty="0" err="1">
-                <a:latin typeface="Courier New" panose="02070309020205020404" pitchFamily="49" charset="0"/>
-                <a:cs typeface="Courier New" panose="02070309020205020404" pitchFamily="49" charset="0"/>
-              </a:rPr>
-              <a:t>submit_errors</a:t>
-            </a:r>
-            <a:r>
-              <a:rPr lang="en-US" sz="1000" dirty="0">
-                <a:latin typeface="Courier New" panose="02070309020205020404" pitchFamily="49" charset="0"/>
-                <a:cs typeface="Courier New" panose="02070309020205020404" pitchFamily="49" charset="0"/>
-              </a:rPr>
-              <a:t>: </a:t>
-            </a:r>
-          </a:p>
-          <a:p>
-            <a:r>
-              <a:rPr lang="en-US" sz="1000" dirty="0">
-                <a:latin typeface="Courier New" panose="02070309020205020404" pitchFamily="49" charset="0"/>
-                <a:cs typeface="Courier New" panose="02070309020205020404" pitchFamily="49" charset="0"/>
-              </a:rPr>
-              <a:t> - </a:t>
-            </a:r>
-            <a:r>
-              <a:rPr lang="en-US" sz="1000" dirty="0" err="1">
-                <a:latin typeface="Courier New" panose="02070309020205020404" pitchFamily="49" charset="0"/>
-                <a:cs typeface="Courier New" panose="02070309020205020404" pitchFamily="49" charset="0"/>
-              </a:rPr>
-              <a:t>submitted_once</a:t>
-            </a:r>
-            <a:r>
-              <a:rPr lang="en-US" sz="1000" dirty="0">
-                <a:latin typeface="Courier New" panose="02070309020205020404" pitchFamily="49" charset="0"/>
-                <a:cs typeface="Courier New" panose="02070309020205020404" pitchFamily="49" charset="0"/>
-              </a:rPr>
-              <a:t>: </a:t>
-            </a:r>
-          </a:p>
-          <a:p>
-            <a:r>
-              <a:rPr lang="en-US" sz="1000" dirty="0">
-                <a:latin typeface="Courier New" panose="02070309020205020404" pitchFamily="49" charset="0"/>
-                <a:cs typeface="Courier New" panose="02070309020205020404" pitchFamily="49" charset="0"/>
-              </a:rPr>
-              <a:t> - </a:t>
-            </a:r>
-            <a:r>
-              <a:rPr lang="en-US" sz="1000" dirty="0" err="1">
-                <a:latin typeface="Courier New" panose="02070309020205020404" pitchFamily="49" charset="0"/>
-                <a:cs typeface="Courier New" panose="02070309020205020404" pitchFamily="49" charset="0"/>
-              </a:rPr>
-              <a:t>touched_forms</a:t>
-            </a:r>
-            <a:r>
-              <a:rPr lang="en-US" sz="1000" dirty="0">
-                <a:latin typeface="Courier New" panose="02070309020205020404" pitchFamily="49" charset="0"/>
-                <a:cs typeface="Courier New" panose="02070309020205020404" pitchFamily="49" charset="0"/>
-              </a:rPr>
-              <a:t>: </a:t>
-            </a:r>
-            <a:r>
-              <a:rPr lang="en-US" sz="1000" dirty="0" err="1">
-                <a:latin typeface="Courier New" panose="02070309020205020404" pitchFamily="49" charset="0"/>
-                <a:cs typeface="Courier New" panose="02070309020205020404" pitchFamily="49" charset="0"/>
-              </a:rPr>
-              <a:t>MapSet</a:t>
-            </a:r>
-            <a:endParaRPr lang="en-US" sz="1000" dirty="0">
-              <a:latin typeface="Courier New" panose="02070309020205020404" pitchFamily="49" charset="0"/>
-              <a:cs typeface="Courier New" panose="02070309020205020404" pitchFamily="49" charset="0"/>
-            </a:endParaRPr>
-          </a:p>
-          <a:p>
-            <a:r>
-              <a:rPr lang="en-US" sz="1000" dirty="0">
-                <a:latin typeface="Courier New" panose="02070309020205020404" pitchFamily="49" charset="0"/>
-                <a:cs typeface="Courier New" panose="02070309020205020404" pitchFamily="49" charset="0"/>
-              </a:rPr>
-              <a:t> - </a:t>
-            </a:r>
-            <a:r>
-              <a:rPr lang="en-US" sz="1000" dirty="0" err="1">
-                <a:latin typeface="Courier New" panose="02070309020205020404" pitchFamily="49" charset="0"/>
-                <a:cs typeface="Courier New" panose="02070309020205020404" pitchFamily="49" charset="0"/>
-              </a:rPr>
-              <a:t>transform_errors</a:t>
-            </a:r>
-            <a:r>
-              <a:rPr lang="en-US" sz="1000" dirty="0">
-                <a:latin typeface="Courier New" panose="02070309020205020404" pitchFamily="49" charset="0"/>
-                <a:cs typeface="Courier New" panose="02070309020205020404" pitchFamily="49" charset="0"/>
-              </a:rPr>
-              <a:t>: nil</a:t>
-            </a:r>
-          </a:p>
-          <a:p>
-            <a:r>
-              <a:rPr lang="en-US" sz="1000" dirty="0">
-                <a:latin typeface="Courier New" panose="02070309020205020404" pitchFamily="49" charset="0"/>
-                <a:cs typeface="Courier New" panose="02070309020205020404" pitchFamily="49" charset="0"/>
-              </a:rPr>
-              <a:t> - valid? Bool</a:t>
-            </a:r>
-          </a:p>
-          <a:p>
-            <a:r>
-              <a:rPr lang="en-US" sz="1000" dirty="0" err="1">
-                <a:latin typeface="Courier New" panose="02070309020205020404" pitchFamily="49" charset="0"/>
-                <a:cs typeface="Courier New" panose="02070309020205020404" pitchFamily="49" charset="0"/>
-              </a:rPr>
-              <a:t>Live_action</a:t>
-            </a:r>
-            <a:endParaRPr lang="en-US" sz="1000" dirty="0">
-              <a:latin typeface="Courier New" panose="02070309020205020404" pitchFamily="49" charset="0"/>
-              <a:cs typeface="Courier New" panose="02070309020205020404" pitchFamily="49" charset="0"/>
-            </a:endParaRPr>
-          </a:p>
-          <a:p>
-            <a:endParaRPr lang="en-US" sz="1000" dirty="0">
-              <a:latin typeface="Courier New" panose="02070309020205020404" pitchFamily="49" charset="0"/>
-              <a:cs typeface="Courier New" panose="02070309020205020404" pitchFamily="49" charset="0"/>
-            </a:endParaRPr>
-          </a:p>
-        </p:txBody>
-      </p:sp>
-      <p:sp>
-        <p:nvSpPr>
-          <p:cNvPr id="7" name="TextBox 6">
-            <a:extLst>
-              <a:ext uri="{FF2B5EF4-FFF2-40B4-BE49-F238E27FC236}">
-                <a16:creationId xmlns:a16="http://schemas.microsoft.com/office/drawing/2014/main" id="{2A0C05A9-9B7E-4555-0AAC-53FDE49D436A}"/>
-              </a:ext>
-            </a:extLst>
-          </p:cNvPr>
-          <p:cNvSpPr txBox="1"/>
+              <a:t>Invoke read action</a:t>
+            </a:r>
+          </a:p>
+        </p:txBody>
+      </p:sp>
+      <p:pic>
+        <p:nvPicPr>
+          <p:cNvPr id="5" name="Picture 4">
+            <a:extLst>
+              <a:ext uri="{FF2B5EF4-FFF2-40B4-BE49-F238E27FC236}">
+                <a16:creationId xmlns:a16="http://schemas.microsoft.com/office/drawing/2014/main" id="{4990C3EF-AB8A-A8B3-1B00-E26EE8E4CC83}"/>
+              </a:ext>
+            </a:extLst>
+          </p:cNvPr>
+          <p:cNvPicPr>
+            <a:picLocks noChangeAspect="1"/>
+          </p:cNvPicPr>
           <p:nvPr/>
-        </p:nvSpPr>
-        <p:spPr>
-          <a:xfrm>
-            <a:off x="4669602" y="675195"/>
-            <a:ext cx="6053816" cy="2400657"/>
+        </p:nvPicPr>
+        <p:blipFill>
+          <a:blip r:embed="rId2"/>
+          <a:stretch>
+            <a:fillRect/>
+          </a:stretch>
+        </p:blipFill>
+        <p:spPr>
+          <a:xfrm>
+            <a:off x="294335" y="491309"/>
+            <a:ext cx="5801665" cy="2510539"/>
           </a:xfrm>
           <a:prstGeom prst="rect">
             <a:avLst/>
           </a:prstGeom>
-          <a:noFill/>
-        </p:spPr>
-        <p:txBody>
-          <a:bodyPr wrap="square" rtlCol="0">
-            <a:spAutoFit/>
-          </a:bodyPr>
-          <a:lstStyle/>
-          <a:p>
-            <a:r>
-              <a:rPr lang="en-US" sz="1000" dirty="0">
-                <a:latin typeface="Courier New" panose="02070309020205020404" pitchFamily="49" charset="0"/>
-                <a:cs typeface="Courier New" panose="02070309020205020404" pitchFamily="49" charset="0"/>
-              </a:rPr>
-              <a:t>Assigns Form Data. (User, e.g. </a:t>
-            </a:r>
-            <a:r>
-              <a:rPr lang="en-US" sz="1000" dirty="0" err="1">
-                <a:latin typeface="Courier New" panose="02070309020205020404" pitchFamily="49" charset="0"/>
-                <a:cs typeface="Courier New" panose="02070309020205020404" pitchFamily="49" charset="0"/>
-              </a:rPr>
-              <a:t>resrouce</a:t>
-            </a:r>
-            <a:r>
-              <a:rPr lang="en-US" sz="1000" dirty="0">
-                <a:latin typeface="Courier New" panose="02070309020205020404" pitchFamily="49" charset="0"/>
-                <a:cs typeface="Courier New" panose="02070309020205020404" pitchFamily="49" charset="0"/>
-              </a:rPr>
-              <a:t>, not changeset)</a:t>
-            </a:r>
-          </a:p>
-          <a:p>
-            <a:r>
-              <a:rPr lang="en-US" sz="1000" dirty="0">
-                <a:latin typeface="Courier New" panose="02070309020205020404" pitchFamily="49" charset="0"/>
-                <a:cs typeface="Courier New" panose="02070309020205020404" pitchFamily="49" charset="0"/>
-              </a:rPr>
-              <a:t>socket().</a:t>
-            </a:r>
-            <a:r>
-              <a:rPr lang="en-US" sz="1000" dirty="0" err="1">
-                <a:latin typeface="Courier New" panose="02070309020205020404" pitchFamily="49" charset="0"/>
-                <a:cs typeface="Courier New" panose="02070309020205020404" pitchFamily="49" charset="0"/>
-              </a:rPr>
-              <a:t>assigns.form_assign.data.id</a:t>
-            </a:r>
-            <a:endParaRPr lang="en-US" sz="1000" dirty="0">
-              <a:latin typeface="Courier New" panose="02070309020205020404" pitchFamily="49" charset="0"/>
-              <a:cs typeface="Courier New" panose="02070309020205020404" pitchFamily="49" charset="0"/>
-            </a:endParaRPr>
-          </a:p>
-          <a:p>
-            <a:r>
-              <a:rPr lang="en-US" sz="1000" dirty="0">
-                <a:latin typeface="Courier New" panose="02070309020205020404" pitchFamily="49" charset="0"/>
-                <a:cs typeface="Courier New" panose="02070309020205020404" pitchFamily="49" charset="0"/>
-              </a:rPr>
-              <a:t>socket().</a:t>
-            </a:r>
-            <a:r>
-              <a:rPr lang="en-US" sz="1000" dirty="0" err="1">
-                <a:latin typeface="Courier New" panose="02070309020205020404" pitchFamily="49" charset="0"/>
-                <a:cs typeface="Courier New" panose="02070309020205020404" pitchFamily="49" charset="0"/>
-              </a:rPr>
-              <a:t>assigns.form_assign.data.email</a:t>
-            </a:r>
-            <a:endParaRPr lang="en-US" sz="1000" dirty="0">
-              <a:latin typeface="Courier New" panose="02070309020205020404" pitchFamily="49" charset="0"/>
-              <a:cs typeface="Courier New" panose="02070309020205020404" pitchFamily="49" charset="0"/>
-            </a:endParaRPr>
-          </a:p>
-          <a:p>
-            <a:r>
-              <a:rPr lang="en-US" sz="1000" dirty="0">
-                <a:latin typeface="Courier New" panose="02070309020205020404" pitchFamily="49" charset="0"/>
-                <a:cs typeface="Courier New" panose="02070309020205020404" pitchFamily="49" charset="0"/>
-              </a:rPr>
-              <a:t>socket().</a:t>
-            </a:r>
-            <a:r>
-              <a:rPr lang="en-US" sz="1000" dirty="0" err="1">
-                <a:latin typeface="Courier New" panose="02070309020205020404" pitchFamily="49" charset="0"/>
-                <a:cs typeface="Courier New" panose="02070309020205020404" pitchFamily="49" charset="0"/>
-              </a:rPr>
-              <a:t>assigns.form_assign.data.password</a:t>
-            </a:r>
-            <a:r>
-              <a:rPr lang="en-US" sz="1000" dirty="0">
-                <a:latin typeface="Courier New" panose="02070309020205020404" pitchFamily="49" charset="0"/>
-                <a:cs typeface="Courier New" panose="02070309020205020404" pitchFamily="49" charset="0"/>
-              </a:rPr>
-              <a:t> </a:t>
-            </a:r>
-          </a:p>
-          <a:p>
-            <a:endParaRPr lang="en-US" sz="1000" dirty="0">
-              <a:latin typeface="Courier New" panose="02070309020205020404" pitchFamily="49" charset="0"/>
-              <a:cs typeface="Courier New" panose="02070309020205020404" pitchFamily="49" charset="0"/>
-            </a:endParaRPr>
-          </a:p>
-          <a:p>
-            <a:endParaRPr lang="en-US" sz="1000" dirty="0">
-              <a:latin typeface="Courier New" panose="02070309020205020404" pitchFamily="49" charset="0"/>
-              <a:cs typeface="Courier New" panose="02070309020205020404" pitchFamily="49" charset="0"/>
-            </a:endParaRPr>
-          </a:p>
-          <a:p>
-            <a:r>
-              <a:rPr lang="en-US" sz="1000" dirty="0">
-                <a:latin typeface="Courier New" panose="02070309020205020404" pitchFamily="49" charset="0"/>
-                <a:cs typeface="Courier New" panose="02070309020205020404" pitchFamily="49" charset="0"/>
-              </a:rPr>
-              <a:t>Assigns Form Source Data. (Ash.Changeset)</a:t>
-            </a:r>
-          </a:p>
-          <a:p>
-            <a:r>
-              <a:rPr lang="en-US" sz="1000" dirty="0">
-                <a:latin typeface="Courier New" panose="02070309020205020404" pitchFamily="49" charset="0"/>
-                <a:cs typeface="Courier New" panose="02070309020205020404" pitchFamily="49" charset="0"/>
-              </a:rPr>
-              <a:t>socket().</a:t>
-            </a:r>
-            <a:r>
-              <a:rPr lang="en-US" sz="1000" dirty="0" err="1">
-                <a:latin typeface="Courier New" panose="02070309020205020404" pitchFamily="49" charset="0"/>
-                <a:cs typeface="Courier New" panose="02070309020205020404" pitchFamily="49" charset="0"/>
-              </a:rPr>
-              <a:t>assigns.form_assign.source.data.id</a:t>
-            </a:r>
-            <a:endParaRPr lang="en-US" sz="1000" dirty="0">
-              <a:latin typeface="Courier New" panose="02070309020205020404" pitchFamily="49" charset="0"/>
-              <a:cs typeface="Courier New" panose="02070309020205020404" pitchFamily="49" charset="0"/>
-            </a:endParaRPr>
-          </a:p>
-          <a:p>
-            <a:r>
-              <a:rPr lang="en-US" sz="1000" dirty="0">
-                <a:latin typeface="Courier New" panose="02070309020205020404" pitchFamily="49" charset="0"/>
-                <a:cs typeface="Courier New" panose="02070309020205020404" pitchFamily="49" charset="0"/>
-              </a:rPr>
-              <a:t>socket().</a:t>
-            </a:r>
-            <a:r>
-              <a:rPr lang="en-US" sz="1000" dirty="0" err="1">
-                <a:latin typeface="Courier New" panose="02070309020205020404" pitchFamily="49" charset="0"/>
-                <a:cs typeface="Courier New" panose="02070309020205020404" pitchFamily="49" charset="0"/>
-              </a:rPr>
-              <a:t>assigns.form_assign.source.data.email</a:t>
-            </a:r>
-            <a:endParaRPr lang="en-US" sz="1000" dirty="0">
-              <a:latin typeface="Courier New" panose="02070309020205020404" pitchFamily="49" charset="0"/>
-              <a:cs typeface="Courier New" panose="02070309020205020404" pitchFamily="49" charset="0"/>
-            </a:endParaRPr>
-          </a:p>
-          <a:p>
-            <a:endParaRPr lang="en-US" sz="1000" dirty="0">
-              <a:latin typeface="Courier New" panose="02070309020205020404" pitchFamily="49" charset="0"/>
-              <a:cs typeface="Courier New" panose="02070309020205020404" pitchFamily="49" charset="0"/>
-            </a:endParaRPr>
-          </a:p>
-          <a:p>
-            <a:r>
-              <a:rPr lang="en-US" sz="1000" dirty="0">
-                <a:latin typeface="Courier New" panose="02070309020205020404" pitchFamily="49" charset="0"/>
-                <a:cs typeface="Courier New" panose="02070309020205020404" pitchFamily="49" charset="0"/>
-              </a:rPr>
-              <a:t>Assigns Form </a:t>
-            </a:r>
-            <a:r>
-              <a:rPr lang="en-US" sz="1000" dirty="0" err="1">
-                <a:latin typeface="Courier New" panose="02070309020205020404" pitchFamily="49" charset="0"/>
-                <a:cs typeface="Courier New" panose="02070309020205020404" pitchFamily="49" charset="0"/>
-              </a:rPr>
-              <a:t>Original_Data</a:t>
-            </a:r>
-            <a:endParaRPr lang="en-US" sz="1000" dirty="0">
-              <a:latin typeface="Courier New" panose="02070309020205020404" pitchFamily="49" charset="0"/>
-              <a:cs typeface="Courier New" panose="02070309020205020404" pitchFamily="49" charset="0"/>
-            </a:endParaRPr>
-          </a:p>
-          <a:p>
-            <a:r>
-              <a:rPr lang="en-US" sz="1000" dirty="0">
-                <a:latin typeface="Courier New" panose="02070309020205020404" pitchFamily="49" charset="0"/>
-                <a:cs typeface="Courier New" panose="02070309020205020404" pitchFamily="49" charset="0"/>
-              </a:rPr>
-              <a:t>socket().</a:t>
-            </a:r>
-            <a:r>
-              <a:rPr lang="en-US" sz="1000" dirty="0" err="1">
-                <a:latin typeface="Courier New" panose="02070309020205020404" pitchFamily="49" charset="0"/>
-                <a:cs typeface="Courier New" panose="02070309020205020404" pitchFamily="49" charset="0"/>
-              </a:rPr>
-              <a:t>assigns.form_assign.original_data.id</a:t>
-            </a:r>
-            <a:endParaRPr lang="en-US" sz="1000" dirty="0">
-              <a:latin typeface="Courier New" panose="02070309020205020404" pitchFamily="49" charset="0"/>
-              <a:cs typeface="Courier New" panose="02070309020205020404" pitchFamily="49" charset="0"/>
-            </a:endParaRPr>
-          </a:p>
-          <a:p>
-            <a:endParaRPr lang="en-US" sz="1000" dirty="0">
-              <a:latin typeface="Courier New" panose="02070309020205020404" pitchFamily="49" charset="0"/>
-              <a:cs typeface="Courier New" panose="02070309020205020404" pitchFamily="49" charset="0"/>
-            </a:endParaRPr>
-          </a:p>
-          <a:p>
-            <a:endParaRPr lang="en-US" sz="1000" dirty="0">
-              <a:latin typeface="Courier New" panose="02070309020205020404" pitchFamily="49" charset="0"/>
-              <a:cs typeface="Courier New" panose="02070309020205020404" pitchFamily="49" charset="0"/>
-            </a:endParaRPr>
-          </a:p>
-          <a:p>
-            <a:endParaRPr lang="en-US" sz="1000" dirty="0">
-              <a:latin typeface="Courier New" panose="02070309020205020404" pitchFamily="49" charset="0"/>
-              <a:cs typeface="Courier New" panose="02070309020205020404" pitchFamily="49" charset="0"/>
-            </a:endParaRPr>
-          </a:p>
-        </p:txBody>
-      </p:sp>
+        </p:spPr>
+      </p:pic>
+      <p:pic>
+        <p:nvPicPr>
+          <p:cNvPr id="6" name="Picture 5">
+            <a:extLst>
+              <a:ext uri="{FF2B5EF4-FFF2-40B4-BE49-F238E27FC236}">
+                <a16:creationId xmlns:a16="http://schemas.microsoft.com/office/drawing/2014/main" id="{6CF2BDC2-DCAD-261F-D2B4-858DC0934244}"/>
+              </a:ext>
+            </a:extLst>
+          </p:cNvPr>
+          <p:cNvPicPr>
+            <a:picLocks noChangeAspect="1"/>
+          </p:cNvPicPr>
+          <p:nvPr/>
+        </p:nvPicPr>
+        <p:blipFill>
+          <a:blip r:embed="rId3"/>
+          <a:stretch>
+            <a:fillRect/>
+          </a:stretch>
+        </p:blipFill>
+        <p:spPr>
+          <a:xfrm>
+            <a:off x="6342017" y="491309"/>
+            <a:ext cx="5311961" cy="4831624"/>
+          </a:xfrm>
+          <a:prstGeom prst="rect">
+            <a:avLst/>
+          </a:prstGeom>
+        </p:spPr>
+      </p:pic>
     </p:spTree>
     <p:extLst>
       <p:ext uri="{BB962C8B-B14F-4D97-AF65-F5344CB8AC3E}">
-        <p14:creationId xmlns:p14="http://schemas.microsoft.com/office/powerpoint/2010/main" val="3794612120"/>
+        <p14:creationId xmlns:p14="http://schemas.microsoft.com/office/powerpoint/2010/main" val="1985898593"/>
       </p:ext>
     </p:extLst>
   </p:cSld>
@@ -4894,6 +4331,802 @@
           <a:chExt cx="0" cy="0"/>
         </a:xfrm>
       </p:grpSpPr>
+      <p:sp>
+        <p:nvSpPr>
+          <p:cNvPr id="4" name="TextBox 3">
+            <a:extLst>
+              <a:ext uri="{FF2B5EF4-FFF2-40B4-BE49-F238E27FC236}">
+                <a16:creationId xmlns:a16="http://schemas.microsoft.com/office/drawing/2014/main" id="{0E0CD6D6-5D5E-C395-EA03-F1F7724A3FC5}"/>
+              </a:ext>
+            </a:extLst>
+          </p:cNvPr>
+          <p:cNvSpPr txBox="1"/>
+          <p:nvPr/>
+        </p:nvSpPr>
+        <p:spPr>
+          <a:xfrm>
+            <a:off x="460590" y="298351"/>
+            <a:ext cx="4356888" cy="5940088"/>
+          </a:xfrm>
+          <a:prstGeom prst="rect">
+            <a:avLst/>
+          </a:prstGeom>
+          <a:noFill/>
+        </p:spPr>
+        <p:txBody>
+          <a:bodyPr wrap="square" rtlCol="0">
+            <a:spAutoFit/>
+          </a:bodyPr>
+          <a:lstStyle/>
+          <a:p>
+            <a:r>
+              <a:rPr lang="en-US" sz="1000" dirty="0">
+                <a:latin typeface="Courier New" panose="02070309020205020404" pitchFamily="49" charset="0"/>
+                <a:cs typeface="Courier New" panose="02070309020205020404" pitchFamily="49" charset="0"/>
+              </a:rPr>
+              <a:t>Form Socket</a:t>
+            </a:r>
+          </a:p>
+          <a:p>
+            <a:endParaRPr lang="en-US" sz="1000" dirty="0">
+              <a:latin typeface="Courier New" panose="02070309020205020404" pitchFamily="49" charset="0"/>
+              <a:cs typeface="Courier New" panose="02070309020205020404" pitchFamily="49" charset="0"/>
+            </a:endParaRPr>
+          </a:p>
+          <a:p>
+            <a:r>
+              <a:rPr lang="en-US" sz="1000" dirty="0" err="1">
+                <a:latin typeface="Courier New" panose="02070309020205020404" pitchFamily="49" charset="0"/>
+                <a:cs typeface="Courier New" panose="02070309020205020404" pitchFamily="49" charset="0"/>
+              </a:rPr>
+              <a:t>Assign.form_assign</a:t>
+            </a:r>
+            <a:endParaRPr lang="en-US" sz="1000" dirty="0">
+              <a:latin typeface="Courier New" panose="02070309020205020404" pitchFamily="49" charset="0"/>
+              <a:cs typeface="Courier New" panose="02070309020205020404" pitchFamily="49" charset="0"/>
+            </a:endParaRPr>
+          </a:p>
+          <a:p>
+            <a:r>
+              <a:rPr lang="en-US" sz="1000" dirty="0">
+                <a:latin typeface="Courier New" panose="02070309020205020404" pitchFamily="49" charset="0"/>
+                <a:cs typeface="Courier New" panose="02070309020205020404" pitchFamily="49" charset="0"/>
+              </a:rPr>
+              <a:t> - action</a:t>
+            </a:r>
+          </a:p>
+          <a:p>
+            <a:r>
+              <a:rPr lang="en-US" sz="1000" dirty="0">
+                <a:latin typeface="Courier New" panose="02070309020205020404" pitchFamily="49" charset="0"/>
+                <a:cs typeface="Courier New" panose="02070309020205020404" pitchFamily="49" charset="0"/>
+              </a:rPr>
+              <a:t> - added?</a:t>
+            </a:r>
+          </a:p>
+          <a:p>
+            <a:r>
+              <a:rPr lang="en-US" sz="1000" dirty="0">
+                <a:latin typeface="Courier New" panose="02070309020205020404" pitchFamily="49" charset="0"/>
+                <a:cs typeface="Courier New" panose="02070309020205020404" pitchFamily="49" charset="0"/>
+              </a:rPr>
+              <a:t> - </a:t>
+            </a:r>
+            <a:r>
+              <a:rPr lang="en-US" sz="1000" dirty="0" err="1">
+                <a:latin typeface="Courier New" panose="02070309020205020404" pitchFamily="49" charset="0"/>
+                <a:cs typeface="Courier New" panose="02070309020205020404" pitchFamily="49" charset="0"/>
+              </a:rPr>
+              <a:t>any_removed</a:t>
+            </a:r>
+            <a:r>
+              <a:rPr lang="en-US" sz="1000" dirty="0">
+                <a:latin typeface="Courier New" panose="02070309020205020404" pitchFamily="49" charset="0"/>
+                <a:cs typeface="Courier New" panose="02070309020205020404" pitchFamily="49" charset="0"/>
+              </a:rPr>
+              <a:t>?</a:t>
+            </a:r>
+          </a:p>
+          <a:p>
+            <a:r>
+              <a:rPr lang="en-US" sz="1000" dirty="0">
+                <a:latin typeface="Courier New" panose="02070309020205020404" pitchFamily="49" charset="0"/>
+                <a:cs typeface="Courier New" panose="02070309020205020404" pitchFamily="49" charset="0"/>
+              </a:rPr>
+              <a:t> - </a:t>
+            </a:r>
+            <a:r>
+              <a:rPr lang="en-US" sz="1000" dirty="0" err="1">
+                <a:latin typeface="Courier New" panose="02070309020205020404" pitchFamily="49" charset="0"/>
+                <a:cs typeface="Courier New" panose="02070309020205020404" pitchFamily="49" charset="0"/>
+              </a:rPr>
+              <a:t>api</a:t>
+            </a:r>
+            <a:endParaRPr lang="en-US" sz="1000" dirty="0">
+              <a:latin typeface="Courier New" panose="02070309020205020404" pitchFamily="49" charset="0"/>
+              <a:cs typeface="Courier New" panose="02070309020205020404" pitchFamily="49" charset="0"/>
+            </a:endParaRPr>
+          </a:p>
+          <a:p>
+            <a:r>
+              <a:rPr lang="en-US" sz="1000" dirty="0">
+                <a:latin typeface="Courier New" panose="02070309020205020404" pitchFamily="49" charset="0"/>
+                <a:cs typeface="Courier New" panose="02070309020205020404" pitchFamily="49" charset="0"/>
+              </a:rPr>
+              <a:t> - </a:t>
+            </a:r>
+            <a:r>
+              <a:rPr lang="en-US" sz="1000" dirty="0" err="1">
+                <a:latin typeface="Courier New" panose="02070309020205020404" pitchFamily="49" charset="0"/>
+                <a:cs typeface="Courier New" panose="02070309020205020404" pitchFamily="49" charset="0"/>
+              </a:rPr>
+              <a:t>data.user.email</a:t>
+            </a:r>
+            <a:endParaRPr lang="en-US" sz="1000" dirty="0">
+              <a:latin typeface="Courier New" panose="02070309020205020404" pitchFamily="49" charset="0"/>
+              <a:cs typeface="Courier New" panose="02070309020205020404" pitchFamily="49" charset="0"/>
+            </a:endParaRPr>
+          </a:p>
+          <a:p>
+            <a:r>
+              <a:rPr lang="en-US" sz="1000" dirty="0">
+                <a:latin typeface="Courier New" panose="02070309020205020404" pitchFamily="49" charset="0"/>
+                <a:cs typeface="Courier New" panose="02070309020205020404" pitchFamily="49" charset="0"/>
+              </a:rPr>
+              <a:t> - </a:t>
+            </a:r>
+            <a:r>
+              <a:rPr lang="en-US" sz="1000" dirty="0" err="1">
+                <a:latin typeface="Courier New" panose="02070309020205020404" pitchFamily="49" charset="0"/>
+                <a:cs typeface="Courier New" panose="02070309020205020404" pitchFamily="49" charset="0"/>
+              </a:rPr>
+              <a:t>data.user.tweets</a:t>
+            </a:r>
+            <a:r>
+              <a:rPr lang="en-US" sz="1000" dirty="0">
+                <a:latin typeface="Courier New" panose="02070309020205020404" pitchFamily="49" charset="0"/>
+                <a:cs typeface="Courier New" panose="02070309020205020404" pitchFamily="49" charset="0"/>
+              </a:rPr>
+              <a:t>[tweet, tweet2, …]</a:t>
+            </a:r>
+          </a:p>
+          <a:p>
+            <a:r>
+              <a:rPr lang="en-US" sz="1000" dirty="0">
+                <a:latin typeface="Courier New" panose="02070309020205020404" pitchFamily="49" charset="0"/>
+                <a:cs typeface="Courier New" panose="02070309020205020404" pitchFamily="49" charset="0"/>
+              </a:rPr>
+              <a:t> - errors: int</a:t>
+            </a:r>
+          </a:p>
+          <a:p>
+            <a:r>
+              <a:rPr lang="en-US" sz="1000" dirty="0">
+                <a:latin typeface="Courier New" panose="02070309020205020404" pitchFamily="49" charset="0"/>
+                <a:cs typeface="Courier New" panose="02070309020205020404" pitchFamily="49" charset="0"/>
+              </a:rPr>
+              <a:t> - </a:t>
+            </a:r>
+            <a:r>
+              <a:rPr lang="en-US" sz="1000" dirty="0" err="1">
+                <a:latin typeface="Courier New" panose="02070309020205020404" pitchFamily="49" charset="0"/>
+                <a:cs typeface="Courier New" panose="02070309020205020404" pitchFamily="49" charset="0"/>
+              </a:rPr>
+              <a:t>form_keys</a:t>
+            </a:r>
+            <a:r>
+              <a:rPr lang="en-US" sz="1000" dirty="0">
+                <a:latin typeface="Courier New" panose="02070309020205020404" pitchFamily="49" charset="0"/>
+                <a:cs typeface="Courier New" panose="02070309020205020404" pitchFamily="49" charset="0"/>
+              </a:rPr>
+              <a:t>: list of relations and how to persist them (e.g. destroy, update, create actions.  Also has sparse and the relationship manager (e.g. </a:t>
+            </a:r>
+            <a:r>
+              <a:rPr lang="en-US" sz="1000" dirty="0" err="1">
+                <a:latin typeface="Courier New" panose="02070309020205020404" pitchFamily="49" charset="0"/>
+                <a:cs typeface="Courier New" panose="02070309020205020404" pitchFamily="49" charset="0"/>
+              </a:rPr>
+              <a:t>User.tweets</a:t>
+            </a:r>
+            <a:r>
+              <a:rPr lang="en-US" sz="1000" dirty="0">
+                <a:latin typeface="Courier New" panose="02070309020205020404" pitchFamily="49" charset="0"/>
+                <a:cs typeface="Courier New" panose="02070309020205020404" pitchFamily="49" charset="0"/>
+              </a:rPr>
+              <a:t>)</a:t>
+            </a:r>
+          </a:p>
+          <a:p>
+            <a:r>
+              <a:rPr lang="en-US" sz="1000" dirty="0">
+                <a:latin typeface="Courier New" panose="02070309020205020404" pitchFamily="49" charset="0"/>
+                <a:cs typeface="Courier New" panose="02070309020205020404" pitchFamily="49" charset="0"/>
+              </a:rPr>
+              <a:t> - forms: map containing relationships and the UI “forms” used to display them.  Commonly </a:t>
+            </a:r>
+          </a:p>
+          <a:p>
+            <a:r>
+              <a:rPr lang="en-US" sz="1000" dirty="0">
+                <a:latin typeface="Courier New" panose="02070309020205020404" pitchFamily="49" charset="0"/>
+                <a:cs typeface="Courier New" panose="02070309020205020404" pitchFamily="49" charset="0"/>
+              </a:rPr>
+              <a:t>“line item style input forms”, which are just a bunch of html input elements that save to database as a group. Each line item gets its own </a:t>
+            </a:r>
+            <a:r>
+              <a:rPr lang="en-US" sz="1000" dirty="0" err="1">
+                <a:latin typeface="Courier New" panose="02070309020205020404" pitchFamily="49" charset="0"/>
+                <a:cs typeface="Courier New" panose="02070309020205020404" pitchFamily="49" charset="0"/>
+              </a:rPr>
+              <a:t>AshPhoenix.Form</a:t>
+            </a:r>
+            <a:r>
+              <a:rPr lang="en-US" sz="1000" dirty="0">
+                <a:latin typeface="Courier New" panose="02070309020205020404" pitchFamily="49" charset="0"/>
+                <a:cs typeface="Courier New" panose="02070309020205020404" pitchFamily="49" charset="0"/>
+              </a:rPr>
+              <a:t>, with a </a:t>
+            </a:r>
+            <a:r>
+              <a:rPr lang="en-US" sz="1000" dirty="0" err="1">
+                <a:latin typeface="Courier New" panose="02070309020205020404" pitchFamily="49" charset="0"/>
+                <a:cs typeface="Courier New" panose="02070309020205020404" pitchFamily="49" charset="0"/>
+              </a:rPr>
+              <a:t>form.id</a:t>
+            </a:r>
+            <a:r>
+              <a:rPr lang="en-US" sz="1000" dirty="0">
+                <a:latin typeface="Courier New" panose="02070309020205020404" pitchFamily="49" charset="0"/>
+                <a:cs typeface="Courier New" panose="02070309020205020404" pitchFamily="49" charset="0"/>
+              </a:rPr>
+              <a:t> that binds to the HTML element of the form in the UI, and a </a:t>
+            </a:r>
+            <a:r>
+              <a:rPr lang="en-US" sz="1000" dirty="0" err="1">
+                <a:latin typeface="Courier New" panose="02070309020205020404" pitchFamily="49" charset="0"/>
+                <a:cs typeface="Courier New" panose="02070309020205020404" pitchFamily="49" charset="0"/>
+              </a:rPr>
+              <a:t>form.name</a:t>
+            </a:r>
+            <a:r>
+              <a:rPr lang="en-US" sz="1000" dirty="0">
+                <a:latin typeface="Courier New" panose="02070309020205020404" pitchFamily="49" charset="0"/>
+                <a:cs typeface="Courier New" panose="02070309020205020404" pitchFamily="49" charset="0"/>
+              </a:rPr>
+              <a:t> that can be used to pass a parameter into event handling function to add/remove a specific element.  Don’t know what </a:t>
+            </a:r>
+            <a:r>
+              <a:rPr lang="en-US" sz="1000" dirty="0" err="1">
+                <a:latin typeface="Courier New" panose="02070309020205020404" pitchFamily="49" charset="0"/>
+                <a:cs typeface="Courier New" panose="02070309020205020404" pitchFamily="49" charset="0"/>
+              </a:rPr>
+              <a:t>pre_data_trail</a:t>
+            </a:r>
+            <a:r>
+              <a:rPr lang="en-US" sz="1000" dirty="0">
+                <a:latin typeface="Courier New" panose="02070309020205020404" pitchFamily="49" charset="0"/>
+                <a:cs typeface="Courier New" panose="02070309020205020404" pitchFamily="49" charset="0"/>
+              </a:rPr>
+              <a:t> is for. </a:t>
+            </a:r>
+          </a:p>
+          <a:p>
+            <a:r>
+              <a:rPr lang="en-US" sz="1000" dirty="0">
+                <a:latin typeface="Courier New" panose="02070309020205020404" pitchFamily="49" charset="0"/>
+                <a:cs typeface="Courier New" panose="02070309020205020404" pitchFamily="49" charset="0"/>
+              </a:rPr>
+              <a:t> - id: “form”</a:t>
+            </a:r>
+          </a:p>
+          <a:p>
+            <a:r>
+              <a:rPr lang="en-US" sz="1000" dirty="0">
+                <a:latin typeface="Courier New" panose="02070309020205020404" pitchFamily="49" charset="0"/>
+                <a:cs typeface="Courier New" panose="02070309020205020404" pitchFamily="49" charset="0"/>
+              </a:rPr>
+              <a:t> - name: “form”</a:t>
+            </a:r>
+          </a:p>
+          <a:p>
+            <a:r>
+              <a:rPr lang="en-US" sz="1000" dirty="0">
+                <a:latin typeface="Courier New" panose="02070309020205020404" pitchFamily="49" charset="0"/>
+                <a:cs typeface="Courier New" panose="02070309020205020404" pitchFamily="49" charset="0"/>
+              </a:rPr>
+              <a:t> - </a:t>
+            </a:r>
+            <a:r>
+              <a:rPr lang="en-US" sz="1000" dirty="0" err="1">
+                <a:latin typeface="Courier New" panose="02070309020205020404" pitchFamily="49" charset="0"/>
+                <a:cs typeface="Courier New" panose="02070309020205020404" pitchFamily="49" charset="0"/>
+              </a:rPr>
+              <a:t>just_submitted</a:t>
+            </a:r>
+            <a:r>
+              <a:rPr lang="en-US" sz="1000" dirty="0">
+                <a:latin typeface="Courier New" panose="02070309020205020404" pitchFamily="49" charset="0"/>
+                <a:cs typeface="Courier New" panose="02070309020205020404" pitchFamily="49" charset="0"/>
+              </a:rPr>
+              <a:t>? True/false</a:t>
+            </a:r>
+          </a:p>
+          <a:p>
+            <a:r>
+              <a:rPr lang="en-US" sz="1000" dirty="0">
+                <a:latin typeface="Courier New" panose="02070309020205020404" pitchFamily="49" charset="0"/>
+                <a:cs typeface="Courier New" panose="02070309020205020404" pitchFamily="49" charset="0"/>
+              </a:rPr>
+              <a:t> - method: “put”</a:t>
+            </a:r>
+          </a:p>
+          <a:p>
+            <a:r>
+              <a:rPr lang="en-US" sz="1000" dirty="0">
+                <a:latin typeface="Courier New" panose="02070309020205020404" pitchFamily="49" charset="0"/>
+                <a:cs typeface="Courier New" panose="02070309020205020404" pitchFamily="49" charset="0"/>
+              </a:rPr>
+              <a:t> - opts [as: , </a:t>
+            </a:r>
+            <a:r>
+              <a:rPr lang="en-US" sz="1000" dirty="0" err="1">
+                <a:latin typeface="Courier New" panose="02070309020205020404" pitchFamily="49" charset="0"/>
+                <a:cs typeface="Courier New" panose="02070309020205020404" pitchFamily="49" charset="0"/>
+              </a:rPr>
+              <a:t>api</a:t>
+            </a:r>
+            <a:r>
+              <a:rPr lang="en-US" sz="1000" dirty="0">
+                <a:latin typeface="Courier New" panose="02070309020205020404" pitchFamily="49" charset="0"/>
+                <a:cs typeface="Courier New" panose="02070309020205020404" pitchFamily="49" charset="0"/>
+              </a:rPr>
+              <a:t>: forms []]</a:t>
+            </a:r>
+          </a:p>
+          <a:p>
+            <a:r>
+              <a:rPr lang="en-US" sz="1000" dirty="0">
+                <a:latin typeface="Courier New" panose="02070309020205020404" pitchFamily="49" charset="0"/>
+                <a:cs typeface="Courier New" panose="02070309020205020404" pitchFamily="49" charset="0"/>
+              </a:rPr>
+              <a:t> - </a:t>
+            </a:r>
+            <a:r>
+              <a:rPr lang="en-US" sz="1000" dirty="0" err="1">
+                <a:latin typeface="Courier New" panose="02070309020205020404" pitchFamily="49" charset="0"/>
+                <a:cs typeface="Courier New" panose="02070309020205020404" pitchFamily="49" charset="0"/>
+              </a:rPr>
+              <a:t>original_data</a:t>
+            </a:r>
+            <a:r>
+              <a:rPr lang="en-US" sz="1000" dirty="0">
+                <a:latin typeface="Courier New" panose="02070309020205020404" pitchFamily="49" charset="0"/>
+                <a:cs typeface="Courier New" panose="02070309020205020404" pitchFamily="49" charset="0"/>
+              </a:rPr>
+              <a:t>: &lt;data&gt;</a:t>
+            </a:r>
+          </a:p>
+          <a:p>
+            <a:r>
+              <a:rPr lang="en-US" sz="1000" dirty="0">
+                <a:latin typeface="Courier New" panose="02070309020205020404" pitchFamily="49" charset="0"/>
+                <a:cs typeface="Courier New" panose="02070309020205020404" pitchFamily="49" charset="0"/>
+              </a:rPr>
+              <a:t> - params: map</a:t>
+            </a:r>
+          </a:p>
+          <a:p>
+            <a:r>
+              <a:rPr lang="en-US" sz="1000" dirty="0">
+                <a:latin typeface="Courier New" panose="02070309020205020404" pitchFamily="49" charset="0"/>
+                <a:cs typeface="Courier New" panose="02070309020205020404" pitchFamily="49" charset="0"/>
+              </a:rPr>
+              <a:t> - source: Ash.Changeset</a:t>
+            </a:r>
+          </a:p>
+          <a:p>
+            <a:r>
+              <a:rPr lang="en-US" sz="1000" dirty="0">
+                <a:latin typeface="Courier New" panose="02070309020205020404" pitchFamily="49" charset="0"/>
+                <a:cs typeface="Courier New" panose="02070309020205020404" pitchFamily="49" charset="0"/>
+              </a:rPr>
+              <a:t> - </a:t>
+            </a:r>
+            <a:r>
+              <a:rPr lang="en-US" sz="1000" dirty="0" err="1">
+                <a:latin typeface="Courier New" panose="02070309020205020404" pitchFamily="49" charset="0"/>
+                <a:cs typeface="Courier New" panose="02070309020205020404" pitchFamily="49" charset="0"/>
+              </a:rPr>
+              <a:t>submit_errors</a:t>
+            </a:r>
+            <a:r>
+              <a:rPr lang="en-US" sz="1000" dirty="0">
+                <a:latin typeface="Courier New" panose="02070309020205020404" pitchFamily="49" charset="0"/>
+                <a:cs typeface="Courier New" panose="02070309020205020404" pitchFamily="49" charset="0"/>
+              </a:rPr>
+              <a:t>: </a:t>
+            </a:r>
+          </a:p>
+          <a:p>
+            <a:r>
+              <a:rPr lang="en-US" sz="1000" dirty="0">
+                <a:latin typeface="Courier New" panose="02070309020205020404" pitchFamily="49" charset="0"/>
+                <a:cs typeface="Courier New" panose="02070309020205020404" pitchFamily="49" charset="0"/>
+              </a:rPr>
+              <a:t> - </a:t>
+            </a:r>
+            <a:r>
+              <a:rPr lang="en-US" sz="1000" dirty="0" err="1">
+                <a:latin typeface="Courier New" panose="02070309020205020404" pitchFamily="49" charset="0"/>
+                <a:cs typeface="Courier New" panose="02070309020205020404" pitchFamily="49" charset="0"/>
+              </a:rPr>
+              <a:t>submitted_once</a:t>
+            </a:r>
+            <a:r>
+              <a:rPr lang="en-US" sz="1000" dirty="0">
+                <a:latin typeface="Courier New" panose="02070309020205020404" pitchFamily="49" charset="0"/>
+                <a:cs typeface="Courier New" panose="02070309020205020404" pitchFamily="49" charset="0"/>
+              </a:rPr>
+              <a:t>: </a:t>
+            </a:r>
+          </a:p>
+          <a:p>
+            <a:r>
+              <a:rPr lang="en-US" sz="1000" dirty="0">
+                <a:latin typeface="Courier New" panose="02070309020205020404" pitchFamily="49" charset="0"/>
+                <a:cs typeface="Courier New" panose="02070309020205020404" pitchFamily="49" charset="0"/>
+              </a:rPr>
+              <a:t> - </a:t>
+            </a:r>
+            <a:r>
+              <a:rPr lang="en-US" sz="1000" dirty="0" err="1">
+                <a:latin typeface="Courier New" panose="02070309020205020404" pitchFamily="49" charset="0"/>
+                <a:cs typeface="Courier New" panose="02070309020205020404" pitchFamily="49" charset="0"/>
+              </a:rPr>
+              <a:t>touched_forms</a:t>
+            </a:r>
+            <a:r>
+              <a:rPr lang="en-US" sz="1000" dirty="0">
+                <a:latin typeface="Courier New" panose="02070309020205020404" pitchFamily="49" charset="0"/>
+                <a:cs typeface="Courier New" panose="02070309020205020404" pitchFamily="49" charset="0"/>
+              </a:rPr>
+              <a:t>: </a:t>
+            </a:r>
+            <a:r>
+              <a:rPr lang="en-US" sz="1000" dirty="0" err="1">
+                <a:latin typeface="Courier New" panose="02070309020205020404" pitchFamily="49" charset="0"/>
+                <a:cs typeface="Courier New" panose="02070309020205020404" pitchFamily="49" charset="0"/>
+              </a:rPr>
+              <a:t>MapSet</a:t>
+            </a:r>
+            <a:endParaRPr lang="en-US" sz="1000" dirty="0">
+              <a:latin typeface="Courier New" panose="02070309020205020404" pitchFamily="49" charset="0"/>
+              <a:cs typeface="Courier New" panose="02070309020205020404" pitchFamily="49" charset="0"/>
+            </a:endParaRPr>
+          </a:p>
+          <a:p>
+            <a:r>
+              <a:rPr lang="en-US" sz="1000" dirty="0">
+                <a:latin typeface="Courier New" panose="02070309020205020404" pitchFamily="49" charset="0"/>
+                <a:cs typeface="Courier New" panose="02070309020205020404" pitchFamily="49" charset="0"/>
+              </a:rPr>
+              <a:t> - </a:t>
+            </a:r>
+            <a:r>
+              <a:rPr lang="en-US" sz="1000" dirty="0" err="1">
+                <a:latin typeface="Courier New" panose="02070309020205020404" pitchFamily="49" charset="0"/>
+                <a:cs typeface="Courier New" panose="02070309020205020404" pitchFamily="49" charset="0"/>
+              </a:rPr>
+              <a:t>transform_errors</a:t>
+            </a:r>
+            <a:r>
+              <a:rPr lang="en-US" sz="1000" dirty="0">
+                <a:latin typeface="Courier New" panose="02070309020205020404" pitchFamily="49" charset="0"/>
+                <a:cs typeface="Courier New" panose="02070309020205020404" pitchFamily="49" charset="0"/>
+              </a:rPr>
+              <a:t>: nil</a:t>
+            </a:r>
+          </a:p>
+          <a:p>
+            <a:r>
+              <a:rPr lang="en-US" sz="1000" dirty="0">
+                <a:latin typeface="Courier New" panose="02070309020205020404" pitchFamily="49" charset="0"/>
+                <a:cs typeface="Courier New" panose="02070309020205020404" pitchFamily="49" charset="0"/>
+              </a:rPr>
+              <a:t> - valid? Bool</a:t>
+            </a:r>
+          </a:p>
+          <a:p>
+            <a:r>
+              <a:rPr lang="en-US" sz="1000" dirty="0" err="1">
+                <a:latin typeface="Courier New" panose="02070309020205020404" pitchFamily="49" charset="0"/>
+                <a:cs typeface="Courier New" panose="02070309020205020404" pitchFamily="49" charset="0"/>
+              </a:rPr>
+              <a:t>Live_action</a:t>
+            </a:r>
+            <a:endParaRPr lang="en-US" sz="1000" dirty="0">
+              <a:latin typeface="Courier New" panose="02070309020205020404" pitchFamily="49" charset="0"/>
+              <a:cs typeface="Courier New" panose="02070309020205020404" pitchFamily="49" charset="0"/>
+            </a:endParaRPr>
+          </a:p>
+          <a:p>
+            <a:endParaRPr lang="en-US" sz="1000" dirty="0">
+              <a:latin typeface="Courier New" panose="02070309020205020404" pitchFamily="49" charset="0"/>
+              <a:cs typeface="Courier New" panose="02070309020205020404" pitchFamily="49" charset="0"/>
+            </a:endParaRPr>
+          </a:p>
+        </p:txBody>
+      </p:sp>
+      <p:sp>
+        <p:nvSpPr>
+          <p:cNvPr id="7" name="TextBox 6">
+            <a:extLst>
+              <a:ext uri="{FF2B5EF4-FFF2-40B4-BE49-F238E27FC236}">
+                <a16:creationId xmlns:a16="http://schemas.microsoft.com/office/drawing/2014/main" id="{2A0C05A9-9B7E-4555-0AAC-53FDE49D436A}"/>
+              </a:ext>
+            </a:extLst>
+          </p:cNvPr>
+          <p:cNvSpPr txBox="1"/>
+          <p:nvPr/>
+        </p:nvSpPr>
+        <p:spPr>
+          <a:xfrm>
+            <a:off x="4669602" y="675195"/>
+            <a:ext cx="6053816" cy="2400657"/>
+          </a:xfrm>
+          <a:prstGeom prst="rect">
+            <a:avLst/>
+          </a:prstGeom>
+          <a:noFill/>
+        </p:spPr>
+        <p:txBody>
+          <a:bodyPr wrap="square" rtlCol="0">
+            <a:spAutoFit/>
+          </a:bodyPr>
+          <a:lstStyle/>
+          <a:p>
+            <a:r>
+              <a:rPr lang="en-US" sz="1000" dirty="0">
+                <a:latin typeface="Courier New" panose="02070309020205020404" pitchFamily="49" charset="0"/>
+                <a:cs typeface="Courier New" panose="02070309020205020404" pitchFamily="49" charset="0"/>
+              </a:rPr>
+              <a:t>Assigns Form Data. (User, e.g. </a:t>
+            </a:r>
+            <a:r>
+              <a:rPr lang="en-US" sz="1000" dirty="0" err="1">
+                <a:latin typeface="Courier New" panose="02070309020205020404" pitchFamily="49" charset="0"/>
+                <a:cs typeface="Courier New" panose="02070309020205020404" pitchFamily="49" charset="0"/>
+              </a:rPr>
+              <a:t>resrouce</a:t>
+            </a:r>
+            <a:r>
+              <a:rPr lang="en-US" sz="1000" dirty="0">
+                <a:latin typeface="Courier New" panose="02070309020205020404" pitchFamily="49" charset="0"/>
+                <a:cs typeface="Courier New" panose="02070309020205020404" pitchFamily="49" charset="0"/>
+              </a:rPr>
+              <a:t>, not changeset)</a:t>
+            </a:r>
+          </a:p>
+          <a:p>
+            <a:r>
+              <a:rPr lang="en-US" sz="1000" dirty="0">
+                <a:latin typeface="Courier New" panose="02070309020205020404" pitchFamily="49" charset="0"/>
+                <a:cs typeface="Courier New" panose="02070309020205020404" pitchFamily="49" charset="0"/>
+              </a:rPr>
+              <a:t>socket().</a:t>
+            </a:r>
+            <a:r>
+              <a:rPr lang="en-US" sz="1000" dirty="0" err="1">
+                <a:latin typeface="Courier New" panose="02070309020205020404" pitchFamily="49" charset="0"/>
+                <a:cs typeface="Courier New" panose="02070309020205020404" pitchFamily="49" charset="0"/>
+              </a:rPr>
+              <a:t>assigns.form_assign.data.id</a:t>
+            </a:r>
+            <a:endParaRPr lang="en-US" sz="1000" dirty="0">
+              <a:latin typeface="Courier New" panose="02070309020205020404" pitchFamily="49" charset="0"/>
+              <a:cs typeface="Courier New" panose="02070309020205020404" pitchFamily="49" charset="0"/>
+            </a:endParaRPr>
+          </a:p>
+          <a:p>
+            <a:r>
+              <a:rPr lang="en-US" sz="1000" dirty="0">
+                <a:latin typeface="Courier New" panose="02070309020205020404" pitchFamily="49" charset="0"/>
+                <a:cs typeface="Courier New" panose="02070309020205020404" pitchFamily="49" charset="0"/>
+              </a:rPr>
+              <a:t>socket().</a:t>
+            </a:r>
+            <a:r>
+              <a:rPr lang="en-US" sz="1000" dirty="0" err="1">
+                <a:latin typeface="Courier New" panose="02070309020205020404" pitchFamily="49" charset="0"/>
+                <a:cs typeface="Courier New" panose="02070309020205020404" pitchFamily="49" charset="0"/>
+              </a:rPr>
+              <a:t>assigns.form_assign.data.email</a:t>
+            </a:r>
+            <a:endParaRPr lang="en-US" sz="1000" dirty="0">
+              <a:latin typeface="Courier New" panose="02070309020205020404" pitchFamily="49" charset="0"/>
+              <a:cs typeface="Courier New" panose="02070309020205020404" pitchFamily="49" charset="0"/>
+            </a:endParaRPr>
+          </a:p>
+          <a:p>
+            <a:r>
+              <a:rPr lang="en-US" sz="1000" dirty="0">
+                <a:latin typeface="Courier New" panose="02070309020205020404" pitchFamily="49" charset="0"/>
+                <a:cs typeface="Courier New" panose="02070309020205020404" pitchFamily="49" charset="0"/>
+              </a:rPr>
+              <a:t>socket().</a:t>
+            </a:r>
+            <a:r>
+              <a:rPr lang="en-US" sz="1000" dirty="0" err="1">
+                <a:latin typeface="Courier New" panose="02070309020205020404" pitchFamily="49" charset="0"/>
+                <a:cs typeface="Courier New" panose="02070309020205020404" pitchFamily="49" charset="0"/>
+              </a:rPr>
+              <a:t>assigns.form_assign.data.password</a:t>
+            </a:r>
+            <a:r>
+              <a:rPr lang="en-US" sz="1000" dirty="0">
+                <a:latin typeface="Courier New" panose="02070309020205020404" pitchFamily="49" charset="0"/>
+                <a:cs typeface="Courier New" panose="02070309020205020404" pitchFamily="49" charset="0"/>
+              </a:rPr>
+              <a:t> </a:t>
+            </a:r>
+          </a:p>
+          <a:p>
+            <a:endParaRPr lang="en-US" sz="1000" dirty="0">
+              <a:latin typeface="Courier New" panose="02070309020205020404" pitchFamily="49" charset="0"/>
+              <a:cs typeface="Courier New" panose="02070309020205020404" pitchFamily="49" charset="0"/>
+            </a:endParaRPr>
+          </a:p>
+          <a:p>
+            <a:endParaRPr lang="en-US" sz="1000" dirty="0">
+              <a:latin typeface="Courier New" panose="02070309020205020404" pitchFamily="49" charset="0"/>
+              <a:cs typeface="Courier New" panose="02070309020205020404" pitchFamily="49" charset="0"/>
+            </a:endParaRPr>
+          </a:p>
+          <a:p>
+            <a:r>
+              <a:rPr lang="en-US" sz="1000" dirty="0">
+                <a:latin typeface="Courier New" panose="02070309020205020404" pitchFamily="49" charset="0"/>
+                <a:cs typeface="Courier New" panose="02070309020205020404" pitchFamily="49" charset="0"/>
+              </a:rPr>
+              <a:t>Assigns Form Source Data. (Ash.Changeset)</a:t>
+            </a:r>
+          </a:p>
+          <a:p>
+            <a:r>
+              <a:rPr lang="en-US" sz="1000" dirty="0">
+                <a:latin typeface="Courier New" panose="02070309020205020404" pitchFamily="49" charset="0"/>
+                <a:cs typeface="Courier New" panose="02070309020205020404" pitchFamily="49" charset="0"/>
+              </a:rPr>
+              <a:t>socket().</a:t>
+            </a:r>
+            <a:r>
+              <a:rPr lang="en-US" sz="1000" dirty="0" err="1">
+                <a:latin typeface="Courier New" panose="02070309020205020404" pitchFamily="49" charset="0"/>
+                <a:cs typeface="Courier New" panose="02070309020205020404" pitchFamily="49" charset="0"/>
+              </a:rPr>
+              <a:t>assigns.form_assign.source.data.id</a:t>
+            </a:r>
+            <a:endParaRPr lang="en-US" sz="1000" dirty="0">
+              <a:latin typeface="Courier New" panose="02070309020205020404" pitchFamily="49" charset="0"/>
+              <a:cs typeface="Courier New" panose="02070309020205020404" pitchFamily="49" charset="0"/>
+            </a:endParaRPr>
+          </a:p>
+          <a:p>
+            <a:r>
+              <a:rPr lang="en-US" sz="1000" dirty="0">
+                <a:latin typeface="Courier New" panose="02070309020205020404" pitchFamily="49" charset="0"/>
+                <a:cs typeface="Courier New" panose="02070309020205020404" pitchFamily="49" charset="0"/>
+              </a:rPr>
+              <a:t>socket().</a:t>
+            </a:r>
+            <a:r>
+              <a:rPr lang="en-US" sz="1000" dirty="0" err="1">
+                <a:latin typeface="Courier New" panose="02070309020205020404" pitchFamily="49" charset="0"/>
+                <a:cs typeface="Courier New" panose="02070309020205020404" pitchFamily="49" charset="0"/>
+              </a:rPr>
+              <a:t>assigns.form_assign.source.data.email</a:t>
+            </a:r>
+            <a:endParaRPr lang="en-US" sz="1000" dirty="0">
+              <a:latin typeface="Courier New" panose="02070309020205020404" pitchFamily="49" charset="0"/>
+              <a:cs typeface="Courier New" panose="02070309020205020404" pitchFamily="49" charset="0"/>
+            </a:endParaRPr>
+          </a:p>
+          <a:p>
+            <a:endParaRPr lang="en-US" sz="1000" dirty="0">
+              <a:latin typeface="Courier New" panose="02070309020205020404" pitchFamily="49" charset="0"/>
+              <a:cs typeface="Courier New" panose="02070309020205020404" pitchFamily="49" charset="0"/>
+            </a:endParaRPr>
+          </a:p>
+          <a:p>
+            <a:r>
+              <a:rPr lang="en-US" sz="1000" dirty="0">
+                <a:latin typeface="Courier New" panose="02070309020205020404" pitchFamily="49" charset="0"/>
+                <a:cs typeface="Courier New" panose="02070309020205020404" pitchFamily="49" charset="0"/>
+              </a:rPr>
+              <a:t>Assigns Form </a:t>
+            </a:r>
+            <a:r>
+              <a:rPr lang="en-US" sz="1000" dirty="0" err="1">
+                <a:latin typeface="Courier New" panose="02070309020205020404" pitchFamily="49" charset="0"/>
+                <a:cs typeface="Courier New" panose="02070309020205020404" pitchFamily="49" charset="0"/>
+              </a:rPr>
+              <a:t>Original_Data</a:t>
+            </a:r>
+            <a:endParaRPr lang="en-US" sz="1000" dirty="0">
+              <a:latin typeface="Courier New" panose="02070309020205020404" pitchFamily="49" charset="0"/>
+              <a:cs typeface="Courier New" panose="02070309020205020404" pitchFamily="49" charset="0"/>
+            </a:endParaRPr>
+          </a:p>
+          <a:p>
+            <a:r>
+              <a:rPr lang="en-US" sz="1000" dirty="0">
+                <a:latin typeface="Courier New" panose="02070309020205020404" pitchFamily="49" charset="0"/>
+                <a:cs typeface="Courier New" panose="02070309020205020404" pitchFamily="49" charset="0"/>
+              </a:rPr>
+              <a:t>socket().</a:t>
+            </a:r>
+            <a:r>
+              <a:rPr lang="en-US" sz="1000" dirty="0" err="1">
+                <a:latin typeface="Courier New" panose="02070309020205020404" pitchFamily="49" charset="0"/>
+                <a:cs typeface="Courier New" panose="02070309020205020404" pitchFamily="49" charset="0"/>
+              </a:rPr>
+              <a:t>assigns.form_assign.original_data.id</a:t>
+            </a:r>
+            <a:endParaRPr lang="en-US" sz="1000" dirty="0">
+              <a:latin typeface="Courier New" panose="02070309020205020404" pitchFamily="49" charset="0"/>
+              <a:cs typeface="Courier New" panose="02070309020205020404" pitchFamily="49" charset="0"/>
+            </a:endParaRPr>
+          </a:p>
+          <a:p>
+            <a:endParaRPr lang="en-US" sz="1000" dirty="0">
+              <a:latin typeface="Courier New" panose="02070309020205020404" pitchFamily="49" charset="0"/>
+              <a:cs typeface="Courier New" panose="02070309020205020404" pitchFamily="49" charset="0"/>
+            </a:endParaRPr>
+          </a:p>
+          <a:p>
+            <a:endParaRPr lang="en-US" sz="1000" dirty="0">
+              <a:latin typeface="Courier New" panose="02070309020205020404" pitchFamily="49" charset="0"/>
+              <a:cs typeface="Courier New" panose="02070309020205020404" pitchFamily="49" charset="0"/>
+            </a:endParaRPr>
+          </a:p>
+          <a:p>
+            <a:endParaRPr lang="en-US" sz="1000" dirty="0">
+              <a:latin typeface="Courier New" panose="02070309020205020404" pitchFamily="49" charset="0"/>
+              <a:cs typeface="Courier New" panose="02070309020205020404" pitchFamily="49" charset="0"/>
+            </a:endParaRPr>
+          </a:p>
+        </p:txBody>
+      </p:sp>
+    </p:spTree>
+    <p:extLst>
+      <p:ext uri="{BB962C8B-B14F-4D97-AF65-F5344CB8AC3E}">
+        <p14:creationId xmlns:p14="http://schemas.microsoft.com/office/powerpoint/2010/main" val="3794612120"/>
+      </p:ext>
+    </p:extLst>
+  </p:cSld>
+  <p:clrMapOvr>
+    <a:masterClrMapping/>
+  </p:clrMapOvr>
+</p:sld>
+</file>
+
+<file path=ppt/slides/slide12.xml><?xml version="1.0" encoding="utf-8"?>
+<p:sld xmlns:a="http://schemas.openxmlformats.org/drawingml/2006/main" xmlns:r="http://schemas.openxmlformats.org/officeDocument/2006/relationships" xmlns:p="http://schemas.openxmlformats.org/presentationml/2006/main">
+  <p:cSld>
+    <p:spTree>
+      <p:nvGrpSpPr>
+        <p:cNvPr id="1" name=""/>
+        <p:cNvGrpSpPr/>
+        <p:nvPr/>
+      </p:nvGrpSpPr>
+      <p:grpSpPr>
+        <a:xfrm>
+          <a:off x="0" y="0"/>
+          <a:ext cx="0" cy="0"/>
+          <a:chOff x="0" y="0"/>
+          <a:chExt cx="0" cy="0"/>
+        </a:xfrm>
+      </p:grpSpPr>
       <p:pic>
         <p:nvPicPr>
           <p:cNvPr id="2" name="Picture 1">
@@ -4988,6 +5221,1216 @@
     <p:extLst>
       <p:ext uri="{BB962C8B-B14F-4D97-AF65-F5344CB8AC3E}">
         <p14:creationId xmlns:p14="http://schemas.microsoft.com/office/powerpoint/2010/main" val="1857932297"/>
+      </p:ext>
+    </p:extLst>
+  </p:cSld>
+  <p:clrMapOvr>
+    <a:masterClrMapping/>
+  </p:clrMapOvr>
+</p:sld>
+</file>
+
+<file path=ppt/slides/slide13.xml><?xml version="1.0" encoding="utf-8"?>
+<p:sld xmlns:a="http://schemas.openxmlformats.org/drawingml/2006/main" xmlns:r="http://schemas.openxmlformats.org/officeDocument/2006/relationships" xmlns:p="http://schemas.openxmlformats.org/presentationml/2006/main">
+  <p:cSld>
+    <p:spTree>
+      <p:nvGrpSpPr>
+        <p:cNvPr id="1" name=""/>
+        <p:cNvGrpSpPr/>
+        <p:nvPr/>
+      </p:nvGrpSpPr>
+      <p:grpSpPr>
+        <a:xfrm>
+          <a:off x="0" y="0"/>
+          <a:ext cx="0" cy="0"/>
+          <a:chOff x="0" y="0"/>
+          <a:chExt cx="0" cy="0"/>
+        </a:xfrm>
+      </p:grpSpPr>
+      <p:pic>
+        <p:nvPicPr>
+          <p:cNvPr id="37" name="Picture 36">
+            <a:extLst>
+              <a:ext uri="{FF2B5EF4-FFF2-40B4-BE49-F238E27FC236}">
+                <a16:creationId xmlns:a16="http://schemas.microsoft.com/office/drawing/2014/main" id="{8CEBCBE7-BBB2-220E-3A7D-FDDD5EB0A7F4}"/>
+              </a:ext>
+            </a:extLst>
+          </p:cNvPr>
+          <p:cNvPicPr>
+            <a:picLocks noChangeAspect="1"/>
+          </p:cNvPicPr>
+          <p:nvPr/>
+        </p:nvPicPr>
+        <p:blipFill>
+          <a:blip r:embed="rId2"/>
+          <a:stretch>
+            <a:fillRect/>
+          </a:stretch>
+        </p:blipFill>
+        <p:spPr>
+          <a:xfrm>
+            <a:off x="6016577" y="1231392"/>
+            <a:ext cx="5712127" cy="2337255"/>
+          </a:xfrm>
+          <a:prstGeom prst="rect">
+            <a:avLst/>
+          </a:prstGeom>
+        </p:spPr>
+      </p:pic>
+      <p:sp>
+        <p:nvSpPr>
+          <p:cNvPr id="6" name="TextBox 5">
+            <a:extLst>
+              <a:ext uri="{FF2B5EF4-FFF2-40B4-BE49-F238E27FC236}">
+                <a16:creationId xmlns:a16="http://schemas.microsoft.com/office/drawing/2014/main" id="{9399A366-7517-3584-26FF-1EF0A7097BE9}"/>
+              </a:ext>
+            </a:extLst>
+          </p:cNvPr>
+          <p:cNvSpPr txBox="1"/>
+          <p:nvPr/>
+        </p:nvSpPr>
+        <p:spPr>
+          <a:xfrm>
+            <a:off x="768342" y="963030"/>
+            <a:ext cx="1989347" cy="307777"/>
+          </a:xfrm>
+          <a:prstGeom prst="rect">
+            <a:avLst/>
+          </a:prstGeom>
+          <a:noFill/>
+        </p:spPr>
+        <p:txBody>
+          <a:bodyPr wrap="square" rtlCol="0">
+            <a:spAutoFit/>
+          </a:bodyPr>
+          <a:lstStyle/>
+          <a:p>
+            <a:pPr algn="ctr"/>
+            <a:r>
+              <a:rPr lang="en-US" sz="1400" b="1" dirty="0"/>
+              <a:t>Ash.Resource</a:t>
+            </a:r>
+          </a:p>
+        </p:txBody>
+      </p:sp>
+      <p:sp>
+        <p:nvSpPr>
+          <p:cNvPr id="7" name="TextBox 6">
+            <a:extLst>
+              <a:ext uri="{FF2B5EF4-FFF2-40B4-BE49-F238E27FC236}">
+                <a16:creationId xmlns:a16="http://schemas.microsoft.com/office/drawing/2014/main" id="{4C6415AF-217F-E74C-5DA2-E232C6BF4E4E}"/>
+              </a:ext>
+            </a:extLst>
+          </p:cNvPr>
+          <p:cNvSpPr txBox="1"/>
+          <p:nvPr/>
+        </p:nvSpPr>
+        <p:spPr>
+          <a:xfrm>
+            <a:off x="768343" y="342238"/>
+            <a:ext cx="10920389" cy="307777"/>
+          </a:xfrm>
+          <a:prstGeom prst="rect">
+            <a:avLst/>
+          </a:prstGeom>
+          <a:noFill/>
+        </p:spPr>
+        <p:txBody>
+          <a:bodyPr wrap="square" rtlCol="0">
+            <a:spAutoFit/>
+          </a:bodyPr>
+          <a:lstStyle/>
+          <a:p>
+            <a:pPr algn="ctr"/>
+            <a:r>
+              <a:rPr lang="en-US" sz="1400" b="1" dirty="0"/>
+              <a:t>Multi-Line AshPhoenix.Form</a:t>
+            </a:r>
+          </a:p>
+        </p:txBody>
+      </p:sp>
+      <p:pic>
+        <p:nvPicPr>
+          <p:cNvPr id="24" name="Picture 23">
+            <a:extLst>
+              <a:ext uri="{FF2B5EF4-FFF2-40B4-BE49-F238E27FC236}">
+                <a16:creationId xmlns:a16="http://schemas.microsoft.com/office/drawing/2014/main" id="{19394488-7E88-DBDF-4CEB-C9AF4940137E}"/>
+              </a:ext>
+            </a:extLst>
+          </p:cNvPr>
+          <p:cNvPicPr>
+            <a:picLocks noChangeAspect="1"/>
+          </p:cNvPicPr>
+          <p:nvPr/>
+        </p:nvPicPr>
+        <p:blipFill>
+          <a:blip r:embed="rId3"/>
+          <a:stretch>
+            <a:fillRect/>
+          </a:stretch>
+        </p:blipFill>
+        <p:spPr>
+          <a:xfrm>
+            <a:off x="768343" y="1231392"/>
+            <a:ext cx="1989347" cy="2663952"/>
+          </a:xfrm>
+          <a:prstGeom prst="rect">
+            <a:avLst/>
+          </a:prstGeom>
+          <a:ln>
+            <a:solidFill>
+              <a:schemeClr val="tx1">
+                <a:lumMod val="50000"/>
+                <a:lumOff val="50000"/>
+              </a:schemeClr>
+            </a:solidFill>
+          </a:ln>
+        </p:spPr>
+      </p:pic>
+      <p:sp>
+        <p:nvSpPr>
+          <p:cNvPr id="2" name="Can 1">
+            <a:extLst>
+              <a:ext uri="{FF2B5EF4-FFF2-40B4-BE49-F238E27FC236}">
+                <a16:creationId xmlns:a16="http://schemas.microsoft.com/office/drawing/2014/main" id="{B63CB259-64B5-3A08-44D6-AEE97341C32D}"/>
+              </a:ext>
+            </a:extLst>
+          </p:cNvPr>
+          <p:cNvSpPr/>
+          <p:nvPr/>
+        </p:nvSpPr>
+        <p:spPr>
+          <a:xfrm>
+            <a:off x="2413219" y="3606010"/>
+            <a:ext cx="445923" cy="429542"/>
+          </a:xfrm>
+          <a:prstGeom prst="can">
+            <a:avLst/>
+          </a:prstGeom>
+          <a:solidFill>
+            <a:schemeClr val="accent4">
+              <a:lumMod val="75000"/>
+            </a:schemeClr>
+          </a:solidFill>
+        </p:spPr>
+        <p:style>
+          <a:lnRef idx="2">
+            <a:schemeClr val="accent1">
+              <a:shade val="50000"/>
+            </a:schemeClr>
+          </a:lnRef>
+          <a:fillRef idx="1">
+            <a:schemeClr val="accent1"/>
+          </a:fillRef>
+          <a:effectRef idx="0">
+            <a:schemeClr val="accent1"/>
+          </a:effectRef>
+          <a:fontRef idx="minor">
+            <a:schemeClr val="lt1"/>
+          </a:fontRef>
+        </p:style>
+        <p:txBody>
+          <a:bodyPr rtlCol="0" anchor="ctr"/>
+          <a:lstStyle/>
+          <a:p>
+            <a:pPr algn="ctr"/>
+            <a:endParaRPr lang="en-US"/>
+          </a:p>
+        </p:txBody>
+      </p:sp>
+      <p:pic>
+        <p:nvPicPr>
+          <p:cNvPr id="25" name="Picture 24">
+            <a:extLst>
+              <a:ext uri="{FF2B5EF4-FFF2-40B4-BE49-F238E27FC236}">
+                <a16:creationId xmlns:a16="http://schemas.microsoft.com/office/drawing/2014/main" id="{2F8985CC-E734-A938-5A91-E278B82228B6}"/>
+              </a:ext>
+            </a:extLst>
+          </p:cNvPr>
+          <p:cNvPicPr>
+            <a:picLocks noChangeAspect="1"/>
+          </p:cNvPicPr>
+          <p:nvPr/>
+        </p:nvPicPr>
+        <p:blipFill>
+          <a:blip r:embed="rId4"/>
+          <a:stretch>
+            <a:fillRect/>
+          </a:stretch>
+        </p:blipFill>
+        <p:spPr>
+          <a:xfrm>
+            <a:off x="3094398" y="1231392"/>
+            <a:ext cx="2846777" cy="2602992"/>
+          </a:xfrm>
+          <a:prstGeom prst="rect">
+            <a:avLst/>
+          </a:prstGeom>
+        </p:spPr>
+      </p:pic>
+      <p:sp>
+        <p:nvSpPr>
+          <p:cNvPr id="26" name="TextBox 25">
+            <a:extLst>
+              <a:ext uri="{FF2B5EF4-FFF2-40B4-BE49-F238E27FC236}">
+                <a16:creationId xmlns:a16="http://schemas.microsoft.com/office/drawing/2014/main" id="{2379E5EA-A81D-9961-CD18-8120ADA4878D}"/>
+              </a:ext>
+            </a:extLst>
+          </p:cNvPr>
+          <p:cNvSpPr txBox="1"/>
+          <p:nvPr/>
+        </p:nvSpPr>
+        <p:spPr>
+          <a:xfrm>
+            <a:off x="3165295" y="963031"/>
+            <a:ext cx="2704981" cy="307777"/>
+          </a:xfrm>
+          <a:prstGeom prst="rect">
+            <a:avLst/>
+          </a:prstGeom>
+          <a:noFill/>
+        </p:spPr>
+        <p:txBody>
+          <a:bodyPr wrap="square" rtlCol="0">
+            <a:spAutoFit/>
+          </a:bodyPr>
+          <a:lstStyle/>
+          <a:p>
+            <a:pPr algn="ctr"/>
+            <a:r>
+              <a:rPr lang="en-US" sz="1400" b="1" dirty="0"/>
+              <a:t>Ash.Changeset</a:t>
+            </a:r>
+          </a:p>
+        </p:txBody>
+      </p:sp>
+      <p:cxnSp>
+        <p:nvCxnSpPr>
+          <p:cNvPr id="35" name="Straight Arrow Connector 34">
+            <a:extLst>
+              <a:ext uri="{FF2B5EF4-FFF2-40B4-BE49-F238E27FC236}">
+                <a16:creationId xmlns:a16="http://schemas.microsoft.com/office/drawing/2014/main" id="{DCBA0951-1620-FC82-32FD-424D1462AF52}"/>
+              </a:ext>
+            </a:extLst>
+          </p:cNvPr>
+          <p:cNvCxnSpPr>
+            <a:cxnSpLocks/>
+          </p:cNvCxnSpPr>
+          <p:nvPr/>
+        </p:nvCxnSpPr>
+        <p:spPr>
+          <a:xfrm>
+            <a:off x="5492496" y="1450848"/>
+            <a:ext cx="646176" cy="0"/>
+          </a:xfrm>
+          <a:prstGeom prst="straightConnector1">
+            <a:avLst/>
+          </a:prstGeom>
+          <a:ln w="19050">
+            <a:solidFill>
+              <a:srgbClr val="FFC000"/>
+            </a:solidFill>
+            <a:headEnd type="oval"/>
+            <a:tailEnd type="triangle"/>
+          </a:ln>
+        </p:spPr>
+        <p:style>
+          <a:lnRef idx="1">
+            <a:schemeClr val="accent1"/>
+          </a:lnRef>
+          <a:fillRef idx="0">
+            <a:schemeClr val="accent1"/>
+          </a:fillRef>
+          <a:effectRef idx="0">
+            <a:schemeClr val="accent1"/>
+          </a:effectRef>
+          <a:fontRef idx="minor">
+            <a:schemeClr val="tx1"/>
+          </a:fontRef>
+        </p:style>
+      </p:cxnSp>
+      <p:cxnSp>
+        <p:nvCxnSpPr>
+          <p:cNvPr id="40" name="Straight Arrow Connector 39">
+            <a:extLst>
+              <a:ext uri="{FF2B5EF4-FFF2-40B4-BE49-F238E27FC236}">
+                <a16:creationId xmlns:a16="http://schemas.microsoft.com/office/drawing/2014/main" id="{B2B3F9AC-61CA-0B4A-35DE-9FD34C11306A}"/>
+              </a:ext>
+            </a:extLst>
+          </p:cNvPr>
+          <p:cNvCxnSpPr>
+            <a:cxnSpLocks/>
+          </p:cNvCxnSpPr>
+          <p:nvPr/>
+        </p:nvCxnSpPr>
+        <p:spPr>
+          <a:xfrm flipV="1">
+            <a:off x="2680778" y="2919984"/>
+            <a:ext cx="555416" cy="687437"/>
+          </a:xfrm>
+          <a:prstGeom prst="straightConnector1">
+            <a:avLst/>
+          </a:prstGeom>
+          <a:ln w="19050">
+            <a:solidFill>
+              <a:srgbClr val="FFC000"/>
+            </a:solidFill>
+            <a:headEnd type="oval"/>
+            <a:tailEnd type="triangle"/>
+          </a:ln>
+        </p:spPr>
+        <p:style>
+          <a:lnRef idx="1">
+            <a:schemeClr val="accent1"/>
+          </a:lnRef>
+          <a:fillRef idx="0">
+            <a:schemeClr val="accent1"/>
+          </a:fillRef>
+          <a:effectRef idx="0">
+            <a:schemeClr val="accent1"/>
+          </a:effectRef>
+          <a:fontRef idx="minor">
+            <a:schemeClr val="tx1"/>
+          </a:fontRef>
+        </p:style>
+      </p:cxnSp>
+      <p:pic>
+        <p:nvPicPr>
+          <p:cNvPr id="44" name="Picture 43">
+            <a:extLst>
+              <a:ext uri="{FF2B5EF4-FFF2-40B4-BE49-F238E27FC236}">
+                <a16:creationId xmlns:a16="http://schemas.microsoft.com/office/drawing/2014/main" id="{6B191CAB-7246-7B74-ED8B-2840129C7991}"/>
+              </a:ext>
+            </a:extLst>
+          </p:cNvPr>
+          <p:cNvPicPr>
+            <a:picLocks noChangeAspect="1"/>
+          </p:cNvPicPr>
+          <p:nvPr/>
+        </p:nvPicPr>
+        <p:blipFill>
+          <a:blip r:embed="rId5"/>
+          <a:stretch>
+            <a:fillRect/>
+          </a:stretch>
+        </p:blipFill>
+        <p:spPr>
+          <a:xfrm>
+            <a:off x="6016576" y="3788103"/>
+            <a:ext cx="5672157" cy="2454201"/>
+          </a:xfrm>
+          <a:prstGeom prst="rect">
+            <a:avLst/>
+          </a:prstGeom>
+        </p:spPr>
+      </p:pic>
+      <p:pic>
+        <p:nvPicPr>
+          <p:cNvPr id="45" name="Picture 44">
+            <a:extLst>
+              <a:ext uri="{FF2B5EF4-FFF2-40B4-BE49-F238E27FC236}">
+                <a16:creationId xmlns:a16="http://schemas.microsoft.com/office/drawing/2014/main" id="{04A7E198-9DA3-376F-7189-19DFC6116EA9}"/>
+              </a:ext>
+            </a:extLst>
+          </p:cNvPr>
+          <p:cNvPicPr>
+            <a:picLocks noChangeAspect="1"/>
+          </p:cNvPicPr>
+          <p:nvPr/>
+        </p:nvPicPr>
+        <p:blipFill>
+          <a:blip r:embed="rId6"/>
+          <a:stretch>
+            <a:fillRect/>
+          </a:stretch>
+        </p:blipFill>
+        <p:spPr>
+          <a:xfrm>
+            <a:off x="2680778" y="4238189"/>
+            <a:ext cx="2719225" cy="1675383"/>
+          </a:xfrm>
+          <a:prstGeom prst="rect">
+            <a:avLst/>
+          </a:prstGeom>
+          <a:ln>
+            <a:solidFill>
+              <a:schemeClr val="tx1">
+                <a:lumMod val="50000"/>
+                <a:lumOff val="50000"/>
+              </a:schemeClr>
+            </a:solidFill>
+          </a:ln>
+        </p:spPr>
+      </p:pic>
+      <p:cxnSp>
+        <p:nvCxnSpPr>
+          <p:cNvPr id="46" name="Straight Arrow Connector 45">
+            <a:extLst>
+              <a:ext uri="{FF2B5EF4-FFF2-40B4-BE49-F238E27FC236}">
+                <a16:creationId xmlns:a16="http://schemas.microsoft.com/office/drawing/2014/main" id="{E937A4E6-D643-3508-B59C-4F236E25E219}"/>
+              </a:ext>
+            </a:extLst>
+          </p:cNvPr>
+          <p:cNvCxnSpPr>
+            <a:cxnSpLocks/>
+          </p:cNvCxnSpPr>
+          <p:nvPr/>
+        </p:nvCxnSpPr>
+        <p:spPr>
+          <a:xfrm flipH="1">
+            <a:off x="4779264" y="4035552"/>
+            <a:ext cx="1359408" cy="335280"/>
+          </a:xfrm>
+          <a:prstGeom prst="straightConnector1">
+            <a:avLst/>
+          </a:prstGeom>
+          <a:ln w="19050">
+            <a:solidFill>
+              <a:srgbClr val="FFC000"/>
+            </a:solidFill>
+            <a:headEnd type="oval"/>
+            <a:tailEnd type="triangle"/>
+          </a:ln>
+        </p:spPr>
+        <p:style>
+          <a:lnRef idx="1">
+            <a:schemeClr val="accent1"/>
+          </a:lnRef>
+          <a:fillRef idx="0">
+            <a:schemeClr val="accent1"/>
+          </a:fillRef>
+          <a:effectRef idx="0">
+            <a:schemeClr val="accent1"/>
+          </a:effectRef>
+          <a:fontRef idx="minor">
+            <a:schemeClr val="tx1"/>
+          </a:fontRef>
+        </p:style>
+      </p:cxnSp>
+      <p:cxnSp>
+        <p:nvCxnSpPr>
+          <p:cNvPr id="49" name="Straight Arrow Connector 48">
+            <a:extLst>
+              <a:ext uri="{FF2B5EF4-FFF2-40B4-BE49-F238E27FC236}">
+                <a16:creationId xmlns:a16="http://schemas.microsoft.com/office/drawing/2014/main" id="{D079B10F-27DB-08A4-0103-1FEB13572997}"/>
+              </a:ext>
+            </a:extLst>
+          </p:cNvPr>
+          <p:cNvCxnSpPr>
+            <a:cxnSpLocks/>
+          </p:cNvCxnSpPr>
+          <p:nvPr/>
+        </p:nvCxnSpPr>
+        <p:spPr>
+          <a:xfrm flipH="1">
+            <a:off x="7552944" y="2336154"/>
+            <a:ext cx="308353" cy="2382150"/>
+          </a:xfrm>
+          <a:prstGeom prst="straightConnector1">
+            <a:avLst/>
+          </a:prstGeom>
+          <a:ln w="19050">
+            <a:solidFill>
+              <a:srgbClr val="FFC000"/>
+            </a:solidFill>
+            <a:headEnd type="oval"/>
+            <a:tailEnd type="triangle"/>
+          </a:ln>
+        </p:spPr>
+        <p:style>
+          <a:lnRef idx="1">
+            <a:schemeClr val="accent1"/>
+          </a:lnRef>
+          <a:fillRef idx="0">
+            <a:schemeClr val="accent1"/>
+          </a:fillRef>
+          <a:effectRef idx="0">
+            <a:schemeClr val="accent1"/>
+          </a:effectRef>
+          <a:fontRef idx="minor">
+            <a:schemeClr val="tx1"/>
+          </a:fontRef>
+        </p:style>
+      </p:cxnSp>
+      <p:cxnSp>
+        <p:nvCxnSpPr>
+          <p:cNvPr id="53" name="Straight Arrow Connector 52">
+            <a:extLst>
+              <a:ext uri="{FF2B5EF4-FFF2-40B4-BE49-F238E27FC236}">
+                <a16:creationId xmlns:a16="http://schemas.microsoft.com/office/drawing/2014/main" id="{DB377908-5530-69EA-4DF6-76316BE341F2}"/>
+              </a:ext>
+            </a:extLst>
+          </p:cNvPr>
+          <p:cNvCxnSpPr>
+            <a:cxnSpLocks/>
+          </p:cNvCxnSpPr>
+          <p:nvPr/>
+        </p:nvCxnSpPr>
+        <p:spPr>
+          <a:xfrm flipH="1" flipV="1">
+            <a:off x="7987461" y="2810256"/>
+            <a:ext cx="705435" cy="1863153"/>
+          </a:xfrm>
+          <a:prstGeom prst="straightConnector1">
+            <a:avLst/>
+          </a:prstGeom>
+          <a:ln w="19050">
+            <a:solidFill>
+              <a:srgbClr val="FF0000"/>
+            </a:solidFill>
+            <a:prstDash val="sysDot"/>
+            <a:headEnd type="oval"/>
+            <a:tailEnd type="triangle"/>
+          </a:ln>
+        </p:spPr>
+        <p:style>
+          <a:lnRef idx="1">
+            <a:schemeClr val="accent1"/>
+          </a:lnRef>
+          <a:fillRef idx="0">
+            <a:schemeClr val="accent1"/>
+          </a:fillRef>
+          <a:effectRef idx="0">
+            <a:schemeClr val="accent1"/>
+          </a:effectRef>
+          <a:fontRef idx="minor">
+            <a:schemeClr val="tx1"/>
+          </a:fontRef>
+        </p:style>
+      </p:cxnSp>
+      <p:cxnSp>
+        <p:nvCxnSpPr>
+          <p:cNvPr id="56" name="Straight Arrow Connector 55">
+            <a:extLst>
+              <a:ext uri="{FF2B5EF4-FFF2-40B4-BE49-F238E27FC236}">
+                <a16:creationId xmlns:a16="http://schemas.microsoft.com/office/drawing/2014/main" id="{E574CF71-A7CC-B521-EF27-392751A9AFB3}"/>
+              </a:ext>
+            </a:extLst>
+          </p:cNvPr>
+          <p:cNvCxnSpPr>
+            <a:cxnSpLocks/>
+          </p:cNvCxnSpPr>
+          <p:nvPr/>
+        </p:nvCxnSpPr>
+        <p:spPr>
+          <a:xfrm flipH="1" flipV="1">
+            <a:off x="7987461" y="3296550"/>
+            <a:ext cx="1827099" cy="1421754"/>
+          </a:xfrm>
+          <a:prstGeom prst="straightConnector1">
+            <a:avLst/>
+          </a:prstGeom>
+          <a:ln w="19050">
+            <a:solidFill>
+              <a:srgbClr val="FF0000"/>
+            </a:solidFill>
+            <a:prstDash val="sysDot"/>
+            <a:headEnd type="oval"/>
+            <a:tailEnd type="triangle"/>
+          </a:ln>
+        </p:spPr>
+        <p:style>
+          <a:lnRef idx="1">
+            <a:schemeClr val="accent1"/>
+          </a:lnRef>
+          <a:fillRef idx="0">
+            <a:schemeClr val="accent1"/>
+          </a:fillRef>
+          <a:effectRef idx="0">
+            <a:schemeClr val="accent1"/>
+          </a:effectRef>
+          <a:fontRef idx="minor">
+            <a:schemeClr val="tx1"/>
+          </a:fontRef>
+        </p:style>
+      </p:cxnSp>
+      <p:sp>
+        <p:nvSpPr>
+          <p:cNvPr id="60" name="Right Brace 59">
+            <a:extLst>
+              <a:ext uri="{FF2B5EF4-FFF2-40B4-BE49-F238E27FC236}">
+                <a16:creationId xmlns:a16="http://schemas.microsoft.com/office/drawing/2014/main" id="{D6BB6E46-8114-AC79-B10F-FC6CA93E2BCC}"/>
+              </a:ext>
+            </a:extLst>
+          </p:cNvPr>
+          <p:cNvSpPr/>
+          <p:nvPr/>
+        </p:nvSpPr>
+        <p:spPr>
+          <a:xfrm>
+            <a:off x="5321808" y="4774637"/>
+            <a:ext cx="216408" cy="896112"/>
+          </a:xfrm>
+          <a:prstGeom prst="rightBrace">
+            <a:avLst>
+              <a:gd name="adj1" fmla="val 26389"/>
+              <a:gd name="adj2" fmla="val 50000"/>
+            </a:avLst>
+          </a:prstGeom>
+          <a:ln w="19050">
+            <a:solidFill>
+              <a:schemeClr val="tx1">
+                <a:lumMod val="85000"/>
+                <a:lumOff val="15000"/>
+              </a:schemeClr>
+            </a:solidFill>
+            <a:prstDash val="sysDot"/>
+          </a:ln>
+        </p:spPr>
+        <p:style>
+          <a:lnRef idx="1">
+            <a:schemeClr val="accent1"/>
+          </a:lnRef>
+          <a:fillRef idx="0">
+            <a:schemeClr val="accent1"/>
+          </a:fillRef>
+          <a:effectRef idx="0">
+            <a:schemeClr val="accent1"/>
+          </a:effectRef>
+          <a:fontRef idx="minor">
+            <a:schemeClr val="tx1"/>
+          </a:fontRef>
+        </p:style>
+        <p:txBody>
+          <a:bodyPr rtlCol="0" anchor="ctr"/>
+          <a:lstStyle/>
+          <a:p>
+            <a:pPr algn="ctr"/>
+            <a:endParaRPr lang="en-US"/>
+          </a:p>
+        </p:txBody>
+      </p:sp>
+      <p:cxnSp>
+        <p:nvCxnSpPr>
+          <p:cNvPr id="61" name="Straight Arrow Connector 60">
+            <a:extLst>
+              <a:ext uri="{FF2B5EF4-FFF2-40B4-BE49-F238E27FC236}">
+                <a16:creationId xmlns:a16="http://schemas.microsoft.com/office/drawing/2014/main" id="{151B522C-2C4F-E5EB-A1D6-AFDE2E480446}"/>
+              </a:ext>
+            </a:extLst>
+          </p:cNvPr>
+          <p:cNvCxnSpPr>
+            <a:cxnSpLocks/>
+          </p:cNvCxnSpPr>
+          <p:nvPr/>
+        </p:nvCxnSpPr>
+        <p:spPr>
+          <a:xfrm flipV="1">
+            <a:off x="5536916" y="5047714"/>
+            <a:ext cx="882172" cy="164366"/>
+          </a:xfrm>
+          <a:prstGeom prst="straightConnector1">
+            <a:avLst/>
+          </a:prstGeom>
+          <a:ln w="19050">
+            <a:solidFill>
+              <a:schemeClr val="accent1">
+                <a:lumMod val="40000"/>
+                <a:lumOff val="60000"/>
+              </a:schemeClr>
+            </a:solidFill>
+            <a:prstDash val="sysDot"/>
+            <a:headEnd type="triangle"/>
+            <a:tailEnd type="oval"/>
+          </a:ln>
+        </p:spPr>
+        <p:style>
+          <a:lnRef idx="1">
+            <a:schemeClr val="accent1"/>
+          </a:lnRef>
+          <a:fillRef idx="0">
+            <a:schemeClr val="accent1"/>
+          </a:fillRef>
+          <a:effectRef idx="0">
+            <a:schemeClr val="accent1"/>
+          </a:effectRef>
+          <a:fontRef idx="minor">
+            <a:schemeClr val="tx1"/>
+          </a:fontRef>
+        </p:style>
+      </p:cxnSp>
+      <p:sp>
+        <p:nvSpPr>
+          <p:cNvPr id="64" name="TextBox 63">
+            <a:extLst>
+              <a:ext uri="{FF2B5EF4-FFF2-40B4-BE49-F238E27FC236}">
+                <a16:creationId xmlns:a16="http://schemas.microsoft.com/office/drawing/2014/main" id="{DA426285-89CE-6BE9-53B1-978A2C135ECA}"/>
+              </a:ext>
+            </a:extLst>
+          </p:cNvPr>
+          <p:cNvSpPr txBox="1"/>
+          <p:nvPr/>
+        </p:nvSpPr>
+        <p:spPr>
+          <a:xfrm>
+            <a:off x="5987915" y="976920"/>
+            <a:ext cx="5740789" cy="307777"/>
+          </a:xfrm>
+          <a:prstGeom prst="rect">
+            <a:avLst/>
+          </a:prstGeom>
+          <a:noFill/>
+        </p:spPr>
+        <p:txBody>
+          <a:bodyPr wrap="square" rtlCol="0">
+            <a:spAutoFit/>
+          </a:bodyPr>
+          <a:lstStyle/>
+          <a:p>
+            <a:pPr algn="ctr"/>
+            <a:r>
+              <a:rPr lang="en-US" sz="1400" b="1" dirty="0" err="1"/>
+              <a:t>Phoenix.LiveView</a:t>
+            </a:r>
+            <a:endParaRPr lang="en-US" sz="1400" b="1" dirty="0"/>
+          </a:p>
+        </p:txBody>
+      </p:sp>
+    </p:spTree>
+    <p:extLst>
+      <p:ext uri="{BB962C8B-B14F-4D97-AF65-F5344CB8AC3E}">
+        <p14:creationId xmlns:p14="http://schemas.microsoft.com/office/powerpoint/2010/main" val="2009814433"/>
+      </p:ext>
+    </p:extLst>
+  </p:cSld>
+  <p:clrMapOvr>
+    <a:masterClrMapping/>
+  </p:clrMapOvr>
+</p:sld>
+</file>
+
+<file path=ppt/slides/slide14.xml><?xml version="1.0" encoding="utf-8"?>
+<p:sld xmlns:a="http://schemas.openxmlformats.org/drawingml/2006/main" xmlns:r="http://schemas.openxmlformats.org/officeDocument/2006/relationships" xmlns:p="http://schemas.openxmlformats.org/presentationml/2006/main">
+  <p:cSld>
+    <p:spTree>
+      <p:nvGrpSpPr>
+        <p:cNvPr id="1" name=""/>
+        <p:cNvGrpSpPr/>
+        <p:nvPr/>
+      </p:nvGrpSpPr>
+      <p:grpSpPr>
+        <a:xfrm>
+          <a:off x="0" y="0"/>
+          <a:ext cx="0" cy="0"/>
+          <a:chOff x="0" y="0"/>
+          <a:chExt cx="0" cy="0"/>
+        </a:xfrm>
+      </p:grpSpPr>
+      <p:sp>
+        <p:nvSpPr>
+          <p:cNvPr id="6" name="TextBox 5">
+            <a:extLst>
+              <a:ext uri="{FF2B5EF4-FFF2-40B4-BE49-F238E27FC236}">
+                <a16:creationId xmlns:a16="http://schemas.microsoft.com/office/drawing/2014/main" id="{9399A366-7517-3584-26FF-1EF0A7097BE9}"/>
+              </a:ext>
+            </a:extLst>
+          </p:cNvPr>
+          <p:cNvSpPr txBox="1"/>
+          <p:nvPr/>
+        </p:nvSpPr>
+        <p:spPr>
+          <a:xfrm>
+            <a:off x="1584641" y="235839"/>
+            <a:ext cx="1678488" cy="307777"/>
+          </a:xfrm>
+          <a:prstGeom prst="rect">
+            <a:avLst/>
+          </a:prstGeom>
+          <a:noFill/>
+        </p:spPr>
+        <p:txBody>
+          <a:bodyPr wrap="square" rtlCol="0">
+            <a:spAutoFit/>
+          </a:bodyPr>
+          <a:lstStyle/>
+          <a:p>
+            <a:pPr algn="ctr"/>
+            <a:r>
+              <a:rPr lang="en-US" sz="1400" b="1" dirty="0"/>
+              <a:t>Ash.Changeset</a:t>
+            </a:r>
+          </a:p>
+        </p:txBody>
+      </p:sp>
+      <p:sp>
+        <p:nvSpPr>
+          <p:cNvPr id="7" name="TextBox 6">
+            <a:extLst>
+              <a:ext uri="{FF2B5EF4-FFF2-40B4-BE49-F238E27FC236}">
+                <a16:creationId xmlns:a16="http://schemas.microsoft.com/office/drawing/2014/main" id="{4C6415AF-217F-E74C-5DA2-E232C6BF4E4E}"/>
+              </a:ext>
+            </a:extLst>
+          </p:cNvPr>
+          <p:cNvSpPr txBox="1"/>
+          <p:nvPr/>
+        </p:nvSpPr>
+        <p:spPr>
+          <a:xfrm>
+            <a:off x="3104272" y="235839"/>
+            <a:ext cx="2311150" cy="477054"/>
+          </a:xfrm>
+          <a:prstGeom prst="rect">
+            <a:avLst/>
+          </a:prstGeom>
+          <a:noFill/>
+        </p:spPr>
+        <p:txBody>
+          <a:bodyPr wrap="square" rtlCol="0">
+            <a:spAutoFit/>
+          </a:bodyPr>
+          <a:lstStyle/>
+          <a:p>
+            <a:pPr algn="ctr"/>
+            <a:r>
+              <a:rPr lang="en-US" sz="1400" b="1" dirty="0"/>
+              <a:t>Relationship Input Params</a:t>
+            </a:r>
+          </a:p>
+          <a:p>
+            <a:pPr algn="ctr"/>
+            <a:r>
+              <a:rPr lang="en-US" sz="1100" dirty="0"/>
+              <a:t>%{} or [map] or Ash.Identity</a:t>
+            </a:r>
+            <a:endParaRPr lang="en-US" sz="1400" dirty="0"/>
+          </a:p>
+        </p:txBody>
+      </p:sp>
+      <p:sp>
+        <p:nvSpPr>
+          <p:cNvPr id="10" name="TextBox 9">
+            <a:extLst>
+              <a:ext uri="{FF2B5EF4-FFF2-40B4-BE49-F238E27FC236}">
+                <a16:creationId xmlns:a16="http://schemas.microsoft.com/office/drawing/2014/main" id="{85CDACF2-2959-462E-9BD5-2868FFFB1C0D}"/>
+              </a:ext>
+            </a:extLst>
+          </p:cNvPr>
+          <p:cNvSpPr txBox="1"/>
+          <p:nvPr/>
+        </p:nvSpPr>
+        <p:spPr>
+          <a:xfrm>
+            <a:off x="7033835" y="880526"/>
+            <a:ext cx="2151577" cy="261610"/>
+          </a:xfrm>
+          <a:prstGeom prst="rect">
+            <a:avLst/>
+          </a:prstGeom>
+          <a:noFill/>
+        </p:spPr>
+        <p:txBody>
+          <a:bodyPr wrap="square" rtlCol="0">
+            <a:spAutoFit/>
+          </a:bodyPr>
+          <a:lstStyle/>
+          <a:p>
+            <a:pPr algn="ctr"/>
+            <a:r>
+              <a:rPr lang="en-US" sz="1050" b="1" dirty="0"/>
+              <a:t>Structure</a:t>
+            </a:r>
+          </a:p>
+        </p:txBody>
+      </p:sp>
+      <p:sp>
+        <p:nvSpPr>
+          <p:cNvPr id="2" name="Can 1">
+            <a:extLst>
+              <a:ext uri="{FF2B5EF4-FFF2-40B4-BE49-F238E27FC236}">
+                <a16:creationId xmlns:a16="http://schemas.microsoft.com/office/drawing/2014/main" id="{B63CB259-64B5-3A08-44D6-AEE97341C32D}"/>
+              </a:ext>
+            </a:extLst>
+          </p:cNvPr>
+          <p:cNvSpPr/>
+          <p:nvPr/>
+        </p:nvSpPr>
+        <p:spPr>
+          <a:xfrm>
+            <a:off x="1802093" y="1493181"/>
+            <a:ext cx="621792" cy="664803"/>
+          </a:xfrm>
+          <a:prstGeom prst="can">
+            <a:avLst/>
+          </a:prstGeom>
+          <a:solidFill>
+            <a:schemeClr val="accent4">
+              <a:lumMod val="75000"/>
+            </a:schemeClr>
+          </a:solidFill>
+        </p:spPr>
+        <p:style>
+          <a:lnRef idx="2">
+            <a:schemeClr val="accent1">
+              <a:shade val="50000"/>
+            </a:schemeClr>
+          </a:lnRef>
+          <a:fillRef idx="1">
+            <a:schemeClr val="accent1"/>
+          </a:fillRef>
+          <a:effectRef idx="0">
+            <a:schemeClr val="accent1"/>
+          </a:effectRef>
+          <a:fontRef idx="minor">
+            <a:schemeClr val="lt1"/>
+          </a:fontRef>
+        </p:style>
+        <p:txBody>
+          <a:bodyPr rtlCol="0" anchor="ctr"/>
+          <a:lstStyle/>
+          <a:p>
+            <a:pPr algn="ctr"/>
+            <a:endParaRPr lang="en-US"/>
+          </a:p>
+        </p:txBody>
+      </p:sp>
+      <p:pic>
+        <p:nvPicPr>
+          <p:cNvPr id="3" name="Picture 2">
+            <a:extLst>
+              <a:ext uri="{FF2B5EF4-FFF2-40B4-BE49-F238E27FC236}">
+                <a16:creationId xmlns:a16="http://schemas.microsoft.com/office/drawing/2014/main" id="{89DF3245-873D-6146-6BCC-B8D865EA5257}"/>
+              </a:ext>
+            </a:extLst>
+          </p:cNvPr>
+          <p:cNvPicPr>
+            <a:picLocks noChangeAspect="1"/>
+          </p:cNvPicPr>
+          <p:nvPr/>
+        </p:nvPicPr>
+        <p:blipFill>
+          <a:blip r:embed="rId2"/>
+          <a:stretch>
+            <a:fillRect/>
+          </a:stretch>
+        </p:blipFill>
+        <p:spPr>
+          <a:xfrm>
+            <a:off x="7033837" y="1094062"/>
+            <a:ext cx="2151578" cy="1372869"/>
+          </a:xfrm>
+          <a:prstGeom prst="rect">
+            <a:avLst/>
+          </a:prstGeom>
+          <a:ln>
+            <a:solidFill>
+              <a:schemeClr val="tx1">
+                <a:lumMod val="50000"/>
+                <a:lumOff val="50000"/>
+              </a:schemeClr>
+            </a:solidFill>
+          </a:ln>
+        </p:spPr>
+      </p:pic>
+      <p:sp>
+        <p:nvSpPr>
+          <p:cNvPr id="13" name="TextBox 12">
+            <a:extLst>
+              <a:ext uri="{FF2B5EF4-FFF2-40B4-BE49-F238E27FC236}">
+                <a16:creationId xmlns:a16="http://schemas.microsoft.com/office/drawing/2014/main" id="{45122E87-9BE2-1728-4B65-BDBE83161143}"/>
+              </a:ext>
+            </a:extLst>
+          </p:cNvPr>
+          <p:cNvSpPr txBox="1"/>
+          <p:nvPr/>
+        </p:nvSpPr>
+        <p:spPr>
+          <a:xfrm>
+            <a:off x="7033836" y="3235874"/>
+            <a:ext cx="2151577" cy="261610"/>
+          </a:xfrm>
+          <a:prstGeom prst="rect">
+            <a:avLst/>
+          </a:prstGeom>
+          <a:noFill/>
+        </p:spPr>
+        <p:txBody>
+          <a:bodyPr wrap="square" rtlCol="0">
+            <a:spAutoFit/>
+          </a:bodyPr>
+          <a:lstStyle/>
+          <a:p>
+            <a:pPr algn="ctr"/>
+            <a:r>
+              <a:rPr lang="en-US" sz="1050" b="1" dirty="0"/>
+              <a:t>Actions</a:t>
+            </a:r>
+          </a:p>
+        </p:txBody>
+      </p:sp>
+      <p:sp>
+        <p:nvSpPr>
+          <p:cNvPr id="11" name="TextBox 10">
+            <a:extLst>
+              <a:ext uri="{FF2B5EF4-FFF2-40B4-BE49-F238E27FC236}">
+                <a16:creationId xmlns:a16="http://schemas.microsoft.com/office/drawing/2014/main" id="{8D82ADE9-D219-CAD6-A208-C0A7A76A3CC5}"/>
+              </a:ext>
+            </a:extLst>
+          </p:cNvPr>
+          <p:cNvSpPr txBox="1"/>
+          <p:nvPr/>
+        </p:nvSpPr>
+        <p:spPr>
+          <a:xfrm>
+            <a:off x="7033836" y="2680466"/>
+            <a:ext cx="2151577" cy="556509"/>
+          </a:xfrm>
+          <a:prstGeom prst="rect">
+            <a:avLst/>
+          </a:prstGeom>
+          <a:noFill/>
+          <a:ln>
+            <a:solidFill>
+              <a:schemeClr val="tx1">
+                <a:lumMod val="50000"/>
+                <a:lumOff val="50000"/>
+              </a:schemeClr>
+            </a:solidFill>
+          </a:ln>
+        </p:spPr>
+        <p:txBody>
+          <a:bodyPr wrap="square" rtlCol="0">
+            <a:spAutoFit/>
+          </a:bodyPr>
+          <a:lstStyle/>
+          <a:p>
+            <a:pPr marL="171450" indent="-171450">
+              <a:buFont typeface="Arial" panose="020B0604020202020204" pitchFamily="34" charset="0"/>
+              <a:buChar char="•"/>
+            </a:pPr>
+            <a:r>
+              <a:rPr lang="en-US" sz="1000" dirty="0"/>
+              <a:t>Required</a:t>
+            </a:r>
+          </a:p>
+          <a:p>
+            <a:pPr marL="171450" indent="-171450">
+              <a:buFont typeface="Arial" panose="020B0604020202020204" pitchFamily="34" charset="0"/>
+              <a:buChar char="•"/>
+            </a:pPr>
+            <a:r>
+              <a:rPr lang="en-US" sz="1000" dirty="0"/>
+              <a:t>Min length</a:t>
+            </a:r>
+          </a:p>
+          <a:p>
+            <a:pPr marL="171450" indent="-171450">
+              <a:buFont typeface="Arial" panose="020B0604020202020204" pitchFamily="34" charset="0"/>
+              <a:buChar char="•"/>
+            </a:pPr>
+            <a:r>
+              <a:rPr lang="en-US" sz="1000" dirty="0"/>
+              <a:t>Confirm Password</a:t>
+            </a:r>
+          </a:p>
+        </p:txBody>
+      </p:sp>
+      <p:sp>
+        <p:nvSpPr>
+          <p:cNvPr id="16" name="TextBox 15">
+            <a:extLst>
+              <a:ext uri="{FF2B5EF4-FFF2-40B4-BE49-F238E27FC236}">
+                <a16:creationId xmlns:a16="http://schemas.microsoft.com/office/drawing/2014/main" id="{A5ECEF05-1EDB-D8CB-E576-F88417BE55D3}"/>
+              </a:ext>
+            </a:extLst>
+          </p:cNvPr>
+          <p:cNvSpPr txBox="1"/>
+          <p:nvPr/>
+        </p:nvSpPr>
+        <p:spPr>
+          <a:xfrm>
+            <a:off x="7033835" y="2463883"/>
+            <a:ext cx="2151578" cy="261610"/>
+          </a:xfrm>
+          <a:prstGeom prst="rect">
+            <a:avLst/>
+          </a:prstGeom>
+          <a:noFill/>
+        </p:spPr>
+        <p:txBody>
+          <a:bodyPr wrap="square" rtlCol="0">
+            <a:spAutoFit/>
+          </a:bodyPr>
+          <a:lstStyle/>
+          <a:p>
+            <a:pPr algn="ctr"/>
+            <a:r>
+              <a:rPr lang="en-US" sz="1050" b="1" dirty="0"/>
+              <a:t>Validations</a:t>
+            </a:r>
+          </a:p>
+        </p:txBody>
+      </p:sp>
+      <p:sp>
+        <p:nvSpPr>
+          <p:cNvPr id="17" name="TextBox 16">
+            <a:extLst>
+              <a:ext uri="{FF2B5EF4-FFF2-40B4-BE49-F238E27FC236}">
+                <a16:creationId xmlns:a16="http://schemas.microsoft.com/office/drawing/2014/main" id="{738CF699-A48C-D4C6-31E0-7598012D2BC6}"/>
+              </a:ext>
+            </a:extLst>
+          </p:cNvPr>
+          <p:cNvSpPr txBox="1"/>
+          <p:nvPr/>
+        </p:nvSpPr>
+        <p:spPr>
+          <a:xfrm>
+            <a:off x="7033836" y="3429000"/>
+            <a:ext cx="2151577" cy="556509"/>
+          </a:xfrm>
+          <a:prstGeom prst="rect">
+            <a:avLst/>
+          </a:prstGeom>
+          <a:noFill/>
+          <a:ln>
+            <a:solidFill>
+              <a:schemeClr val="tx1">
+                <a:lumMod val="50000"/>
+                <a:lumOff val="50000"/>
+              </a:schemeClr>
+            </a:solidFill>
+          </a:ln>
+        </p:spPr>
+        <p:txBody>
+          <a:bodyPr wrap="square" rtlCol="0">
+            <a:spAutoFit/>
+          </a:bodyPr>
+          <a:lstStyle/>
+          <a:p>
+            <a:pPr marL="171450" indent="-171450">
+              <a:buFont typeface="Arial" panose="020B0604020202020204" pitchFamily="34" charset="0"/>
+              <a:buChar char="•"/>
+            </a:pPr>
+            <a:r>
+              <a:rPr lang="en-US" sz="1000" dirty="0"/>
+              <a:t>Required</a:t>
+            </a:r>
+          </a:p>
+          <a:p>
+            <a:pPr marL="171450" indent="-171450">
+              <a:buFont typeface="Arial" panose="020B0604020202020204" pitchFamily="34" charset="0"/>
+              <a:buChar char="•"/>
+            </a:pPr>
+            <a:r>
+              <a:rPr lang="en-US" sz="1000" dirty="0"/>
+              <a:t>Min length</a:t>
+            </a:r>
+          </a:p>
+          <a:p>
+            <a:pPr marL="171450" indent="-171450">
+              <a:buFont typeface="Arial" panose="020B0604020202020204" pitchFamily="34" charset="0"/>
+              <a:buChar char="•"/>
+            </a:pPr>
+            <a:r>
+              <a:rPr lang="en-US" sz="1000" dirty="0"/>
+              <a:t>Confirm Password</a:t>
+            </a:r>
+          </a:p>
+        </p:txBody>
+      </p:sp>
+    </p:spTree>
+    <p:extLst>
+      <p:ext uri="{BB962C8B-B14F-4D97-AF65-F5344CB8AC3E}">
+        <p14:creationId xmlns:p14="http://schemas.microsoft.com/office/powerpoint/2010/main" val="951073479"/>
       </p:ext>
     </p:extLst>
   </p:cSld>
@@ -5014,116 +6457,12 @@
           <a:chExt cx="0" cy="0"/>
         </a:xfrm>
       </p:grpSpPr>
-      <p:sp>
-        <p:nvSpPr>
-          <p:cNvPr id="6" name="TextBox 5">
-            <a:extLst>
-              <a:ext uri="{FF2B5EF4-FFF2-40B4-BE49-F238E27FC236}">
-                <a16:creationId xmlns:a16="http://schemas.microsoft.com/office/drawing/2014/main" id="{9399A366-7517-3584-26FF-1EF0A7097BE9}"/>
-              </a:ext>
-            </a:extLst>
-          </p:cNvPr>
-          <p:cNvSpPr txBox="1"/>
-          <p:nvPr/>
-        </p:nvSpPr>
-        <p:spPr>
-          <a:xfrm>
-            <a:off x="158755" y="466672"/>
-            <a:ext cx="4891792" cy="246221"/>
-          </a:xfrm>
-          <a:prstGeom prst="rect">
-            <a:avLst/>
-          </a:prstGeom>
-          <a:noFill/>
-        </p:spPr>
-        <p:txBody>
-          <a:bodyPr wrap="square" rtlCol="0">
-            <a:spAutoFit/>
-          </a:bodyPr>
-          <a:lstStyle/>
-          <a:p>
-            <a:pPr algn="ctr"/>
-            <a:r>
-              <a:rPr lang="en-US" sz="1000" dirty="0" err="1">
-                <a:latin typeface="Courier New" panose="02070309020205020404" pitchFamily="49" charset="0"/>
-                <a:cs typeface="Courier New" panose="02070309020205020404" pitchFamily="49" charset="0"/>
-              </a:rPr>
-              <a:t>Form.for_update</a:t>
-            </a:r>
-            <a:r>
-              <a:rPr lang="en-US" sz="1000" dirty="0">
-                <a:latin typeface="Courier New" panose="02070309020205020404" pitchFamily="49" charset="0"/>
-                <a:cs typeface="Courier New" panose="02070309020205020404" pitchFamily="49" charset="0"/>
-              </a:rPr>
-              <a:t>(resource, action, </a:t>
-            </a:r>
-            <a:r>
-              <a:rPr lang="en-US" sz="1000" dirty="0" err="1">
-                <a:latin typeface="Courier New" panose="02070309020205020404" pitchFamily="49" charset="0"/>
-                <a:cs typeface="Courier New" panose="02070309020205020404" pitchFamily="49" charset="0"/>
-              </a:rPr>
-              <a:t>api</a:t>
-            </a:r>
-            <a:r>
-              <a:rPr lang="en-US" sz="1000" dirty="0">
-                <a:latin typeface="Courier New" panose="02070309020205020404" pitchFamily="49" charset="0"/>
-                <a:cs typeface="Courier New" panose="02070309020205020404" pitchFamily="49" charset="0"/>
-              </a:rPr>
-              <a:t>, form: [auto?: true[)</a:t>
-            </a:r>
-          </a:p>
-        </p:txBody>
-      </p:sp>
-      <p:sp>
-        <p:nvSpPr>
-          <p:cNvPr id="7" name="TextBox 6">
-            <a:extLst>
-              <a:ext uri="{FF2B5EF4-FFF2-40B4-BE49-F238E27FC236}">
-                <a16:creationId xmlns:a16="http://schemas.microsoft.com/office/drawing/2014/main" id="{4C6415AF-217F-E74C-5DA2-E232C6BF4E4E}"/>
-              </a:ext>
-            </a:extLst>
-          </p:cNvPr>
-          <p:cNvSpPr txBox="1"/>
-          <p:nvPr/>
-        </p:nvSpPr>
-        <p:spPr>
-          <a:xfrm>
-            <a:off x="9817688" y="151200"/>
-            <a:ext cx="2311150" cy="477054"/>
-          </a:xfrm>
-          <a:prstGeom prst="rect">
-            <a:avLst/>
-          </a:prstGeom>
-          <a:noFill/>
-        </p:spPr>
-        <p:txBody>
-          <a:bodyPr wrap="square" rtlCol="0">
-            <a:spAutoFit/>
-          </a:bodyPr>
-          <a:lstStyle/>
-          <a:p>
-            <a:pPr algn="ctr"/>
-            <a:r>
-              <a:rPr lang="en-US" sz="1400" b="1" dirty="0"/>
-              <a:t>Relationship Input Params</a:t>
-            </a:r>
-          </a:p>
-          <a:p>
-            <a:pPr algn="ctr"/>
-            <a:r>
-              <a:rPr lang="en-US" sz="1100" dirty="0"/>
-              <a:t>%{} or [map] or Ash.Identity</a:t>
-            </a:r>
-            <a:endParaRPr lang="en-US" sz="1400" dirty="0"/>
-          </a:p>
-        </p:txBody>
-      </p:sp>
       <p:pic>
         <p:nvPicPr>
           <p:cNvPr id="2" name="Picture 1">
             <a:extLst>
               <a:ext uri="{FF2B5EF4-FFF2-40B4-BE49-F238E27FC236}">
-                <a16:creationId xmlns:a16="http://schemas.microsoft.com/office/drawing/2014/main" id="{4E7F7B9F-D6E0-EF06-FF02-7E4CEBB95123}"/>
+                <a16:creationId xmlns:a16="http://schemas.microsoft.com/office/drawing/2014/main" id="{C1487198-578D-6D0F-D365-31273830A398}"/>
               </a:ext>
             </a:extLst>
           </p:cNvPr>
@@ -5133,55 +6472,33 @@
           <p:nvPr/>
         </p:nvPicPr>
         <p:blipFill>
-          <a:blip r:embed="rId3"/>
+          <a:blip r:embed="rId2"/>
           <a:stretch>
             <a:fillRect/>
           </a:stretch>
         </p:blipFill>
         <p:spPr>
           <a:xfrm>
-            <a:off x="158755" y="712893"/>
-            <a:ext cx="4990114" cy="5891107"/>
+            <a:off x="1231392" y="1034163"/>
+            <a:ext cx="7784592" cy="4183269"/>
           </a:xfrm>
           <a:prstGeom prst="rect">
             <a:avLst/>
           </a:prstGeom>
-        </p:spPr>
-      </p:pic>
-      <p:pic>
-        <p:nvPicPr>
-          <p:cNvPr id="11" name="Picture 10">
-            <a:extLst>
-              <a:ext uri="{FF2B5EF4-FFF2-40B4-BE49-F238E27FC236}">
-                <a16:creationId xmlns:a16="http://schemas.microsoft.com/office/drawing/2014/main" id="{B5E811E4-C951-603C-3B4F-B2D24F68BB97}"/>
-              </a:ext>
-            </a:extLst>
-          </p:cNvPr>
-          <p:cNvPicPr>
-            <a:picLocks noChangeAspect="1"/>
-          </p:cNvPicPr>
-          <p:nvPr/>
-        </p:nvPicPr>
-        <p:blipFill>
-          <a:blip r:embed="rId4"/>
-          <a:stretch>
-            <a:fillRect/>
-          </a:stretch>
-        </p:blipFill>
-        <p:spPr>
-          <a:xfrm>
-            <a:off x="5317199" y="712893"/>
-            <a:ext cx="6279365" cy="2869223"/>
-          </a:xfrm>
-          <a:prstGeom prst="rect">
-            <a:avLst/>
-          </a:prstGeom>
+          <a:ln>
+            <a:solidFill>
+              <a:schemeClr val="tx1">
+                <a:lumMod val="50000"/>
+                <a:lumOff val="50000"/>
+              </a:schemeClr>
+            </a:solidFill>
+          </a:ln>
         </p:spPr>
       </p:pic>
     </p:spTree>
     <p:extLst>
       <p:ext uri="{BB962C8B-B14F-4D97-AF65-F5344CB8AC3E}">
-        <p14:creationId xmlns:p14="http://schemas.microsoft.com/office/powerpoint/2010/main" val="2394609192"/>
+        <p14:creationId xmlns:p14="http://schemas.microsoft.com/office/powerpoint/2010/main" val="2504116159"/>
       </p:ext>
     </p:extLst>
   </p:cSld>
@@ -5222,8 +6539,8 @@
         </p:nvSpPr>
         <p:spPr>
           <a:xfrm>
-            <a:off x="6014127" y="1051114"/>
-            <a:ext cx="1449565" cy="246221"/>
+            <a:off x="158755" y="466672"/>
+            <a:ext cx="4891792" cy="246221"/>
           </a:xfrm>
           <a:prstGeom prst="rect">
             <a:avLst/>
@@ -5238,11 +6555,32 @@
           <a:p>
             <a:pPr algn="ctr"/>
             <a:r>
+              <a:rPr lang="en-US" sz="1000" dirty="0" err="1">
+                <a:latin typeface="Courier New" panose="02070309020205020404" pitchFamily="49" charset="0"/>
+                <a:cs typeface="Courier New" panose="02070309020205020404" pitchFamily="49" charset="0"/>
+              </a:rPr>
+              <a:t>Form.for_update</a:t>
+            </a:r>
+            <a:r>
               <a:rPr lang="en-US" sz="1000" dirty="0">
                 <a:latin typeface="Courier New" panose="02070309020205020404" pitchFamily="49" charset="0"/>
                 <a:cs typeface="Courier New" panose="02070309020205020404" pitchFamily="49" charset="0"/>
               </a:rPr>
-              <a:t>Event handlers</a:t>
+              <a:t>(resource, action, </a:t>
+            </a:r>
+            <a:r>
+              <a:rPr lang="en-US" sz="1000" dirty="0" err="1">
+                <a:latin typeface="Courier New" panose="02070309020205020404" pitchFamily="49" charset="0"/>
+                <a:cs typeface="Courier New" panose="02070309020205020404" pitchFamily="49" charset="0"/>
+              </a:rPr>
+              <a:t>api</a:t>
+            </a:r>
+            <a:r>
+              <a:rPr lang="en-US" sz="1000" dirty="0">
+                <a:latin typeface="Courier New" panose="02070309020205020404" pitchFamily="49" charset="0"/>
+                <a:cs typeface="Courier New" panose="02070309020205020404" pitchFamily="49" charset="0"/>
+              </a:rPr>
+              <a:t>, form: [auto?: true[)</a:t>
             </a:r>
           </a:p>
         </p:txBody>
@@ -5293,40 +6631,10 @@
       </p:sp>
       <p:pic>
         <p:nvPicPr>
-          <p:cNvPr id="3" name="Picture 2">
-            <a:extLst>
-              <a:ext uri="{FF2B5EF4-FFF2-40B4-BE49-F238E27FC236}">
-                <a16:creationId xmlns:a16="http://schemas.microsoft.com/office/drawing/2014/main" id="{43EF9DD1-8AB6-F7B1-2362-CEE69DF1E162}"/>
-              </a:ext>
-            </a:extLst>
-          </p:cNvPr>
-          <p:cNvPicPr>
-            <a:picLocks noChangeAspect="1"/>
-          </p:cNvPicPr>
-          <p:nvPr/>
-        </p:nvPicPr>
-        <p:blipFill>
-          <a:blip r:embed="rId2"/>
-          <a:stretch>
-            <a:fillRect/>
-          </a:stretch>
-        </p:blipFill>
-        <p:spPr>
-          <a:xfrm>
-            <a:off x="0" y="712893"/>
-            <a:ext cx="5369715" cy="5983574"/>
-          </a:xfrm>
-          <a:prstGeom prst="rect">
-            <a:avLst/>
-          </a:prstGeom>
-        </p:spPr>
-      </p:pic>
-      <p:pic>
-        <p:nvPicPr>
-          <p:cNvPr id="4" name="Picture 3">
-            <a:extLst>
-              <a:ext uri="{FF2B5EF4-FFF2-40B4-BE49-F238E27FC236}">
-                <a16:creationId xmlns:a16="http://schemas.microsoft.com/office/drawing/2014/main" id="{AF4E6C0B-C1DB-F690-F00F-129C7496FBF5}"/>
+          <p:cNvPr id="2" name="Picture 1">
+            <a:extLst>
+              <a:ext uri="{FF2B5EF4-FFF2-40B4-BE49-F238E27FC236}">
+                <a16:creationId xmlns:a16="http://schemas.microsoft.com/office/drawing/2014/main" id="{4E7F7B9F-D6E0-EF06-FF02-7E4CEBB95123}"/>
               </a:ext>
             </a:extLst>
           </p:cNvPr>
@@ -5343,116 +6651,48 @@
         </p:blipFill>
         <p:spPr>
           <a:xfrm>
-            <a:off x="6014128" y="1344246"/>
-            <a:ext cx="5420268" cy="2947865"/>
+            <a:off x="158755" y="712893"/>
+            <a:ext cx="4990114" cy="5891107"/>
           </a:xfrm>
           <a:prstGeom prst="rect">
             <a:avLst/>
           </a:prstGeom>
         </p:spPr>
       </p:pic>
-      <p:sp>
-        <p:nvSpPr>
-          <p:cNvPr id="8" name="TextBox 7">
-            <a:extLst>
-              <a:ext uri="{FF2B5EF4-FFF2-40B4-BE49-F238E27FC236}">
-                <a16:creationId xmlns:a16="http://schemas.microsoft.com/office/drawing/2014/main" id="{7A43F4EB-76C9-7A3E-A045-0D0A3E58F4D8}"/>
-              </a:ext>
-            </a:extLst>
-          </p:cNvPr>
-          <p:cNvSpPr txBox="1"/>
+      <p:pic>
+        <p:nvPicPr>
+          <p:cNvPr id="11" name="Picture 10">
+            <a:extLst>
+              <a:ext uri="{FF2B5EF4-FFF2-40B4-BE49-F238E27FC236}">
+                <a16:creationId xmlns:a16="http://schemas.microsoft.com/office/drawing/2014/main" id="{B5E811E4-C951-603C-3B4F-B2D24F68BB97}"/>
+              </a:ext>
+            </a:extLst>
+          </p:cNvPr>
+          <p:cNvPicPr>
+            <a:picLocks noChangeAspect="1"/>
+          </p:cNvPicPr>
           <p:nvPr/>
-        </p:nvSpPr>
-        <p:spPr>
-          <a:xfrm>
-            <a:off x="311155" y="619072"/>
-            <a:ext cx="4891792" cy="246221"/>
+        </p:nvPicPr>
+        <p:blipFill>
+          <a:blip r:embed="rId4"/>
+          <a:stretch>
+            <a:fillRect/>
+          </a:stretch>
+        </p:blipFill>
+        <p:spPr>
+          <a:xfrm>
+            <a:off x="5317199" y="712893"/>
+            <a:ext cx="6279365" cy="2869223"/>
           </a:xfrm>
           <a:prstGeom prst="rect">
             <a:avLst/>
           </a:prstGeom>
-          <a:noFill/>
-        </p:spPr>
-        <p:txBody>
-          <a:bodyPr wrap="square" rtlCol="0">
-            <a:spAutoFit/>
-          </a:bodyPr>
-          <a:lstStyle/>
-          <a:p>
-            <a:pPr algn="ctr"/>
-            <a:r>
-              <a:rPr lang="en-US" sz="1000" dirty="0" err="1">
-                <a:latin typeface="Courier New" panose="02070309020205020404" pitchFamily="49" charset="0"/>
-                <a:cs typeface="Courier New" panose="02070309020205020404" pitchFamily="49" charset="0"/>
-              </a:rPr>
-              <a:t>Form.add_form</a:t>
-            </a:r>
-            <a:r>
-              <a:rPr lang="en-US" sz="1000" dirty="0">
-                <a:latin typeface="Courier New" panose="02070309020205020404" pitchFamily="49" charset="0"/>
-                <a:cs typeface="Courier New" panose="02070309020205020404" pitchFamily="49" charset="0"/>
-              </a:rPr>
-              <a:t>() // for :new</a:t>
-            </a:r>
-          </a:p>
-        </p:txBody>
-      </p:sp>
-      <p:sp>
-        <p:nvSpPr>
-          <p:cNvPr id="9" name="TextBox 8">
-            <a:extLst>
-              <a:ext uri="{FF2B5EF4-FFF2-40B4-BE49-F238E27FC236}">
-                <a16:creationId xmlns:a16="http://schemas.microsoft.com/office/drawing/2014/main" id="{19741378-0132-B47D-F466-17F170E2C59E}"/>
-              </a:ext>
-            </a:extLst>
-          </p:cNvPr>
-          <p:cNvSpPr txBox="1"/>
-          <p:nvPr/>
-        </p:nvSpPr>
-        <p:spPr>
-          <a:xfrm>
-            <a:off x="191279" y="389727"/>
-            <a:ext cx="5904721" cy="246221"/>
-          </a:xfrm>
-          <a:prstGeom prst="rect">
-            <a:avLst/>
-          </a:prstGeom>
-          <a:noFill/>
-        </p:spPr>
-        <p:txBody>
-          <a:bodyPr wrap="square" rtlCol="0">
-            <a:spAutoFit/>
-          </a:bodyPr>
-          <a:lstStyle/>
-          <a:p>
-            <a:r>
-              <a:rPr lang="en-US" sz="1000" dirty="0">
-                <a:latin typeface="Courier New" panose="02070309020205020404" pitchFamily="49" charset="0"/>
-                <a:cs typeface="Courier New" panose="02070309020205020404" pitchFamily="49" charset="0"/>
-              </a:rPr>
-              <a:t>One HTML form with </a:t>
-            </a:r>
-            <a:r>
-              <a:rPr lang="en-US" sz="1000" dirty="0" err="1">
-                <a:latin typeface="Courier New" panose="02070309020205020404" pitchFamily="49" charset="0"/>
-                <a:cs typeface="Courier New" panose="02070309020205020404" pitchFamily="49" charset="0"/>
-              </a:rPr>
-              <a:t>phx</a:t>
-            </a:r>
-            <a:r>
-              <a:rPr lang="en-US" sz="1000" dirty="0">
-                <a:latin typeface="Courier New" panose="02070309020205020404" pitchFamily="49" charset="0"/>
-                <a:cs typeface="Courier New" panose="02070309020205020404" pitchFamily="49" charset="0"/>
-              </a:rPr>
-              <a:t>-click for each line item and one save</a:t>
-            </a:r>
-          </a:p>
-        </p:txBody>
-      </p:sp>
+        </p:spPr>
+      </p:pic>
     </p:spTree>
     <p:extLst>
       <p:ext uri="{BB962C8B-B14F-4D97-AF65-F5344CB8AC3E}">
-        <p14:creationId xmlns:p14="http://schemas.microsoft.com/office/powerpoint/2010/main" val="1386563943"/>
+        <p14:creationId xmlns:p14="http://schemas.microsoft.com/office/powerpoint/2010/main" val="2394609192"/>
       </p:ext>
     </p:extLst>
   </p:cSld>
@@ -5479,12 +6719,95 @@
           <a:chExt cx="0" cy="0"/>
         </a:xfrm>
       </p:grpSpPr>
+      <p:sp>
+        <p:nvSpPr>
+          <p:cNvPr id="6" name="TextBox 5">
+            <a:extLst>
+              <a:ext uri="{FF2B5EF4-FFF2-40B4-BE49-F238E27FC236}">
+                <a16:creationId xmlns:a16="http://schemas.microsoft.com/office/drawing/2014/main" id="{9399A366-7517-3584-26FF-1EF0A7097BE9}"/>
+              </a:ext>
+            </a:extLst>
+          </p:cNvPr>
+          <p:cNvSpPr txBox="1"/>
+          <p:nvPr/>
+        </p:nvSpPr>
+        <p:spPr>
+          <a:xfrm>
+            <a:off x="6014127" y="1051114"/>
+            <a:ext cx="1449565" cy="246221"/>
+          </a:xfrm>
+          <a:prstGeom prst="rect">
+            <a:avLst/>
+          </a:prstGeom>
+          <a:noFill/>
+        </p:spPr>
+        <p:txBody>
+          <a:bodyPr wrap="square" rtlCol="0">
+            <a:spAutoFit/>
+          </a:bodyPr>
+          <a:lstStyle/>
+          <a:p>
+            <a:pPr algn="ctr"/>
+            <a:r>
+              <a:rPr lang="en-US" sz="1000" dirty="0">
+                <a:latin typeface="Courier New" panose="02070309020205020404" pitchFamily="49" charset="0"/>
+                <a:cs typeface="Courier New" panose="02070309020205020404" pitchFamily="49" charset="0"/>
+              </a:rPr>
+              <a:t>Event handlers</a:t>
+            </a:r>
+          </a:p>
+        </p:txBody>
+      </p:sp>
+      <p:sp>
+        <p:nvSpPr>
+          <p:cNvPr id="7" name="TextBox 6">
+            <a:extLst>
+              <a:ext uri="{FF2B5EF4-FFF2-40B4-BE49-F238E27FC236}">
+                <a16:creationId xmlns:a16="http://schemas.microsoft.com/office/drawing/2014/main" id="{4C6415AF-217F-E74C-5DA2-E232C6BF4E4E}"/>
+              </a:ext>
+            </a:extLst>
+          </p:cNvPr>
+          <p:cNvSpPr txBox="1"/>
+          <p:nvPr/>
+        </p:nvSpPr>
+        <p:spPr>
+          <a:xfrm>
+            <a:off x="9817688" y="151200"/>
+            <a:ext cx="2311150" cy="477054"/>
+          </a:xfrm>
+          <a:prstGeom prst="rect">
+            <a:avLst/>
+          </a:prstGeom>
+          <a:noFill/>
+        </p:spPr>
+        <p:txBody>
+          <a:bodyPr wrap="square" rtlCol="0">
+            <a:spAutoFit/>
+          </a:bodyPr>
+          <a:lstStyle/>
+          <a:p>
+            <a:pPr algn="ctr"/>
+            <a:r>
+              <a:rPr lang="en-US" sz="1400" b="1" dirty="0"/>
+              <a:t>Relationship Input Params</a:t>
+            </a:r>
+          </a:p>
+          <a:p>
+            <a:pPr algn="ctr"/>
+            <a:r>
+              <a:rPr lang="en-US" sz="1100" dirty="0"/>
+              <a:t>%{} or [map] or Ash.Identity</a:t>
+            </a:r>
+            <a:endParaRPr lang="en-US" sz="1400" dirty="0"/>
+          </a:p>
+        </p:txBody>
+      </p:sp>
       <p:pic>
         <p:nvPicPr>
-          <p:cNvPr id="2" name="Picture 1">
-            <a:extLst>
-              <a:ext uri="{FF2B5EF4-FFF2-40B4-BE49-F238E27FC236}">
-                <a16:creationId xmlns:a16="http://schemas.microsoft.com/office/drawing/2014/main" id="{1581E0DA-FD0B-2B86-06F5-D509AE539D6C}"/>
+          <p:cNvPr id="3" name="Picture 2">
+            <a:extLst>
+              <a:ext uri="{FF2B5EF4-FFF2-40B4-BE49-F238E27FC236}">
+                <a16:creationId xmlns:a16="http://schemas.microsoft.com/office/drawing/2014/main" id="{43EF9DD1-8AB6-F7B1-2362-CEE69DF1E162}"/>
               </a:ext>
             </a:extLst>
           </p:cNvPr>
@@ -5501,59 +6824,20 @@
         </p:blipFill>
         <p:spPr>
           <a:xfrm>
-            <a:off x="393738" y="1445847"/>
-            <a:ext cx="5738781" cy="4364892"/>
+            <a:off x="0" y="712893"/>
+            <a:ext cx="5369715" cy="5983574"/>
           </a:xfrm>
           <a:prstGeom prst="rect">
             <a:avLst/>
           </a:prstGeom>
         </p:spPr>
       </p:pic>
-      <p:sp>
-        <p:nvSpPr>
-          <p:cNvPr id="5" name="TextBox 4">
-            <a:extLst>
-              <a:ext uri="{FF2B5EF4-FFF2-40B4-BE49-F238E27FC236}">
-                <a16:creationId xmlns:a16="http://schemas.microsoft.com/office/drawing/2014/main" id="{5D2E1B6D-0C2C-A282-648B-B22B199C7735}"/>
-              </a:ext>
-            </a:extLst>
-          </p:cNvPr>
-          <p:cNvSpPr txBox="1"/>
-          <p:nvPr/>
-        </p:nvSpPr>
-        <p:spPr>
-          <a:xfrm>
-            <a:off x="496466" y="1199626"/>
-            <a:ext cx="4356888" cy="246221"/>
-          </a:xfrm>
-          <a:prstGeom prst="rect">
-            <a:avLst/>
-          </a:prstGeom>
-          <a:noFill/>
-        </p:spPr>
-        <p:txBody>
-          <a:bodyPr wrap="square" rtlCol="0">
-            <a:spAutoFit/>
-          </a:bodyPr>
-          <a:lstStyle/>
-          <a:p>
-            <a:pPr algn="ctr"/>
-            <a:r>
-              <a:rPr lang="en-US" sz="1000" dirty="0">
-                <a:latin typeface="Courier New" panose="02070309020205020404" pitchFamily="49" charset="0"/>
-                <a:cs typeface="Courier New" panose="02070309020205020404" pitchFamily="49" charset="0"/>
-              </a:rPr>
-              <a:t>Submission body of parent with inline children:</a:t>
-            </a:r>
-          </a:p>
-        </p:txBody>
-      </p:sp>
       <p:pic>
         <p:nvPicPr>
-          <p:cNvPr id="3" name="Picture 2">
-            <a:extLst>
-              <a:ext uri="{FF2B5EF4-FFF2-40B4-BE49-F238E27FC236}">
-                <a16:creationId xmlns:a16="http://schemas.microsoft.com/office/drawing/2014/main" id="{1F7EEEB6-2BE7-1824-04C9-237B7116BC65}"/>
+          <p:cNvPr id="4" name="Picture 3">
+            <a:extLst>
+              <a:ext uri="{FF2B5EF4-FFF2-40B4-BE49-F238E27FC236}">
+                <a16:creationId xmlns:a16="http://schemas.microsoft.com/office/drawing/2014/main" id="{AF4E6C0B-C1DB-F690-F00F-129C7496FBF5}"/>
               </a:ext>
             </a:extLst>
           </p:cNvPr>
@@ -5570,18 +6854,116 @@
         </p:blipFill>
         <p:spPr>
           <a:xfrm>
-            <a:off x="6550672" y="299147"/>
-            <a:ext cx="5464504" cy="1800958"/>
+            <a:off x="6014128" y="1344246"/>
+            <a:ext cx="5420268" cy="2947865"/>
           </a:xfrm>
           <a:prstGeom prst="rect">
             <a:avLst/>
           </a:prstGeom>
         </p:spPr>
       </p:pic>
+      <p:sp>
+        <p:nvSpPr>
+          <p:cNvPr id="8" name="TextBox 7">
+            <a:extLst>
+              <a:ext uri="{FF2B5EF4-FFF2-40B4-BE49-F238E27FC236}">
+                <a16:creationId xmlns:a16="http://schemas.microsoft.com/office/drawing/2014/main" id="{7A43F4EB-76C9-7A3E-A045-0D0A3E58F4D8}"/>
+              </a:ext>
+            </a:extLst>
+          </p:cNvPr>
+          <p:cNvSpPr txBox="1"/>
+          <p:nvPr/>
+        </p:nvSpPr>
+        <p:spPr>
+          <a:xfrm>
+            <a:off x="311155" y="619072"/>
+            <a:ext cx="4891792" cy="246221"/>
+          </a:xfrm>
+          <a:prstGeom prst="rect">
+            <a:avLst/>
+          </a:prstGeom>
+          <a:noFill/>
+        </p:spPr>
+        <p:txBody>
+          <a:bodyPr wrap="square" rtlCol="0">
+            <a:spAutoFit/>
+          </a:bodyPr>
+          <a:lstStyle/>
+          <a:p>
+            <a:pPr algn="ctr"/>
+            <a:r>
+              <a:rPr lang="en-US" sz="1000" dirty="0" err="1">
+                <a:latin typeface="Courier New" panose="02070309020205020404" pitchFamily="49" charset="0"/>
+                <a:cs typeface="Courier New" panose="02070309020205020404" pitchFamily="49" charset="0"/>
+              </a:rPr>
+              <a:t>Form.add_form</a:t>
+            </a:r>
+            <a:r>
+              <a:rPr lang="en-US" sz="1000" dirty="0">
+                <a:latin typeface="Courier New" panose="02070309020205020404" pitchFamily="49" charset="0"/>
+                <a:cs typeface="Courier New" panose="02070309020205020404" pitchFamily="49" charset="0"/>
+              </a:rPr>
+              <a:t>() // for :new</a:t>
+            </a:r>
+          </a:p>
+        </p:txBody>
+      </p:sp>
+      <p:sp>
+        <p:nvSpPr>
+          <p:cNvPr id="9" name="TextBox 8">
+            <a:extLst>
+              <a:ext uri="{FF2B5EF4-FFF2-40B4-BE49-F238E27FC236}">
+                <a16:creationId xmlns:a16="http://schemas.microsoft.com/office/drawing/2014/main" id="{19741378-0132-B47D-F466-17F170E2C59E}"/>
+              </a:ext>
+            </a:extLst>
+          </p:cNvPr>
+          <p:cNvSpPr txBox="1"/>
+          <p:nvPr/>
+        </p:nvSpPr>
+        <p:spPr>
+          <a:xfrm>
+            <a:off x="191279" y="389727"/>
+            <a:ext cx="5904721" cy="246221"/>
+          </a:xfrm>
+          <a:prstGeom prst="rect">
+            <a:avLst/>
+          </a:prstGeom>
+          <a:noFill/>
+        </p:spPr>
+        <p:txBody>
+          <a:bodyPr wrap="square" rtlCol="0">
+            <a:spAutoFit/>
+          </a:bodyPr>
+          <a:lstStyle/>
+          <a:p>
+            <a:r>
+              <a:rPr lang="en-US" sz="1000" dirty="0">
+                <a:latin typeface="Courier New" panose="02070309020205020404" pitchFamily="49" charset="0"/>
+                <a:cs typeface="Courier New" panose="02070309020205020404" pitchFamily="49" charset="0"/>
+              </a:rPr>
+              <a:t>One HTML form with </a:t>
+            </a:r>
+            <a:r>
+              <a:rPr lang="en-US" sz="1000" dirty="0" err="1">
+                <a:latin typeface="Courier New" panose="02070309020205020404" pitchFamily="49" charset="0"/>
+                <a:cs typeface="Courier New" panose="02070309020205020404" pitchFamily="49" charset="0"/>
+              </a:rPr>
+              <a:t>phx</a:t>
+            </a:r>
+            <a:r>
+              <a:rPr lang="en-US" sz="1000" dirty="0">
+                <a:latin typeface="Courier New" panose="02070309020205020404" pitchFamily="49" charset="0"/>
+                <a:cs typeface="Courier New" panose="02070309020205020404" pitchFamily="49" charset="0"/>
+              </a:rPr>
+              <a:t>-click for each line item and one save</a:t>
+            </a:r>
+          </a:p>
+        </p:txBody>
+      </p:sp>
     </p:spTree>
     <p:extLst>
       <p:ext uri="{BB962C8B-B14F-4D97-AF65-F5344CB8AC3E}">
-        <p14:creationId xmlns:p14="http://schemas.microsoft.com/office/powerpoint/2010/main" val="2590567907"/>
+        <p14:creationId xmlns:p14="http://schemas.microsoft.com/office/powerpoint/2010/main" val="1386563943"/>
       </p:ext>
     </p:extLst>
   </p:cSld>
@@ -5608,51 +6990,12 @@
           <a:chExt cx="0" cy="0"/>
         </a:xfrm>
       </p:grpSpPr>
-      <p:sp>
-        <p:nvSpPr>
-          <p:cNvPr id="4" name="TextBox 3">
-            <a:extLst>
-              <a:ext uri="{FF2B5EF4-FFF2-40B4-BE49-F238E27FC236}">
-                <a16:creationId xmlns:a16="http://schemas.microsoft.com/office/drawing/2014/main" id="{0E0CD6D6-5D5E-C395-EA03-F1F7724A3FC5}"/>
-              </a:ext>
-            </a:extLst>
-          </p:cNvPr>
-          <p:cNvSpPr txBox="1"/>
-          <p:nvPr/>
-        </p:nvSpPr>
-        <p:spPr>
-          <a:xfrm>
-            <a:off x="355211" y="121103"/>
-            <a:ext cx="1050980" cy="246221"/>
-          </a:xfrm>
-          <a:prstGeom prst="rect">
-            <a:avLst/>
-          </a:prstGeom>
-          <a:noFill/>
-        </p:spPr>
-        <p:txBody>
-          <a:bodyPr wrap="square" rtlCol="0">
-            <a:spAutoFit/>
-          </a:bodyPr>
-          <a:lstStyle/>
-          <a:p>
-            <a:pPr algn="ctr"/>
-            <a:r>
-              <a:rPr lang="en-US" sz="1000" dirty="0">
-                <a:latin typeface="Courier New" panose="02070309020205020404" pitchFamily="49" charset="0"/>
-                <a:cs typeface="Courier New" panose="02070309020205020404" pitchFamily="49" charset="0"/>
-              </a:rPr>
-              <a:t>Saving…</a:t>
-            </a:r>
-          </a:p>
-        </p:txBody>
-      </p:sp>
       <p:pic>
         <p:nvPicPr>
           <p:cNvPr id="2" name="Picture 1">
             <a:extLst>
               <a:ext uri="{FF2B5EF4-FFF2-40B4-BE49-F238E27FC236}">
-                <a16:creationId xmlns:a16="http://schemas.microsoft.com/office/drawing/2014/main" id="{A8DEDBA3-5C1E-401A-74B5-DC5D08689316}"/>
+                <a16:creationId xmlns:a16="http://schemas.microsoft.com/office/drawing/2014/main" id="{1581E0DA-FD0B-2B86-06F5-D509AE539D6C}"/>
               </a:ext>
             </a:extLst>
           </p:cNvPr>
@@ -5669,20 +7012,59 @@
         </p:blipFill>
         <p:spPr>
           <a:xfrm>
-            <a:off x="409920" y="367324"/>
-            <a:ext cx="5021774" cy="2255000"/>
+            <a:off x="393738" y="1445847"/>
+            <a:ext cx="5738781" cy="4364892"/>
           </a:xfrm>
           <a:prstGeom prst="rect">
             <a:avLst/>
           </a:prstGeom>
         </p:spPr>
       </p:pic>
+      <p:sp>
+        <p:nvSpPr>
+          <p:cNvPr id="5" name="TextBox 4">
+            <a:extLst>
+              <a:ext uri="{FF2B5EF4-FFF2-40B4-BE49-F238E27FC236}">
+                <a16:creationId xmlns:a16="http://schemas.microsoft.com/office/drawing/2014/main" id="{5D2E1B6D-0C2C-A282-648B-B22B199C7735}"/>
+              </a:ext>
+            </a:extLst>
+          </p:cNvPr>
+          <p:cNvSpPr txBox="1"/>
+          <p:nvPr/>
+        </p:nvSpPr>
+        <p:spPr>
+          <a:xfrm>
+            <a:off x="496466" y="1199626"/>
+            <a:ext cx="4356888" cy="246221"/>
+          </a:xfrm>
+          <a:prstGeom prst="rect">
+            <a:avLst/>
+          </a:prstGeom>
+          <a:noFill/>
+        </p:spPr>
+        <p:txBody>
+          <a:bodyPr wrap="square" rtlCol="0">
+            <a:spAutoFit/>
+          </a:bodyPr>
+          <a:lstStyle/>
+          <a:p>
+            <a:pPr algn="ctr"/>
+            <a:r>
+              <a:rPr lang="en-US" sz="1000" dirty="0">
+                <a:latin typeface="Courier New" panose="02070309020205020404" pitchFamily="49" charset="0"/>
+                <a:cs typeface="Courier New" panose="02070309020205020404" pitchFamily="49" charset="0"/>
+              </a:rPr>
+              <a:t>Submission body of parent with inline children:</a:t>
+            </a:r>
+          </a:p>
+        </p:txBody>
+      </p:sp>
       <p:pic>
         <p:nvPicPr>
           <p:cNvPr id="3" name="Picture 2">
             <a:extLst>
               <a:ext uri="{FF2B5EF4-FFF2-40B4-BE49-F238E27FC236}">
-                <a16:creationId xmlns:a16="http://schemas.microsoft.com/office/drawing/2014/main" id="{082F5D0C-E701-6AEE-3000-4435334A5570}"/>
+                <a16:creationId xmlns:a16="http://schemas.microsoft.com/office/drawing/2014/main" id="{1F7EEEB6-2BE7-1824-04C9-237B7116BC65}"/>
               </a:ext>
             </a:extLst>
           </p:cNvPr>
@@ -5699,8 +7081,8 @@
         </p:blipFill>
         <p:spPr>
           <a:xfrm>
-            <a:off x="469900" y="2743200"/>
-            <a:ext cx="6861098" cy="3810000"/>
+            <a:off x="6550672" y="299147"/>
+            <a:ext cx="5464504" cy="1800958"/>
           </a:xfrm>
           <a:prstGeom prst="rect">
             <a:avLst/>
@@ -5710,7 +7092,7 @@
     </p:spTree>
     <p:extLst>
       <p:ext uri="{BB962C8B-B14F-4D97-AF65-F5344CB8AC3E}">
-        <p14:creationId xmlns:p14="http://schemas.microsoft.com/office/powerpoint/2010/main" val="3137771160"/>
+        <p14:creationId xmlns:p14="http://schemas.microsoft.com/office/powerpoint/2010/main" val="2590567907"/>
       </p:ext>
     </p:extLst>
   </p:cSld>
@@ -5751,8 +7133,8 @@
         </p:nvSpPr>
         <p:spPr>
           <a:xfrm>
-            <a:off x="82251" y="183626"/>
-            <a:ext cx="3848887" cy="246221"/>
+            <a:off x="355211" y="121103"/>
+            <a:ext cx="1050980" cy="246221"/>
           </a:xfrm>
           <a:prstGeom prst="rect">
             <a:avLst/>
@@ -5771,7 +7153,7 @@
                 <a:latin typeface="Courier New" panose="02070309020205020404" pitchFamily="49" charset="0"/>
                 <a:cs typeface="Courier New" panose="02070309020205020404" pitchFamily="49" charset="0"/>
               </a:rPr>
-              <a:t>Submission body of parent with inline children:</a:t>
+              <a:t>Saving…</a:t>
             </a:r>
           </a:p>
         </p:txBody>
@@ -5781,7 +7163,7 @@
           <p:cNvPr id="2" name="Picture 1">
             <a:extLst>
               <a:ext uri="{FF2B5EF4-FFF2-40B4-BE49-F238E27FC236}">
-                <a16:creationId xmlns:a16="http://schemas.microsoft.com/office/drawing/2014/main" id="{EFAD0CD4-E82B-38C6-73E9-4DAFEF6A7A97}"/>
+                <a16:creationId xmlns:a16="http://schemas.microsoft.com/office/drawing/2014/main" id="{A8DEDBA3-5C1E-401A-74B5-DC5D08689316}"/>
               </a:ext>
             </a:extLst>
           </p:cNvPr>
@@ -5798,8 +7180,38 @@
         </p:blipFill>
         <p:spPr>
           <a:xfrm>
-            <a:off x="169043" y="519764"/>
-            <a:ext cx="6518439" cy="3451793"/>
+            <a:off x="409920" y="367324"/>
+            <a:ext cx="5021774" cy="2255000"/>
+          </a:xfrm>
+          <a:prstGeom prst="rect">
+            <a:avLst/>
+          </a:prstGeom>
+        </p:spPr>
+      </p:pic>
+      <p:pic>
+        <p:nvPicPr>
+          <p:cNvPr id="3" name="Picture 2">
+            <a:extLst>
+              <a:ext uri="{FF2B5EF4-FFF2-40B4-BE49-F238E27FC236}">
+                <a16:creationId xmlns:a16="http://schemas.microsoft.com/office/drawing/2014/main" id="{082F5D0C-E701-6AEE-3000-4435334A5570}"/>
+              </a:ext>
+            </a:extLst>
+          </p:cNvPr>
+          <p:cNvPicPr>
+            <a:picLocks noChangeAspect="1"/>
+          </p:cNvPicPr>
+          <p:nvPr/>
+        </p:nvPicPr>
+        <p:blipFill>
+          <a:blip r:embed="rId3"/>
+          <a:stretch>
+            <a:fillRect/>
+          </a:stretch>
+        </p:blipFill>
+        <p:spPr>
+          <a:xfrm>
+            <a:off x="469900" y="2743200"/>
+            <a:ext cx="6861098" cy="3810000"/>
           </a:xfrm>
           <a:prstGeom prst="rect">
             <a:avLst/>
@@ -5809,7 +7221,7 @@
     </p:spTree>
     <p:extLst>
       <p:ext uri="{BB962C8B-B14F-4D97-AF65-F5344CB8AC3E}">
-        <p14:creationId xmlns:p14="http://schemas.microsoft.com/office/powerpoint/2010/main" val="1261168459"/>
+        <p14:creationId xmlns:p14="http://schemas.microsoft.com/office/powerpoint/2010/main" val="3137771160"/>
       </p:ext>
     </p:extLst>
   </p:cSld>
@@ -5850,8 +7262,8 @@
         </p:nvSpPr>
         <p:spPr>
           <a:xfrm>
-            <a:off x="308897" y="113288"/>
-            <a:ext cx="4356888" cy="246221"/>
+            <a:off x="82251" y="183626"/>
+            <a:ext cx="3848887" cy="246221"/>
           </a:xfrm>
           <a:prstGeom prst="rect">
             <a:avLst/>
@@ -5864,12 +7276,13 @@
           </a:bodyPr>
           <a:lstStyle/>
           <a:p>
+            <a:pPr algn="ctr"/>
             <a:r>
               <a:rPr lang="en-US" sz="1000" dirty="0">
                 <a:latin typeface="Courier New" panose="02070309020205020404" pitchFamily="49" charset="0"/>
                 <a:cs typeface="Courier New" panose="02070309020205020404" pitchFamily="49" charset="0"/>
               </a:rPr>
-              <a:t>Pagination </a:t>
+              <a:t>Submission body of parent with inline children:</a:t>
             </a:r>
           </a:p>
         </p:txBody>
@@ -5879,7 +7292,7 @@
           <p:cNvPr id="2" name="Picture 1">
             <a:extLst>
               <a:ext uri="{FF2B5EF4-FFF2-40B4-BE49-F238E27FC236}">
-                <a16:creationId xmlns:a16="http://schemas.microsoft.com/office/drawing/2014/main" id="{E30FF01F-5649-C510-5F70-7ED65F834A8F}"/>
+                <a16:creationId xmlns:a16="http://schemas.microsoft.com/office/drawing/2014/main" id="{EFAD0CD4-E82B-38C6-73E9-4DAFEF6A7A97}"/>
               </a:ext>
             </a:extLst>
           </p:cNvPr>
@@ -5896,68 +7309,8 @@
         </p:blipFill>
         <p:spPr>
           <a:xfrm>
-            <a:off x="193159" y="519763"/>
-            <a:ext cx="3709454" cy="3816417"/>
-          </a:xfrm>
-          <a:prstGeom prst="rect">
-            <a:avLst/>
-          </a:prstGeom>
-        </p:spPr>
-      </p:pic>
-      <p:pic>
-        <p:nvPicPr>
-          <p:cNvPr id="3" name="Picture 2">
-            <a:extLst>
-              <a:ext uri="{FF2B5EF4-FFF2-40B4-BE49-F238E27FC236}">
-                <a16:creationId xmlns:a16="http://schemas.microsoft.com/office/drawing/2014/main" id="{7B64A3E1-84A2-89E0-D223-CC97F8CEB7B2}"/>
-              </a:ext>
-            </a:extLst>
-          </p:cNvPr>
-          <p:cNvPicPr>
-            <a:picLocks noChangeAspect="1"/>
-          </p:cNvPicPr>
-          <p:nvPr/>
-        </p:nvPicPr>
-        <p:blipFill>
-          <a:blip r:embed="rId3"/>
-          <a:stretch>
-            <a:fillRect/>
-          </a:stretch>
-        </p:blipFill>
-        <p:spPr>
-          <a:xfrm>
-            <a:off x="4446391" y="519763"/>
-            <a:ext cx="7038274" cy="2703443"/>
-          </a:xfrm>
-          <a:prstGeom prst="rect">
-            <a:avLst/>
-          </a:prstGeom>
-        </p:spPr>
-      </p:pic>
-      <p:pic>
-        <p:nvPicPr>
-          <p:cNvPr id="5" name="Picture 4">
-            <a:extLst>
-              <a:ext uri="{FF2B5EF4-FFF2-40B4-BE49-F238E27FC236}">
-                <a16:creationId xmlns:a16="http://schemas.microsoft.com/office/drawing/2014/main" id="{10BD5B90-8734-1603-B980-33E0AD8D477F}"/>
-              </a:ext>
-            </a:extLst>
-          </p:cNvPr>
-          <p:cNvPicPr>
-            <a:picLocks noChangeAspect="1"/>
-          </p:cNvPicPr>
-          <p:nvPr/>
-        </p:nvPicPr>
-        <p:blipFill>
-          <a:blip r:embed="rId4"/>
-          <a:stretch>
-            <a:fillRect/>
-          </a:stretch>
-        </p:blipFill>
-        <p:spPr>
-          <a:xfrm>
-            <a:off x="4446391" y="3383460"/>
-            <a:ext cx="7046332" cy="2036679"/>
+            <a:off x="169043" y="519764"/>
+            <a:ext cx="6518439" cy="3451793"/>
           </a:xfrm>
           <a:prstGeom prst="rect">
             <a:avLst/>
@@ -5967,7 +7320,7 @@
     </p:spTree>
     <p:extLst>
       <p:ext uri="{BB962C8B-B14F-4D97-AF65-F5344CB8AC3E}">
-        <p14:creationId xmlns:p14="http://schemas.microsoft.com/office/powerpoint/2010/main" val="2585135265"/>
+        <p14:creationId xmlns:p14="http://schemas.microsoft.com/office/powerpoint/2010/main" val="1261168459"/>
       </p:ext>
     </p:extLst>
   </p:cSld>
@@ -6008,7 +7361,7 @@
         </p:nvSpPr>
         <p:spPr>
           <a:xfrm>
-            <a:off x="294335" y="198598"/>
+            <a:off x="308897" y="113288"/>
             <a:ext cx="4356888" cy="246221"/>
           </a:xfrm>
           <a:prstGeom prst="rect">
@@ -6023,18 +7376,11 @@
           <a:lstStyle/>
           <a:p>
             <a:r>
-              <a:rPr lang="en-US" sz="1000" dirty="0" err="1">
-                <a:latin typeface="Courier New" panose="02070309020205020404" pitchFamily="49" charset="0"/>
-                <a:cs typeface="Courier New" panose="02070309020205020404" pitchFamily="49" charset="0"/>
-              </a:rPr>
-              <a:t>AshPhoenix.FilterForm.new</a:t>
-            </a:r>
-            <a:r>
               <a:rPr lang="en-US" sz="1000" dirty="0">
                 <a:latin typeface="Courier New" panose="02070309020205020404" pitchFamily="49" charset="0"/>
                 <a:cs typeface="Courier New" panose="02070309020205020404" pitchFamily="49" charset="0"/>
               </a:rPr>
-              <a:t>(resource)</a:t>
+              <a:t>Pagination </a:t>
             </a:r>
           </a:p>
         </p:txBody>
@@ -6044,7 +7390,7 @@
           <p:cNvPr id="2" name="Picture 1">
             <a:extLst>
               <a:ext uri="{FF2B5EF4-FFF2-40B4-BE49-F238E27FC236}">
-                <a16:creationId xmlns:a16="http://schemas.microsoft.com/office/drawing/2014/main" id="{327CBF45-B090-9A7F-B26E-1080AF2F6D08}"/>
+                <a16:creationId xmlns:a16="http://schemas.microsoft.com/office/drawing/2014/main" id="{E30FF01F-5649-C510-5F70-7ED65F834A8F}"/>
               </a:ext>
             </a:extLst>
           </p:cNvPr>
@@ -6061,8 +7407,8 @@
         </p:blipFill>
         <p:spPr>
           <a:xfrm>
-            <a:off x="307168" y="519763"/>
-            <a:ext cx="5788831" cy="6272337"/>
+            <a:off x="193159" y="519763"/>
+            <a:ext cx="3709454" cy="3816417"/>
           </a:xfrm>
           <a:prstGeom prst="rect">
             <a:avLst/>
@@ -6074,7 +7420,7 @@
           <p:cNvPr id="3" name="Picture 2">
             <a:extLst>
               <a:ext uri="{FF2B5EF4-FFF2-40B4-BE49-F238E27FC236}">
-                <a16:creationId xmlns:a16="http://schemas.microsoft.com/office/drawing/2014/main" id="{18597963-739C-A7CE-4D1E-B5602FCD1638}"/>
+                <a16:creationId xmlns:a16="http://schemas.microsoft.com/office/drawing/2014/main" id="{7B64A3E1-84A2-89E0-D223-CC97F8CEB7B2}"/>
               </a:ext>
             </a:extLst>
           </p:cNvPr>
@@ -6091,8 +7437,38 @@
         </p:blipFill>
         <p:spPr>
           <a:xfrm>
-            <a:off x="6243989" y="519763"/>
-            <a:ext cx="5472745" cy="3213300"/>
+            <a:off x="4446391" y="519763"/>
+            <a:ext cx="7038274" cy="2703443"/>
+          </a:xfrm>
+          <a:prstGeom prst="rect">
+            <a:avLst/>
+          </a:prstGeom>
+        </p:spPr>
+      </p:pic>
+      <p:pic>
+        <p:nvPicPr>
+          <p:cNvPr id="5" name="Picture 4">
+            <a:extLst>
+              <a:ext uri="{FF2B5EF4-FFF2-40B4-BE49-F238E27FC236}">
+                <a16:creationId xmlns:a16="http://schemas.microsoft.com/office/drawing/2014/main" id="{10BD5B90-8734-1603-B980-33E0AD8D477F}"/>
+              </a:ext>
+            </a:extLst>
+          </p:cNvPr>
+          <p:cNvPicPr>
+            <a:picLocks noChangeAspect="1"/>
+          </p:cNvPicPr>
+          <p:nvPr/>
+        </p:nvPicPr>
+        <p:blipFill>
+          <a:blip r:embed="rId4"/>
+          <a:stretch>
+            <a:fillRect/>
+          </a:stretch>
+        </p:blipFill>
+        <p:spPr>
+          <a:xfrm>
+            <a:off x="4446391" y="3383460"/>
+            <a:ext cx="7046332" cy="2036679"/>
           </a:xfrm>
           <a:prstGeom prst="rect">
             <a:avLst/>
@@ -6102,7 +7478,7 @@
     </p:spTree>
     <p:extLst>
       <p:ext uri="{BB962C8B-B14F-4D97-AF65-F5344CB8AC3E}">
-        <p14:creationId xmlns:p14="http://schemas.microsoft.com/office/powerpoint/2010/main" val="4172971133"/>
+        <p14:creationId xmlns:p14="http://schemas.microsoft.com/office/powerpoint/2010/main" val="2585135265"/>
       </p:ext>
     </p:extLst>
   </p:cSld>
@@ -6158,21 +7534,28 @@
           <a:lstStyle/>
           <a:p>
             <a:r>
+              <a:rPr lang="en-US" sz="1000" dirty="0" err="1">
+                <a:latin typeface="Courier New" panose="02070309020205020404" pitchFamily="49" charset="0"/>
+                <a:cs typeface="Courier New" panose="02070309020205020404" pitchFamily="49" charset="0"/>
+              </a:rPr>
+              <a:t>AshPhoenix.FilterForm.new</a:t>
+            </a:r>
+            <a:r>
               <a:rPr lang="en-US" sz="1000" dirty="0">
                 <a:latin typeface="Courier New" panose="02070309020205020404" pitchFamily="49" charset="0"/>
                 <a:cs typeface="Courier New" panose="02070309020205020404" pitchFamily="49" charset="0"/>
               </a:rPr>
-              <a:t>Invoke read action</a:t>
+              <a:t>(resource)</a:t>
             </a:r>
           </a:p>
         </p:txBody>
       </p:sp>
       <p:pic>
         <p:nvPicPr>
-          <p:cNvPr id="5" name="Picture 4">
-            <a:extLst>
-              <a:ext uri="{FF2B5EF4-FFF2-40B4-BE49-F238E27FC236}">
-                <a16:creationId xmlns:a16="http://schemas.microsoft.com/office/drawing/2014/main" id="{4990C3EF-AB8A-A8B3-1B00-E26EE8E4CC83}"/>
+          <p:cNvPr id="2" name="Picture 1">
+            <a:extLst>
+              <a:ext uri="{FF2B5EF4-FFF2-40B4-BE49-F238E27FC236}">
+                <a16:creationId xmlns:a16="http://schemas.microsoft.com/office/drawing/2014/main" id="{327CBF45-B090-9A7F-B26E-1080AF2F6D08}"/>
               </a:ext>
             </a:extLst>
           </p:cNvPr>
@@ -6189,8 +7572,8 @@
         </p:blipFill>
         <p:spPr>
           <a:xfrm>
-            <a:off x="294335" y="491309"/>
-            <a:ext cx="5801665" cy="2510539"/>
+            <a:off x="307168" y="519763"/>
+            <a:ext cx="5788831" cy="6272337"/>
           </a:xfrm>
           <a:prstGeom prst="rect">
             <a:avLst/>
@@ -6199,10 +7582,10 @@
       </p:pic>
       <p:pic>
         <p:nvPicPr>
-          <p:cNvPr id="6" name="Picture 5">
-            <a:extLst>
-              <a:ext uri="{FF2B5EF4-FFF2-40B4-BE49-F238E27FC236}">
-                <a16:creationId xmlns:a16="http://schemas.microsoft.com/office/drawing/2014/main" id="{6CF2BDC2-DCAD-261F-D2B4-858DC0934244}"/>
+          <p:cNvPr id="3" name="Picture 2">
+            <a:extLst>
+              <a:ext uri="{FF2B5EF4-FFF2-40B4-BE49-F238E27FC236}">
+                <a16:creationId xmlns:a16="http://schemas.microsoft.com/office/drawing/2014/main" id="{18597963-739C-A7CE-4D1E-B5602FCD1638}"/>
               </a:ext>
             </a:extLst>
           </p:cNvPr>
@@ -6219,8 +7602,8 @@
         </p:blipFill>
         <p:spPr>
           <a:xfrm>
-            <a:off x="6342017" y="491309"/>
-            <a:ext cx="5311961" cy="4831624"/>
+            <a:off x="6243989" y="519763"/>
+            <a:ext cx="5472745" cy="3213300"/>
           </a:xfrm>
           <a:prstGeom prst="rect">
             <a:avLst/>
@@ -6230,7 +7613,7 @@
     </p:spTree>
     <p:extLst>
       <p:ext uri="{BB962C8B-B14F-4D97-AF65-F5344CB8AC3E}">
-        <p14:creationId xmlns:p14="http://schemas.microsoft.com/office/powerpoint/2010/main" val="1985898593"/>
+        <p14:creationId xmlns:p14="http://schemas.microsoft.com/office/powerpoint/2010/main" val="4172971133"/>
       </p:ext>
     </p:extLst>
   </p:cSld>

</xml_diff>

<commit_message>
before changing to live components
</commit_message>
<xml_diff>
--- a/notebook/Manage_Relationship.pptx
+++ b/notebook/Manage_Relationship.pptx
@@ -5249,10 +5249,10 @@
       </p:grpSpPr>
       <p:pic>
         <p:nvPicPr>
-          <p:cNvPr id="37" name="Picture 36">
-            <a:extLst>
-              <a:ext uri="{FF2B5EF4-FFF2-40B4-BE49-F238E27FC236}">
-                <a16:creationId xmlns:a16="http://schemas.microsoft.com/office/drawing/2014/main" id="{8CEBCBE7-BBB2-220E-3A7D-FDDD5EB0A7F4}"/>
+          <p:cNvPr id="65" name="Picture 64">
+            <a:extLst>
+              <a:ext uri="{FF2B5EF4-FFF2-40B4-BE49-F238E27FC236}">
+                <a16:creationId xmlns:a16="http://schemas.microsoft.com/office/drawing/2014/main" id="{A9792E06-2EC3-9ACD-FDB8-293774546AEC}"/>
               </a:ext>
             </a:extLst>
           </p:cNvPr>
@@ -5269,92 +5269,20 @@
         </p:blipFill>
         <p:spPr>
           <a:xfrm>
-            <a:off x="6016577" y="1231392"/>
-            <a:ext cx="5712127" cy="2337255"/>
+            <a:off x="2722456" y="805299"/>
+            <a:ext cx="1886012" cy="1774602"/>
           </a:xfrm>
           <a:prstGeom prst="rect">
             <a:avLst/>
           </a:prstGeom>
         </p:spPr>
       </p:pic>
-      <p:sp>
-        <p:nvSpPr>
-          <p:cNvPr id="6" name="TextBox 5">
-            <a:extLst>
-              <a:ext uri="{FF2B5EF4-FFF2-40B4-BE49-F238E27FC236}">
-                <a16:creationId xmlns:a16="http://schemas.microsoft.com/office/drawing/2014/main" id="{9399A366-7517-3584-26FF-1EF0A7097BE9}"/>
-              </a:ext>
-            </a:extLst>
-          </p:cNvPr>
-          <p:cNvSpPr txBox="1"/>
-          <p:nvPr/>
-        </p:nvSpPr>
-        <p:spPr>
-          <a:xfrm>
-            <a:off x="768342" y="963030"/>
-            <a:ext cx="1989347" cy="307777"/>
-          </a:xfrm>
-          <a:prstGeom prst="rect">
-            <a:avLst/>
-          </a:prstGeom>
-          <a:noFill/>
-        </p:spPr>
-        <p:txBody>
-          <a:bodyPr wrap="square" rtlCol="0">
-            <a:spAutoFit/>
-          </a:bodyPr>
-          <a:lstStyle/>
-          <a:p>
-            <a:pPr algn="ctr"/>
-            <a:r>
-              <a:rPr lang="en-US" sz="1400" b="1" dirty="0"/>
-              <a:t>Ash.Resource</a:t>
-            </a:r>
-          </a:p>
-        </p:txBody>
-      </p:sp>
-      <p:sp>
-        <p:nvSpPr>
-          <p:cNvPr id="7" name="TextBox 6">
-            <a:extLst>
-              <a:ext uri="{FF2B5EF4-FFF2-40B4-BE49-F238E27FC236}">
-                <a16:creationId xmlns:a16="http://schemas.microsoft.com/office/drawing/2014/main" id="{4C6415AF-217F-E74C-5DA2-E232C6BF4E4E}"/>
-              </a:ext>
-            </a:extLst>
-          </p:cNvPr>
-          <p:cNvSpPr txBox="1"/>
-          <p:nvPr/>
-        </p:nvSpPr>
-        <p:spPr>
-          <a:xfrm>
-            <a:off x="768343" y="342238"/>
-            <a:ext cx="10920389" cy="307777"/>
-          </a:xfrm>
-          <a:prstGeom prst="rect">
-            <a:avLst/>
-          </a:prstGeom>
-          <a:noFill/>
-        </p:spPr>
-        <p:txBody>
-          <a:bodyPr wrap="square" rtlCol="0">
-            <a:spAutoFit/>
-          </a:bodyPr>
-          <a:lstStyle/>
-          <a:p>
-            <a:pPr algn="ctr"/>
-            <a:r>
-              <a:rPr lang="en-US" sz="1400" b="1" dirty="0"/>
-              <a:t>Multi-Line AshPhoenix.Form</a:t>
-            </a:r>
-          </a:p>
-        </p:txBody>
-      </p:sp>
       <p:pic>
         <p:nvPicPr>
-          <p:cNvPr id="24" name="Picture 23">
-            <a:extLst>
-              <a:ext uri="{FF2B5EF4-FFF2-40B4-BE49-F238E27FC236}">
-                <a16:creationId xmlns:a16="http://schemas.microsoft.com/office/drawing/2014/main" id="{19394488-7E88-DBDF-4CEB-C9AF4940137E}"/>
+          <p:cNvPr id="37" name="Picture 36">
+            <a:extLst>
+              <a:ext uri="{FF2B5EF4-FFF2-40B4-BE49-F238E27FC236}">
+                <a16:creationId xmlns:a16="http://schemas.microsoft.com/office/drawing/2014/main" id="{8CEBCBE7-BBB2-220E-3A7D-FDDD5EB0A7F4}"/>
               </a:ext>
             </a:extLst>
           </p:cNvPr>
@@ -5371,7 +5299,109 @@
         </p:blipFill>
         <p:spPr>
           <a:xfrm>
-            <a:off x="768343" y="1231392"/>
+            <a:off x="4900240" y="794912"/>
+            <a:ext cx="5712127" cy="2337255"/>
+          </a:xfrm>
+          <a:prstGeom prst="rect">
+            <a:avLst/>
+          </a:prstGeom>
+        </p:spPr>
+      </p:pic>
+      <p:sp>
+        <p:nvSpPr>
+          <p:cNvPr id="6" name="TextBox 5">
+            <a:extLst>
+              <a:ext uri="{FF2B5EF4-FFF2-40B4-BE49-F238E27FC236}">
+                <a16:creationId xmlns:a16="http://schemas.microsoft.com/office/drawing/2014/main" id="{9399A366-7517-3584-26FF-1EF0A7097BE9}"/>
+              </a:ext>
+            </a:extLst>
+          </p:cNvPr>
+          <p:cNvSpPr txBox="1"/>
+          <p:nvPr/>
+        </p:nvSpPr>
+        <p:spPr>
+          <a:xfrm>
+            <a:off x="185561" y="526550"/>
+            <a:ext cx="1989347" cy="307777"/>
+          </a:xfrm>
+          <a:prstGeom prst="rect">
+            <a:avLst/>
+          </a:prstGeom>
+          <a:noFill/>
+        </p:spPr>
+        <p:txBody>
+          <a:bodyPr wrap="square" rtlCol="0">
+            <a:spAutoFit/>
+          </a:bodyPr>
+          <a:lstStyle/>
+          <a:p>
+            <a:pPr algn="ctr"/>
+            <a:r>
+              <a:rPr lang="en-US" sz="1400" b="1" dirty="0"/>
+              <a:t>Ash.Resource</a:t>
+            </a:r>
+          </a:p>
+        </p:txBody>
+      </p:sp>
+      <p:sp>
+        <p:nvSpPr>
+          <p:cNvPr id="7" name="TextBox 6">
+            <a:extLst>
+              <a:ext uri="{FF2B5EF4-FFF2-40B4-BE49-F238E27FC236}">
+                <a16:creationId xmlns:a16="http://schemas.microsoft.com/office/drawing/2014/main" id="{4C6415AF-217F-E74C-5DA2-E232C6BF4E4E}"/>
+              </a:ext>
+            </a:extLst>
+          </p:cNvPr>
+          <p:cNvSpPr txBox="1"/>
+          <p:nvPr/>
+        </p:nvSpPr>
+        <p:spPr>
+          <a:xfrm>
+            <a:off x="768343" y="342238"/>
+            <a:ext cx="10920389" cy="307777"/>
+          </a:xfrm>
+          <a:prstGeom prst="rect">
+            <a:avLst/>
+          </a:prstGeom>
+          <a:noFill/>
+        </p:spPr>
+        <p:txBody>
+          <a:bodyPr wrap="square" rtlCol="0">
+            <a:spAutoFit/>
+          </a:bodyPr>
+          <a:lstStyle/>
+          <a:p>
+            <a:pPr algn="ctr"/>
+            <a:r>
+              <a:rPr lang="en-US" sz="1400" b="1" dirty="0"/>
+              <a:t>Multi-Line AshPhoenix.Form</a:t>
+            </a:r>
+          </a:p>
+        </p:txBody>
+      </p:sp>
+      <p:pic>
+        <p:nvPicPr>
+          <p:cNvPr id="24" name="Picture 23">
+            <a:extLst>
+              <a:ext uri="{FF2B5EF4-FFF2-40B4-BE49-F238E27FC236}">
+                <a16:creationId xmlns:a16="http://schemas.microsoft.com/office/drawing/2014/main" id="{19394488-7E88-DBDF-4CEB-C9AF4940137E}"/>
+              </a:ext>
+            </a:extLst>
+          </p:cNvPr>
+          <p:cNvPicPr>
+            <a:picLocks noChangeAspect="1"/>
+          </p:cNvPicPr>
+          <p:nvPr/>
+        </p:nvPicPr>
+        <p:blipFill>
+          <a:blip r:embed="rId4"/>
+          <a:stretch>
+            <a:fillRect/>
+          </a:stretch>
+        </p:blipFill>
+        <p:spPr>
+          <a:xfrm>
+            <a:off x="185562" y="794912"/>
             <a:ext cx="1989347" cy="2663952"/>
           </a:xfrm>
           <a:prstGeom prst="rect">
@@ -5401,7 +5431,7 @@
         </p:nvSpPr>
         <p:spPr>
           <a:xfrm>
-            <a:off x="2413219" y="3606010"/>
+            <a:off x="1998897" y="1940042"/>
             <a:ext cx="445923" cy="429542"/>
           </a:xfrm>
           <a:prstGeom prst="can">
@@ -5438,36 +5468,6 @@
           </a:p>
         </p:txBody>
       </p:sp>
-      <p:pic>
-        <p:nvPicPr>
-          <p:cNvPr id="25" name="Picture 24">
-            <a:extLst>
-              <a:ext uri="{FF2B5EF4-FFF2-40B4-BE49-F238E27FC236}">
-                <a16:creationId xmlns:a16="http://schemas.microsoft.com/office/drawing/2014/main" id="{2F8985CC-E734-A938-5A91-E278B82228B6}"/>
-              </a:ext>
-            </a:extLst>
-          </p:cNvPr>
-          <p:cNvPicPr>
-            <a:picLocks noChangeAspect="1"/>
-          </p:cNvPicPr>
-          <p:nvPr/>
-        </p:nvPicPr>
-        <p:blipFill>
-          <a:blip r:embed="rId4"/>
-          <a:stretch>
-            <a:fillRect/>
-          </a:stretch>
-        </p:blipFill>
-        <p:spPr>
-          <a:xfrm>
-            <a:off x="3094398" y="1231392"/>
-            <a:ext cx="2846777" cy="2602992"/>
-          </a:xfrm>
-          <a:prstGeom prst="rect">
-            <a:avLst/>
-          </a:prstGeom>
-        </p:spPr>
-      </p:pic>
       <p:sp>
         <p:nvSpPr>
           <p:cNvPr id="26" name="TextBox 25">
@@ -5482,8 +5482,8 @@
         </p:nvSpPr>
         <p:spPr>
           <a:xfrm>
-            <a:off x="3165295" y="963031"/>
-            <a:ext cx="2704981" cy="307777"/>
+            <a:off x="2816479" y="531428"/>
+            <a:ext cx="1609318" cy="307777"/>
           </a:xfrm>
           <a:prstGeom prst="rect">
             <a:avLst/>
@@ -5520,8 +5520,8 @@
         </p:nvCxnSpPr>
         <p:spPr>
           <a:xfrm>
-            <a:off x="5492496" y="1450848"/>
-            <a:ext cx="646176" cy="0"/>
+            <a:off x="4121108" y="951757"/>
+            <a:ext cx="931311" cy="78467"/>
           </a:xfrm>
           <a:prstGeom prst="straightConnector1">
             <a:avLst/>
@@ -5560,13 +5560,14 @@
           </p:cNvPr>
           <p:cNvCxnSpPr>
             <a:cxnSpLocks/>
+            <a:stCxn id="2" idx="4"/>
           </p:cNvCxnSpPr>
           <p:nvPr/>
         </p:nvCxnSpPr>
         <p:spPr>
-          <a:xfrm flipV="1">
-            <a:off x="2680778" y="2919984"/>
-            <a:ext cx="555416" cy="687437"/>
+          <a:xfrm>
+            <a:off x="2444820" y="2154813"/>
+            <a:ext cx="386386" cy="0"/>
           </a:xfrm>
           <a:prstGeom prst="straightConnector1">
             <a:avLst/>
@@ -5616,7 +5617,7 @@
         </p:blipFill>
         <p:spPr>
           <a:xfrm>
-            <a:off x="6016576" y="3788103"/>
+            <a:off x="4900239" y="3351623"/>
             <a:ext cx="5672157" cy="2454201"/>
           </a:xfrm>
           <a:prstGeom prst="rect">
@@ -5646,7 +5647,7 @@
         </p:blipFill>
         <p:spPr>
           <a:xfrm>
-            <a:off x="2680778" y="4238189"/>
+            <a:off x="9154730" y="4712773"/>
             <a:ext cx="2719225" cy="1675383"/>
           </a:xfrm>
           <a:prstGeom prst="rect">
@@ -5664,10 +5665,10 @@
       </p:pic>
       <p:cxnSp>
         <p:nvCxnSpPr>
-          <p:cNvPr id="46" name="Straight Arrow Connector 45">
-            <a:extLst>
-              <a:ext uri="{FF2B5EF4-FFF2-40B4-BE49-F238E27FC236}">
-                <a16:creationId xmlns:a16="http://schemas.microsoft.com/office/drawing/2014/main" id="{E937A4E6-D643-3508-B59C-4F236E25E219}"/>
+          <p:cNvPr id="49" name="Straight Arrow Connector 48">
+            <a:extLst>
+              <a:ext uri="{FF2B5EF4-FFF2-40B4-BE49-F238E27FC236}">
+                <a16:creationId xmlns:a16="http://schemas.microsoft.com/office/drawing/2014/main" id="{D079B10F-27DB-08A4-0103-1FEB13572997}"/>
               </a:ext>
             </a:extLst>
           </p:cNvPr>
@@ -5678,8 +5679,8 @@
         </p:nvCxnSpPr>
         <p:spPr>
           <a:xfrm flipH="1">
-            <a:off x="4779264" y="4035552"/>
-            <a:ext cx="1359408" cy="335280"/>
+            <a:off x="6436607" y="1899674"/>
+            <a:ext cx="308353" cy="2382150"/>
           </a:xfrm>
           <a:prstGeom prst="straightConnector1">
             <a:avLst/>
@@ -5688,51 +5689,7 @@
             <a:solidFill>
               <a:srgbClr val="FFC000"/>
             </a:solidFill>
-            <a:headEnd type="oval"/>
-            <a:tailEnd type="triangle"/>
-          </a:ln>
-        </p:spPr>
-        <p:style>
-          <a:lnRef idx="1">
-            <a:schemeClr val="accent1"/>
-          </a:lnRef>
-          <a:fillRef idx="0">
-            <a:schemeClr val="accent1"/>
-          </a:fillRef>
-          <a:effectRef idx="0">
-            <a:schemeClr val="accent1"/>
-          </a:effectRef>
-          <a:fontRef idx="minor">
-            <a:schemeClr val="tx1"/>
-          </a:fontRef>
-        </p:style>
-      </p:cxnSp>
-      <p:cxnSp>
-        <p:nvCxnSpPr>
-          <p:cNvPr id="49" name="Straight Arrow Connector 48">
-            <a:extLst>
-              <a:ext uri="{FF2B5EF4-FFF2-40B4-BE49-F238E27FC236}">
-                <a16:creationId xmlns:a16="http://schemas.microsoft.com/office/drawing/2014/main" id="{D079B10F-27DB-08A4-0103-1FEB13572997}"/>
-              </a:ext>
-            </a:extLst>
-          </p:cNvPr>
-          <p:cNvCxnSpPr>
-            <a:cxnSpLocks/>
-          </p:cNvCxnSpPr>
-          <p:nvPr/>
-        </p:nvCxnSpPr>
-        <p:spPr>
-          <a:xfrm flipH="1">
-            <a:off x="7552944" y="2336154"/>
-            <a:ext cx="308353" cy="2382150"/>
-          </a:xfrm>
-          <a:prstGeom prst="straightConnector1">
-            <a:avLst/>
-          </a:prstGeom>
-          <a:ln w="19050">
-            <a:solidFill>
-              <a:srgbClr val="FFC000"/>
-            </a:solidFill>
+            <a:prstDash val="sysDot"/>
             <a:headEnd type="oval"/>
             <a:tailEnd type="triangle"/>
           </a:ln>
@@ -5768,7 +5725,7 @@
         </p:nvCxnSpPr>
         <p:spPr>
           <a:xfrm flipH="1" flipV="1">
-            <a:off x="7987461" y="2810256"/>
+            <a:off x="6871124" y="2373776"/>
             <a:ext cx="705435" cy="1863153"/>
           </a:xfrm>
           <a:prstGeom prst="straightConnector1">
@@ -5814,7 +5771,7 @@
         </p:nvCxnSpPr>
         <p:spPr>
           <a:xfrm flipH="1" flipV="1">
-            <a:off x="7987461" y="3296550"/>
+            <a:off x="6871124" y="2860070"/>
             <a:ext cx="1827099" cy="1421754"/>
           </a:xfrm>
           <a:prstGeom prst="straightConnector1">
@@ -5846,92 +5803,179 @@
       </p:cxnSp>
       <p:sp>
         <p:nvSpPr>
-          <p:cNvPr id="60" name="Right Brace 59">
-            <a:extLst>
-              <a:ext uri="{FF2B5EF4-FFF2-40B4-BE49-F238E27FC236}">
-                <a16:creationId xmlns:a16="http://schemas.microsoft.com/office/drawing/2014/main" id="{D6BB6E46-8114-AC79-B10F-FC6CA93E2BCC}"/>
-              </a:ext>
-            </a:extLst>
-          </p:cNvPr>
-          <p:cNvSpPr/>
+          <p:cNvPr id="64" name="TextBox 63">
+            <a:extLst>
+              <a:ext uri="{FF2B5EF4-FFF2-40B4-BE49-F238E27FC236}">
+                <a16:creationId xmlns:a16="http://schemas.microsoft.com/office/drawing/2014/main" id="{DA426285-89CE-6BE9-53B1-978A2C135ECA}"/>
+              </a:ext>
+            </a:extLst>
+          </p:cNvPr>
+          <p:cNvSpPr txBox="1"/>
           <p:nvPr/>
         </p:nvSpPr>
         <p:spPr>
           <a:xfrm>
-            <a:off x="5321808" y="4774637"/>
-            <a:ext cx="216408" cy="896112"/>
-          </a:xfrm>
-          <a:prstGeom prst="rightBrace">
-            <a:avLst>
-              <a:gd name="adj1" fmla="val 26389"/>
-              <a:gd name="adj2" fmla="val 50000"/>
-            </a:avLst>
-          </a:prstGeom>
-          <a:ln w="19050">
-            <a:solidFill>
-              <a:schemeClr val="tx1">
-                <a:lumMod val="85000"/>
-                <a:lumOff val="15000"/>
-              </a:schemeClr>
-            </a:solidFill>
-            <a:prstDash val="sysDot"/>
-          </a:ln>
-        </p:spPr>
-        <p:style>
-          <a:lnRef idx="1">
-            <a:schemeClr val="accent1"/>
-          </a:lnRef>
-          <a:fillRef idx="0">
-            <a:schemeClr val="accent1"/>
-          </a:fillRef>
-          <a:effectRef idx="0">
-            <a:schemeClr val="accent1"/>
-          </a:effectRef>
-          <a:fontRef idx="minor">
-            <a:schemeClr val="tx1"/>
-          </a:fontRef>
-        </p:style>
-        <p:txBody>
-          <a:bodyPr rtlCol="0" anchor="ctr"/>
+            <a:off x="4871578" y="540440"/>
+            <a:ext cx="5740789" cy="307777"/>
+          </a:xfrm>
+          <a:prstGeom prst="rect">
+            <a:avLst/>
+          </a:prstGeom>
+          <a:noFill/>
+        </p:spPr>
+        <p:txBody>
+          <a:bodyPr wrap="square" rtlCol="0">
+            <a:spAutoFit/>
+          </a:bodyPr>
           <a:lstStyle/>
           <a:p>
             <a:pPr algn="ctr"/>
-            <a:endParaRPr lang="en-US"/>
+            <a:r>
+              <a:rPr lang="en-US" sz="1400" b="1" dirty="0" err="1"/>
+              <a:t>Phoenix.LiveView</a:t>
+            </a:r>
+            <a:endParaRPr lang="en-US" sz="1400" b="1" dirty="0"/>
+          </a:p>
+        </p:txBody>
+      </p:sp>
+      <p:pic>
+        <p:nvPicPr>
+          <p:cNvPr id="66" name="Picture 65">
+            <a:extLst>
+              <a:ext uri="{FF2B5EF4-FFF2-40B4-BE49-F238E27FC236}">
+                <a16:creationId xmlns:a16="http://schemas.microsoft.com/office/drawing/2014/main" id="{4D3C51F9-BF92-1683-B08C-C64888C494B6}"/>
+              </a:ext>
+            </a:extLst>
+          </p:cNvPr>
+          <p:cNvPicPr>
+            <a:picLocks noChangeAspect="1"/>
+          </p:cNvPicPr>
+          <p:nvPr/>
+        </p:nvPicPr>
+        <p:blipFill>
+          <a:blip r:embed="rId7"/>
+          <a:stretch>
+            <a:fillRect/>
+          </a:stretch>
+        </p:blipFill>
+        <p:spPr>
+          <a:xfrm>
+            <a:off x="2722456" y="2907678"/>
+            <a:ext cx="1919101" cy="3610190"/>
+          </a:xfrm>
+          <a:prstGeom prst="rect">
+            <a:avLst/>
+          </a:prstGeom>
+        </p:spPr>
+      </p:pic>
+      <p:sp>
+        <p:nvSpPr>
+          <p:cNvPr id="69" name="TextBox 68">
+            <a:extLst>
+              <a:ext uri="{FF2B5EF4-FFF2-40B4-BE49-F238E27FC236}">
+                <a16:creationId xmlns:a16="http://schemas.microsoft.com/office/drawing/2014/main" id="{79E32BDA-C024-41A7-7742-D64548F9BD49}"/>
+              </a:ext>
+            </a:extLst>
+          </p:cNvPr>
+          <p:cNvSpPr txBox="1"/>
+          <p:nvPr/>
+        </p:nvSpPr>
+        <p:spPr>
+          <a:xfrm>
+            <a:off x="2722456" y="2658944"/>
+            <a:ext cx="1919100" cy="307777"/>
+          </a:xfrm>
+          <a:prstGeom prst="rect">
+            <a:avLst/>
+          </a:prstGeom>
+          <a:noFill/>
+        </p:spPr>
+        <p:txBody>
+          <a:bodyPr wrap="square" rtlCol="0">
+            <a:spAutoFit/>
+          </a:bodyPr>
+          <a:lstStyle/>
+          <a:p>
+            <a:pPr algn="ctr"/>
+            <a:r>
+              <a:rPr lang="en-US" sz="1400" b="1" dirty="0"/>
+              <a:t>AshPhoenix.Form</a:t>
+            </a:r>
+          </a:p>
+        </p:txBody>
+      </p:sp>
+      <p:sp>
+        <p:nvSpPr>
+          <p:cNvPr id="71" name="TextBox 70">
+            <a:extLst>
+              <a:ext uri="{FF2B5EF4-FFF2-40B4-BE49-F238E27FC236}">
+                <a16:creationId xmlns:a16="http://schemas.microsoft.com/office/drawing/2014/main" id="{74E53A06-004E-BE4D-2EEF-AFE729262C9C}"/>
+              </a:ext>
+            </a:extLst>
+          </p:cNvPr>
+          <p:cNvSpPr txBox="1"/>
+          <p:nvPr/>
+        </p:nvSpPr>
+        <p:spPr>
+          <a:xfrm>
+            <a:off x="191723" y="4860030"/>
+            <a:ext cx="1610169" cy="353943"/>
+          </a:xfrm>
+          <a:prstGeom prst="rect">
+            <a:avLst/>
+          </a:prstGeom>
+          <a:noFill/>
+        </p:spPr>
+        <p:txBody>
+          <a:bodyPr wrap="square" rtlCol="0">
+            <a:spAutoFit/>
+          </a:bodyPr>
+          <a:lstStyle/>
+          <a:p>
+            <a:pPr algn="ctr"/>
+            <a:r>
+              <a:rPr lang="en-US" sz="1000" dirty="0"/>
+              <a:t>Nested forms for UI </a:t>
+            </a:r>
+          </a:p>
+          <a:p>
+            <a:pPr algn="ctr"/>
+            <a:r>
+              <a:rPr lang="en-US" sz="700" dirty="0"/>
+              <a:t>(one for each child in the relationship)</a:t>
+            </a:r>
           </a:p>
         </p:txBody>
       </p:sp>
       <p:cxnSp>
         <p:nvCxnSpPr>
-          <p:cNvPr id="61" name="Straight Arrow Connector 60">
-            <a:extLst>
-              <a:ext uri="{FF2B5EF4-FFF2-40B4-BE49-F238E27FC236}">
-                <a16:creationId xmlns:a16="http://schemas.microsoft.com/office/drawing/2014/main" id="{151B522C-2C4F-E5EB-A1D6-AFDE2E480446}"/>
+          <p:cNvPr id="46" name="Straight Arrow Connector 45">
+            <a:extLst>
+              <a:ext uri="{FF2B5EF4-FFF2-40B4-BE49-F238E27FC236}">
+                <a16:creationId xmlns:a16="http://schemas.microsoft.com/office/drawing/2014/main" id="{E937A4E6-D643-3508-B59C-4F236E25E219}"/>
               </a:ext>
             </a:extLst>
           </p:cNvPr>
           <p:cNvCxnSpPr>
             <a:cxnSpLocks/>
+            <a:stCxn id="71" idx="3"/>
           </p:cNvCxnSpPr>
           <p:nvPr/>
         </p:nvCxnSpPr>
         <p:spPr>
           <a:xfrm flipV="1">
-            <a:off x="5536916" y="5047714"/>
-            <a:ext cx="882172" cy="164366"/>
+            <a:off x="1801892" y="4218625"/>
+            <a:ext cx="1017189" cy="818377"/>
           </a:xfrm>
           <a:prstGeom prst="straightConnector1">
             <a:avLst/>
           </a:prstGeom>
           <a:ln w="19050">
             <a:solidFill>
-              <a:schemeClr val="accent1">
-                <a:lumMod val="40000"/>
-                <a:lumOff val="60000"/>
-              </a:schemeClr>
+              <a:srgbClr val="00B050"/>
             </a:solidFill>
-            <a:prstDash val="sysDot"/>
-            <a:headEnd type="triangle"/>
-            <a:tailEnd type="oval"/>
+            <a:headEnd type="oval"/>
+            <a:tailEnd type="triangle"/>
           </a:ln>
         </p:spPr>
         <p:style>
@@ -5951,10 +5995,10 @@
       </p:cxnSp>
       <p:sp>
         <p:nvSpPr>
-          <p:cNvPr id="64" name="TextBox 63">
-            <a:extLst>
-              <a:ext uri="{FF2B5EF4-FFF2-40B4-BE49-F238E27FC236}">
-                <a16:creationId xmlns:a16="http://schemas.microsoft.com/office/drawing/2014/main" id="{DA426285-89CE-6BE9-53B1-978A2C135ECA}"/>
+          <p:cNvPr id="76" name="TextBox 75">
+            <a:extLst>
+              <a:ext uri="{FF2B5EF4-FFF2-40B4-BE49-F238E27FC236}">
+                <a16:creationId xmlns:a16="http://schemas.microsoft.com/office/drawing/2014/main" id="{9BBACACA-D519-2D00-1C15-83497E7DA0CA}"/>
               </a:ext>
             </a:extLst>
           </p:cNvPr>
@@ -5963,8 +6007,8 @@
         </p:nvSpPr>
         <p:spPr>
           <a:xfrm>
-            <a:off x="5987915" y="976920"/>
-            <a:ext cx="5740789" cy="307777"/>
+            <a:off x="860959" y="3653536"/>
+            <a:ext cx="934771" cy="246221"/>
           </a:xfrm>
           <a:prstGeom prst="rect">
             <a:avLst/>
@@ -5977,15 +6021,399 @@
           </a:bodyPr>
           <a:lstStyle/>
           <a:p>
+            <a:pPr algn="r"/>
+            <a:r>
+              <a:rPr lang="en-US" sz="1000" dirty="0"/>
+              <a:t>Raw data</a:t>
+            </a:r>
+          </a:p>
+        </p:txBody>
+      </p:sp>
+      <p:cxnSp>
+        <p:nvCxnSpPr>
+          <p:cNvPr id="77" name="Straight Arrow Connector 76">
+            <a:extLst>
+              <a:ext uri="{FF2B5EF4-FFF2-40B4-BE49-F238E27FC236}">
+                <a16:creationId xmlns:a16="http://schemas.microsoft.com/office/drawing/2014/main" id="{A18A0301-AB50-9665-D9D6-A12F4F1D75B5}"/>
+              </a:ext>
+            </a:extLst>
+          </p:cNvPr>
+          <p:cNvCxnSpPr>
+            <a:cxnSpLocks/>
+          </p:cNvCxnSpPr>
+          <p:nvPr/>
+        </p:nvCxnSpPr>
+        <p:spPr>
+          <a:xfrm>
+            <a:off x="1843153" y="3786066"/>
+            <a:ext cx="973326" cy="8694"/>
+          </a:xfrm>
+          <a:prstGeom prst="straightConnector1">
+            <a:avLst/>
+          </a:prstGeom>
+          <a:ln w="19050">
+            <a:solidFill>
+              <a:srgbClr val="00B050"/>
+            </a:solidFill>
+            <a:headEnd type="oval"/>
+            <a:tailEnd type="triangle"/>
+          </a:ln>
+        </p:spPr>
+        <p:style>
+          <a:lnRef idx="1">
+            <a:schemeClr val="accent1"/>
+          </a:lnRef>
+          <a:fillRef idx="0">
+            <a:schemeClr val="accent1"/>
+          </a:fillRef>
+          <a:effectRef idx="0">
+            <a:schemeClr val="accent1"/>
+          </a:effectRef>
+          <a:fontRef idx="minor">
+            <a:schemeClr val="tx1"/>
+          </a:fontRef>
+        </p:style>
+      </p:cxnSp>
+      <p:cxnSp>
+        <p:nvCxnSpPr>
+          <p:cNvPr id="80" name="Straight Arrow Connector 79">
+            <a:extLst>
+              <a:ext uri="{FF2B5EF4-FFF2-40B4-BE49-F238E27FC236}">
+                <a16:creationId xmlns:a16="http://schemas.microsoft.com/office/drawing/2014/main" id="{2B453C0E-2061-797E-BEF7-F0D243B2765A}"/>
+              </a:ext>
+            </a:extLst>
+          </p:cNvPr>
+          <p:cNvCxnSpPr>
+            <a:cxnSpLocks/>
+            <a:stCxn id="81" idx="3"/>
+          </p:cNvCxnSpPr>
+          <p:nvPr/>
+        </p:nvCxnSpPr>
+        <p:spPr>
+          <a:xfrm flipV="1">
+            <a:off x="1898517" y="4081331"/>
+            <a:ext cx="914401" cy="350382"/>
+          </a:xfrm>
+          <a:prstGeom prst="straightConnector1">
+            <a:avLst/>
+          </a:prstGeom>
+          <a:ln w="19050">
+            <a:solidFill>
+              <a:srgbClr val="00B050"/>
+            </a:solidFill>
+            <a:headEnd type="oval"/>
+            <a:tailEnd type="triangle"/>
+          </a:ln>
+        </p:spPr>
+        <p:style>
+          <a:lnRef idx="1">
+            <a:schemeClr val="accent1"/>
+          </a:lnRef>
+          <a:fillRef idx="0">
+            <a:schemeClr val="accent1"/>
+          </a:fillRef>
+          <a:effectRef idx="0">
+            <a:schemeClr val="accent1"/>
+          </a:effectRef>
+          <a:fontRef idx="minor">
+            <a:schemeClr val="tx1"/>
+          </a:fontRef>
+        </p:style>
+      </p:cxnSp>
+      <p:sp>
+        <p:nvSpPr>
+          <p:cNvPr id="81" name="TextBox 80">
+            <a:extLst>
+              <a:ext uri="{FF2B5EF4-FFF2-40B4-BE49-F238E27FC236}">
+                <a16:creationId xmlns:a16="http://schemas.microsoft.com/office/drawing/2014/main" id="{8E39D9D1-1142-3308-9A19-AB47DFA260D6}"/>
+              </a:ext>
+            </a:extLst>
+          </p:cNvPr>
+          <p:cNvSpPr txBox="1"/>
+          <p:nvPr/>
+        </p:nvSpPr>
+        <p:spPr>
+          <a:xfrm>
+            <a:off x="328571" y="4200880"/>
+            <a:ext cx="1569946" cy="461665"/>
+          </a:xfrm>
+          <a:prstGeom prst="rect">
+            <a:avLst/>
+          </a:prstGeom>
+          <a:noFill/>
+        </p:spPr>
+        <p:txBody>
+          <a:bodyPr wrap="square" rtlCol="0">
+            <a:spAutoFit/>
+          </a:bodyPr>
+          <a:lstStyle/>
+          <a:p>
             <a:pPr algn="ctr"/>
             <a:r>
-              <a:rPr lang="en-US" sz="1400" b="1" dirty="0" err="1"/>
-              <a:t>Phoenix.LiveView</a:t>
-            </a:r>
-            <a:endParaRPr lang="en-US" sz="1400" b="1" dirty="0"/>
-          </a:p>
-        </p:txBody>
-      </p:sp>
+              <a:rPr lang="en-US" sz="1000" dirty="0"/>
+              <a:t>Persistence Logic</a:t>
+            </a:r>
+          </a:p>
+          <a:p>
+            <a:pPr algn="ctr"/>
+            <a:r>
+              <a:rPr lang="en-US" sz="700" dirty="0"/>
+              <a:t>How should manage relationship/3  write to database?</a:t>
+            </a:r>
+          </a:p>
+        </p:txBody>
+      </p:sp>
+      <p:sp>
+        <p:nvSpPr>
+          <p:cNvPr id="60" name="Right Brace 59">
+            <a:extLst>
+              <a:ext uri="{FF2B5EF4-FFF2-40B4-BE49-F238E27FC236}">
+                <a16:creationId xmlns:a16="http://schemas.microsoft.com/office/drawing/2014/main" id="{D6BB6E46-8114-AC79-B10F-FC6CA93E2BCC}"/>
+              </a:ext>
+            </a:extLst>
+          </p:cNvPr>
+          <p:cNvSpPr/>
+          <p:nvPr/>
+        </p:nvSpPr>
+        <p:spPr>
+          <a:xfrm>
+            <a:off x="8526283" y="4430817"/>
+            <a:ext cx="178530" cy="347030"/>
+          </a:xfrm>
+          <a:prstGeom prst="rightBrace">
+            <a:avLst>
+              <a:gd name="adj1" fmla="val 26389"/>
+              <a:gd name="adj2" fmla="val 50000"/>
+            </a:avLst>
+          </a:prstGeom>
+          <a:ln w="19050">
+            <a:solidFill>
+              <a:schemeClr val="accent1">
+                <a:lumMod val="20000"/>
+                <a:lumOff val="80000"/>
+              </a:schemeClr>
+            </a:solidFill>
+            <a:prstDash val="sysDot"/>
+          </a:ln>
+        </p:spPr>
+        <p:style>
+          <a:lnRef idx="1">
+            <a:schemeClr val="accent1"/>
+          </a:lnRef>
+          <a:fillRef idx="0">
+            <a:schemeClr val="accent1"/>
+          </a:fillRef>
+          <a:effectRef idx="0">
+            <a:schemeClr val="accent1"/>
+          </a:effectRef>
+          <a:fontRef idx="minor">
+            <a:schemeClr val="tx1"/>
+          </a:fontRef>
+        </p:style>
+        <p:txBody>
+          <a:bodyPr rtlCol="0" anchor="ctr"/>
+          <a:lstStyle/>
+          <a:p>
+            <a:pPr algn="ctr"/>
+            <a:endParaRPr lang="en-US"/>
+          </a:p>
+        </p:txBody>
+      </p:sp>
+      <p:cxnSp>
+        <p:nvCxnSpPr>
+          <p:cNvPr id="61" name="Straight Arrow Connector 60">
+            <a:extLst>
+              <a:ext uri="{FF2B5EF4-FFF2-40B4-BE49-F238E27FC236}">
+                <a16:creationId xmlns:a16="http://schemas.microsoft.com/office/drawing/2014/main" id="{151B522C-2C4F-E5EB-A1D6-AFDE2E480446}"/>
+              </a:ext>
+            </a:extLst>
+          </p:cNvPr>
+          <p:cNvCxnSpPr>
+            <a:cxnSpLocks/>
+          </p:cNvCxnSpPr>
+          <p:nvPr/>
+        </p:nvCxnSpPr>
+        <p:spPr>
+          <a:xfrm flipH="1" flipV="1">
+            <a:off x="8706800" y="4604332"/>
+            <a:ext cx="269400" cy="1094567"/>
+          </a:xfrm>
+          <a:prstGeom prst="straightConnector1">
+            <a:avLst/>
+          </a:prstGeom>
+          <a:ln w="19050">
+            <a:solidFill>
+              <a:schemeClr val="accent1">
+                <a:lumMod val="40000"/>
+                <a:lumOff val="60000"/>
+              </a:schemeClr>
+            </a:solidFill>
+            <a:prstDash val="sysDot"/>
+            <a:headEnd type="triangle"/>
+            <a:tailEnd type="oval"/>
+          </a:ln>
+        </p:spPr>
+        <p:style>
+          <a:lnRef idx="1">
+            <a:schemeClr val="accent1"/>
+          </a:lnRef>
+          <a:fillRef idx="0">
+            <a:schemeClr val="accent1"/>
+          </a:fillRef>
+          <a:effectRef idx="0">
+            <a:schemeClr val="accent1"/>
+          </a:effectRef>
+          <a:fontRef idx="minor">
+            <a:schemeClr val="tx1"/>
+          </a:fontRef>
+        </p:style>
+      </p:cxnSp>
+      <p:sp>
+        <p:nvSpPr>
+          <p:cNvPr id="88" name="Right Brace 87">
+            <a:extLst>
+              <a:ext uri="{FF2B5EF4-FFF2-40B4-BE49-F238E27FC236}">
+                <a16:creationId xmlns:a16="http://schemas.microsoft.com/office/drawing/2014/main" id="{A3FD3B33-C37C-5AFD-53CB-32DA0B0326DA}"/>
+              </a:ext>
+            </a:extLst>
+          </p:cNvPr>
+          <p:cNvSpPr/>
+          <p:nvPr/>
+        </p:nvSpPr>
+        <p:spPr>
+          <a:xfrm rot="10800000">
+            <a:off x="8976200" y="5171801"/>
+            <a:ext cx="178530" cy="1054195"/>
+          </a:xfrm>
+          <a:prstGeom prst="rightBrace">
+            <a:avLst>
+              <a:gd name="adj1" fmla="val 26389"/>
+              <a:gd name="adj2" fmla="val 50000"/>
+            </a:avLst>
+          </a:prstGeom>
+          <a:ln w="19050">
+            <a:solidFill>
+              <a:schemeClr val="accent4">
+                <a:lumMod val="75000"/>
+              </a:schemeClr>
+            </a:solidFill>
+            <a:prstDash val="sysDot"/>
+          </a:ln>
+        </p:spPr>
+        <p:style>
+          <a:lnRef idx="1">
+            <a:schemeClr val="accent1"/>
+          </a:lnRef>
+          <a:fillRef idx="0">
+            <a:schemeClr val="accent1"/>
+          </a:fillRef>
+          <a:effectRef idx="0">
+            <a:schemeClr val="accent1"/>
+          </a:effectRef>
+          <a:fontRef idx="minor">
+            <a:schemeClr val="tx1"/>
+          </a:fontRef>
+        </p:style>
+        <p:txBody>
+          <a:bodyPr rtlCol="0" anchor="ctr"/>
+          <a:lstStyle/>
+          <a:p>
+            <a:pPr algn="ctr"/>
+            <a:endParaRPr lang="en-US"/>
+          </a:p>
+        </p:txBody>
+      </p:sp>
+      <p:cxnSp>
+        <p:nvCxnSpPr>
+          <p:cNvPr id="90" name="Straight Arrow Connector 89">
+            <a:extLst>
+              <a:ext uri="{FF2B5EF4-FFF2-40B4-BE49-F238E27FC236}">
+                <a16:creationId xmlns:a16="http://schemas.microsoft.com/office/drawing/2014/main" id="{1C85126B-C537-25DC-1BC8-9DD1782026C8}"/>
+              </a:ext>
+            </a:extLst>
+          </p:cNvPr>
+          <p:cNvCxnSpPr>
+            <a:cxnSpLocks/>
+          </p:cNvCxnSpPr>
+          <p:nvPr/>
+        </p:nvCxnSpPr>
+        <p:spPr>
+          <a:xfrm flipV="1">
+            <a:off x="3835316" y="1202973"/>
+            <a:ext cx="1217103" cy="1763748"/>
+          </a:xfrm>
+          <a:prstGeom prst="straightConnector1">
+            <a:avLst/>
+          </a:prstGeom>
+          <a:ln w="19050">
+            <a:solidFill>
+              <a:srgbClr val="00B050"/>
+            </a:solidFill>
+            <a:prstDash val="sysDot"/>
+            <a:headEnd type="oval"/>
+            <a:tailEnd type="triangle"/>
+          </a:ln>
+        </p:spPr>
+        <p:style>
+          <a:lnRef idx="1">
+            <a:schemeClr val="accent1"/>
+          </a:lnRef>
+          <a:fillRef idx="0">
+            <a:schemeClr val="accent1"/>
+          </a:fillRef>
+          <a:effectRef idx="0">
+            <a:schemeClr val="accent1"/>
+          </a:effectRef>
+          <a:fontRef idx="minor">
+            <a:schemeClr val="tx1"/>
+          </a:fontRef>
+        </p:style>
+      </p:cxnSp>
+      <p:cxnSp>
+        <p:nvCxnSpPr>
+          <p:cNvPr id="96" name="Straight Arrow Connector 95">
+            <a:extLst>
+              <a:ext uri="{FF2B5EF4-FFF2-40B4-BE49-F238E27FC236}">
+                <a16:creationId xmlns:a16="http://schemas.microsoft.com/office/drawing/2014/main" id="{7E0FA429-42FE-2BA1-9C92-3B0D8C742A9F}"/>
+              </a:ext>
+            </a:extLst>
+          </p:cNvPr>
+          <p:cNvCxnSpPr>
+            <a:cxnSpLocks/>
+          </p:cNvCxnSpPr>
+          <p:nvPr/>
+        </p:nvCxnSpPr>
+        <p:spPr>
+          <a:xfrm flipV="1">
+            <a:off x="1998897" y="1773936"/>
+            <a:ext cx="832309" cy="15981"/>
+          </a:xfrm>
+          <a:prstGeom prst="straightConnector1">
+            <a:avLst/>
+          </a:prstGeom>
+          <a:ln w="19050">
+            <a:solidFill>
+              <a:srgbClr val="FFC000"/>
+            </a:solidFill>
+            <a:headEnd type="oval"/>
+            <a:tailEnd type="triangle"/>
+          </a:ln>
+        </p:spPr>
+        <p:style>
+          <a:lnRef idx="1">
+            <a:schemeClr val="accent1"/>
+          </a:lnRef>
+          <a:fillRef idx="0">
+            <a:schemeClr val="accent1"/>
+          </a:fillRef>
+          <a:effectRef idx="0">
+            <a:schemeClr val="accent1"/>
+          </a:effectRef>
+          <a:fontRef idx="minor">
+            <a:schemeClr val="tx1"/>
+          </a:fontRef>
+        </p:style>
+      </p:cxnSp>
     </p:spTree>
     <p:extLst>
       <p:ext uri="{BB962C8B-B14F-4D97-AF65-F5344CB8AC3E}">
@@ -6479,8 +6907,8 @@
         </p:blipFill>
         <p:spPr>
           <a:xfrm>
-            <a:off x="1231392" y="1034163"/>
-            <a:ext cx="7784592" cy="4183269"/>
+            <a:off x="359663" y="436755"/>
+            <a:ext cx="11211855" cy="6025005"/>
           </a:xfrm>
           <a:prstGeom prst="rect">
             <a:avLst/>

</xml_diff>

<commit_message>
before adding Surface to deps
</commit_message>
<xml_diff>
--- a/notebook/Manage_Relationship.pptx
+++ b/notebook/Manage_Relationship.pptx
@@ -5,7 +5,7 @@
     <p:sldMasterId id="2147483648" r:id="rId1"/>
   </p:sldMasterIdLst>
   <p:notesMasterIdLst>
-    <p:notesMasterId r:id="rId16"/>
+    <p:notesMasterId r:id="rId19"/>
   </p:notesMasterIdLst>
   <p:sldIdLst>
     <p:sldId id="256" r:id="rId2"/>
@@ -22,6 +22,9 @@
     <p:sldId id="269" r:id="rId13"/>
     <p:sldId id="270" r:id="rId14"/>
     <p:sldId id="271" r:id="rId15"/>
+    <p:sldId id="273" r:id="rId16"/>
+    <p:sldId id="275" r:id="rId17"/>
+    <p:sldId id="274" r:id="rId18"/>
   </p:sldIdLst>
   <p:sldSz cx="12192000" cy="6858000"/>
   <p:notesSz cx="6858000" cy="9144000"/>
@@ -5249,10 +5252,10 @@
       </p:grpSpPr>
       <p:pic>
         <p:nvPicPr>
-          <p:cNvPr id="65" name="Picture 64">
-            <a:extLst>
-              <a:ext uri="{FF2B5EF4-FFF2-40B4-BE49-F238E27FC236}">
-                <a16:creationId xmlns:a16="http://schemas.microsoft.com/office/drawing/2014/main" id="{A9792E06-2EC3-9ACD-FDB8-293774546AEC}"/>
+          <p:cNvPr id="4" name="Picture 3">
+            <a:extLst>
+              <a:ext uri="{FF2B5EF4-FFF2-40B4-BE49-F238E27FC236}">
+                <a16:creationId xmlns:a16="http://schemas.microsoft.com/office/drawing/2014/main" id="{0D2094DE-E2E6-546E-C645-DB81BCA879BF}"/>
               </a:ext>
             </a:extLst>
           </p:cNvPr>
@@ -5269,8 +5272,8 @@
         </p:blipFill>
         <p:spPr>
           <a:xfrm>
-            <a:off x="2722456" y="805299"/>
-            <a:ext cx="1886012" cy="1774602"/>
+            <a:off x="356206" y="836967"/>
+            <a:ext cx="1684340" cy="2816569"/>
           </a:xfrm>
           <a:prstGeom prst="rect">
             <a:avLst/>
@@ -5279,10 +5282,10 @@
       </p:pic>
       <p:pic>
         <p:nvPicPr>
-          <p:cNvPr id="37" name="Picture 36">
-            <a:extLst>
-              <a:ext uri="{FF2B5EF4-FFF2-40B4-BE49-F238E27FC236}">
-                <a16:creationId xmlns:a16="http://schemas.microsoft.com/office/drawing/2014/main" id="{8CEBCBE7-BBB2-220E-3A7D-FDDD5EB0A7F4}"/>
+          <p:cNvPr id="65" name="Picture 64">
+            <a:extLst>
+              <a:ext uri="{FF2B5EF4-FFF2-40B4-BE49-F238E27FC236}">
+                <a16:creationId xmlns:a16="http://schemas.microsoft.com/office/drawing/2014/main" id="{A9792E06-2EC3-9ACD-FDB8-293774546AEC}"/>
               </a:ext>
             </a:extLst>
           </p:cNvPr>
@@ -5299,92 +5302,20 @@
         </p:blipFill>
         <p:spPr>
           <a:xfrm>
-            <a:off x="4900240" y="794912"/>
-            <a:ext cx="5712127" cy="2337255"/>
+            <a:off x="2722456" y="805299"/>
+            <a:ext cx="1886012" cy="1774602"/>
           </a:xfrm>
           <a:prstGeom prst="rect">
             <a:avLst/>
           </a:prstGeom>
         </p:spPr>
       </p:pic>
-      <p:sp>
-        <p:nvSpPr>
-          <p:cNvPr id="6" name="TextBox 5">
-            <a:extLst>
-              <a:ext uri="{FF2B5EF4-FFF2-40B4-BE49-F238E27FC236}">
-                <a16:creationId xmlns:a16="http://schemas.microsoft.com/office/drawing/2014/main" id="{9399A366-7517-3584-26FF-1EF0A7097BE9}"/>
-              </a:ext>
-            </a:extLst>
-          </p:cNvPr>
-          <p:cNvSpPr txBox="1"/>
-          <p:nvPr/>
-        </p:nvSpPr>
-        <p:spPr>
-          <a:xfrm>
-            <a:off x="185561" y="526550"/>
-            <a:ext cx="1989347" cy="307777"/>
-          </a:xfrm>
-          <a:prstGeom prst="rect">
-            <a:avLst/>
-          </a:prstGeom>
-          <a:noFill/>
-        </p:spPr>
-        <p:txBody>
-          <a:bodyPr wrap="square" rtlCol="0">
-            <a:spAutoFit/>
-          </a:bodyPr>
-          <a:lstStyle/>
-          <a:p>
-            <a:pPr algn="ctr"/>
-            <a:r>
-              <a:rPr lang="en-US" sz="1400" b="1" dirty="0"/>
-              <a:t>Ash.Resource</a:t>
-            </a:r>
-          </a:p>
-        </p:txBody>
-      </p:sp>
-      <p:sp>
-        <p:nvSpPr>
-          <p:cNvPr id="7" name="TextBox 6">
-            <a:extLst>
-              <a:ext uri="{FF2B5EF4-FFF2-40B4-BE49-F238E27FC236}">
-                <a16:creationId xmlns:a16="http://schemas.microsoft.com/office/drawing/2014/main" id="{4C6415AF-217F-E74C-5DA2-E232C6BF4E4E}"/>
-              </a:ext>
-            </a:extLst>
-          </p:cNvPr>
-          <p:cNvSpPr txBox="1"/>
-          <p:nvPr/>
-        </p:nvSpPr>
-        <p:spPr>
-          <a:xfrm>
-            <a:off x="768343" y="342238"/>
-            <a:ext cx="10920389" cy="307777"/>
-          </a:xfrm>
-          <a:prstGeom prst="rect">
-            <a:avLst/>
-          </a:prstGeom>
-          <a:noFill/>
-        </p:spPr>
-        <p:txBody>
-          <a:bodyPr wrap="square" rtlCol="0">
-            <a:spAutoFit/>
-          </a:bodyPr>
-          <a:lstStyle/>
-          <a:p>
-            <a:pPr algn="ctr"/>
-            <a:r>
-              <a:rPr lang="en-US" sz="1400" b="1" dirty="0"/>
-              <a:t>Multi-Line AshPhoenix.Form</a:t>
-            </a:r>
-          </a:p>
-        </p:txBody>
-      </p:sp>
       <p:pic>
         <p:nvPicPr>
-          <p:cNvPr id="24" name="Picture 23">
-            <a:extLst>
-              <a:ext uri="{FF2B5EF4-FFF2-40B4-BE49-F238E27FC236}">
-                <a16:creationId xmlns:a16="http://schemas.microsoft.com/office/drawing/2014/main" id="{19394488-7E88-DBDF-4CEB-C9AF4940137E}"/>
+          <p:cNvPr id="37" name="Picture 36">
+            <a:extLst>
+              <a:ext uri="{FF2B5EF4-FFF2-40B4-BE49-F238E27FC236}">
+                <a16:creationId xmlns:a16="http://schemas.microsoft.com/office/drawing/2014/main" id="{8CEBCBE7-BBB2-220E-3A7D-FDDD5EB0A7F4}"/>
               </a:ext>
             </a:extLst>
           </p:cNvPr>
@@ -5401,79 +5332,20 @@
         </p:blipFill>
         <p:spPr>
           <a:xfrm>
-            <a:off x="185562" y="794912"/>
-            <a:ext cx="1989347" cy="2663952"/>
+            <a:off x="4900240" y="794912"/>
+            <a:ext cx="5712127" cy="2337255"/>
           </a:xfrm>
           <a:prstGeom prst="rect">
             <a:avLst/>
           </a:prstGeom>
-          <a:ln>
-            <a:solidFill>
-              <a:schemeClr val="tx1">
-                <a:lumMod val="50000"/>
-                <a:lumOff val="50000"/>
-              </a:schemeClr>
-            </a:solidFill>
-          </a:ln>
         </p:spPr>
       </p:pic>
       <p:sp>
         <p:nvSpPr>
-          <p:cNvPr id="2" name="Can 1">
-            <a:extLst>
-              <a:ext uri="{FF2B5EF4-FFF2-40B4-BE49-F238E27FC236}">
-                <a16:creationId xmlns:a16="http://schemas.microsoft.com/office/drawing/2014/main" id="{B63CB259-64B5-3A08-44D6-AEE97341C32D}"/>
-              </a:ext>
-            </a:extLst>
-          </p:cNvPr>
-          <p:cNvSpPr/>
-          <p:nvPr/>
-        </p:nvSpPr>
-        <p:spPr>
-          <a:xfrm>
-            <a:off x="1998897" y="1940042"/>
-            <a:ext cx="445923" cy="429542"/>
-          </a:xfrm>
-          <a:prstGeom prst="can">
-            <a:avLst/>
-          </a:prstGeom>
-          <a:solidFill>
-            <a:schemeClr val="accent4">
-              <a:lumMod val="75000"/>
-            </a:schemeClr>
-          </a:solidFill>
-        </p:spPr>
-        <p:style>
-          <a:lnRef idx="2">
-            <a:schemeClr val="accent1">
-              <a:shade val="50000"/>
-            </a:schemeClr>
-          </a:lnRef>
-          <a:fillRef idx="1">
-            <a:schemeClr val="accent1"/>
-          </a:fillRef>
-          <a:effectRef idx="0">
-            <a:schemeClr val="accent1"/>
-          </a:effectRef>
-          <a:fontRef idx="minor">
-            <a:schemeClr val="lt1"/>
-          </a:fontRef>
-        </p:style>
-        <p:txBody>
-          <a:bodyPr rtlCol="0" anchor="ctr"/>
-          <a:lstStyle/>
-          <a:p>
-            <a:pPr algn="ctr"/>
-            <a:endParaRPr lang="en-US"/>
-          </a:p>
-        </p:txBody>
-      </p:sp>
-      <p:sp>
-        <p:nvSpPr>
-          <p:cNvPr id="26" name="TextBox 25">
-            <a:extLst>
-              <a:ext uri="{FF2B5EF4-FFF2-40B4-BE49-F238E27FC236}">
-                <a16:creationId xmlns:a16="http://schemas.microsoft.com/office/drawing/2014/main" id="{2379E5EA-A81D-9961-CD18-8120ADA4878D}"/>
+          <p:cNvPr id="6" name="TextBox 5">
+            <a:extLst>
+              <a:ext uri="{FF2B5EF4-FFF2-40B4-BE49-F238E27FC236}">
+                <a16:creationId xmlns:a16="http://schemas.microsoft.com/office/drawing/2014/main" id="{9399A366-7517-3584-26FF-1EF0A7097BE9}"/>
               </a:ext>
             </a:extLst>
           </p:cNvPr>
@@ -5482,8 +5354,8 @@
         </p:nvSpPr>
         <p:spPr>
           <a:xfrm>
-            <a:off x="2816479" y="531428"/>
-            <a:ext cx="1609318" cy="307777"/>
+            <a:off x="185561" y="526550"/>
+            <a:ext cx="1989347" cy="307777"/>
           </a:xfrm>
           <a:prstGeom prst="rect">
             <a:avLst/>
@@ -5499,6 +5371,78 @@
             <a:pPr algn="ctr"/>
             <a:r>
               <a:rPr lang="en-US" sz="1400" b="1" dirty="0"/>
+              <a:t>Ash.Resource</a:t>
+            </a:r>
+          </a:p>
+        </p:txBody>
+      </p:sp>
+      <p:sp>
+        <p:nvSpPr>
+          <p:cNvPr id="7" name="TextBox 6">
+            <a:extLst>
+              <a:ext uri="{FF2B5EF4-FFF2-40B4-BE49-F238E27FC236}">
+                <a16:creationId xmlns:a16="http://schemas.microsoft.com/office/drawing/2014/main" id="{4C6415AF-217F-E74C-5DA2-E232C6BF4E4E}"/>
+              </a:ext>
+            </a:extLst>
+          </p:cNvPr>
+          <p:cNvSpPr txBox="1"/>
+          <p:nvPr/>
+        </p:nvSpPr>
+        <p:spPr>
+          <a:xfrm>
+            <a:off x="768343" y="342238"/>
+            <a:ext cx="10920389" cy="307777"/>
+          </a:xfrm>
+          <a:prstGeom prst="rect">
+            <a:avLst/>
+          </a:prstGeom>
+          <a:noFill/>
+        </p:spPr>
+        <p:txBody>
+          <a:bodyPr wrap="square" rtlCol="0">
+            <a:spAutoFit/>
+          </a:bodyPr>
+          <a:lstStyle/>
+          <a:p>
+            <a:pPr algn="ctr"/>
+            <a:r>
+              <a:rPr lang="en-US" sz="1400" b="1" dirty="0"/>
+              <a:t>Multi-Line AshPhoenix.Form</a:t>
+            </a:r>
+          </a:p>
+        </p:txBody>
+      </p:sp>
+      <p:sp>
+        <p:nvSpPr>
+          <p:cNvPr id="26" name="TextBox 25">
+            <a:extLst>
+              <a:ext uri="{FF2B5EF4-FFF2-40B4-BE49-F238E27FC236}">
+                <a16:creationId xmlns:a16="http://schemas.microsoft.com/office/drawing/2014/main" id="{2379E5EA-A81D-9961-CD18-8120ADA4878D}"/>
+              </a:ext>
+            </a:extLst>
+          </p:cNvPr>
+          <p:cNvSpPr txBox="1"/>
+          <p:nvPr/>
+        </p:nvSpPr>
+        <p:spPr>
+          <a:xfrm>
+            <a:off x="2816479" y="531428"/>
+            <a:ext cx="1609318" cy="307777"/>
+          </a:xfrm>
+          <a:prstGeom prst="rect">
+            <a:avLst/>
+          </a:prstGeom>
+          <a:noFill/>
+        </p:spPr>
+        <p:txBody>
+          <a:bodyPr wrap="square" rtlCol="0">
+            <a:spAutoFit/>
+          </a:bodyPr>
+          <a:lstStyle/>
+          <a:p>
+            <a:pPr algn="ctr"/>
+            <a:r>
+              <a:rPr lang="en-US" sz="1400" b="1" dirty="0"/>
               <a:t>Ash.Changeset</a:t>
             </a:r>
           </a:p>
@@ -5522,52 +5466,6 @@
           <a:xfrm>
             <a:off x="4121108" y="951757"/>
             <a:ext cx="931311" cy="78467"/>
-          </a:xfrm>
-          <a:prstGeom prst="straightConnector1">
-            <a:avLst/>
-          </a:prstGeom>
-          <a:ln w="19050">
-            <a:solidFill>
-              <a:srgbClr val="FFC000"/>
-            </a:solidFill>
-            <a:headEnd type="oval"/>
-            <a:tailEnd type="triangle"/>
-          </a:ln>
-        </p:spPr>
-        <p:style>
-          <a:lnRef idx="1">
-            <a:schemeClr val="accent1"/>
-          </a:lnRef>
-          <a:fillRef idx="0">
-            <a:schemeClr val="accent1"/>
-          </a:fillRef>
-          <a:effectRef idx="0">
-            <a:schemeClr val="accent1"/>
-          </a:effectRef>
-          <a:fontRef idx="minor">
-            <a:schemeClr val="tx1"/>
-          </a:fontRef>
-        </p:style>
-      </p:cxnSp>
-      <p:cxnSp>
-        <p:nvCxnSpPr>
-          <p:cNvPr id="40" name="Straight Arrow Connector 39">
-            <a:extLst>
-              <a:ext uri="{FF2B5EF4-FFF2-40B4-BE49-F238E27FC236}">
-                <a16:creationId xmlns:a16="http://schemas.microsoft.com/office/drawing/2014/main" id="{B2B3F9AC-61CA-0B4A-35DE-9FD34C11306A}"/>
-              </a:ext>
-            </a:extLst>
-          </p:cNvPr>
-          <p:cNvCxnSpPr>
-            <a:cxnSpLocks/>
-            <a:stCxn id="2" idx="4"/>
-          </p:cNvCxnSpPr>
-          <p:nvPr/>
-        </p:nvCxnSpPr>
-        <p:spPr>
-          <a:xfrm>
-            <a:off x="2444820" y="2154813"/>
-            <a:ext cx="386386" cy="0"/>
           </a:xfrm>
           <a:prstGeom prst="straightConnector1">
             <a:avLst/>
@@ -6387,6 +6285,103 @@
           <a:xfrm flipV="1">
             <a:off x="1998897" y="1773936"/>
             <a:ext cx="832309" cy="15981"/>
+          </a:xfrm>
+          <a:prstGeom prst="straightConnector1">
+            <a:avLst/>
+          </a:prstGeom>
+          <a:ln w="19050">
+            <a:solidFill>
+              <a:srgbClr val="FFC000"/>
+            </a:solidFill>
+            <a:headEnd type="oval"/>
+            <a:tailEnd type="triangle"/>
+          </a:ln>
+        </p:spPr>
+        <p:style>
+          <a:lnRef idx="1">
+            <a:schemeClr val="accent1"/>
+          </a:lnRef>
+          <a:fillRef idx="0">
+            <a:schemeClr val="accent1"/>
+          </a:fillRef>
+          <a:effectRef idx="0">
+            <a:schemeClr val="accent1"/>
+          </a:effectRef>
+          <a:fontRef idx="minor">
+            <a:schemeClr val="tx1"/>
+          </a:fontRef>
+        </p:style>
+      </p:cxnSp>
+      <p:sp>
+        <p:nvSpPr>
+          <p:cNvPr id="2" name="Can 1">
+            <a:extLst>
+              <a:ext uri="{FF2B5EF4-FFF2-40B4-BE49-F238E27FC236}">
+                <a16:creationId xmlns:a16="http://schemas.microsoft.com/office/drawing/2014/main" id="{B63CB259-64B5-3A08-44D6-AEE97341C32D}"/>
+              </a:ext>
+            </a:extLst>
+          </p:cNvPr>
+          <p:cNvSpPr/>
+          <p:nvPr/>
+        </p:nvSpPr>
+        <p:spPr>
+          <a:xfrm>
+            <a:off x="1998897" y="1940042"/>
+            <a:ext cx="445923" cy="429542"/>
+          </a:xfrm>
+          <a:prstGeom prst="can">
+            <a:avLst/>
+          </a:prstGeom>
+          <a:solidFill>
+            <a:schemeClr val="accent4">
+              <a:lumMod val="75000"/>
+            </a:schemeClr>
+          </a:solidFill>
+        </p:spPr>
+        <p:style>
+          <a:lnRef idx="2">
+            <a:schemeClr val="accent1">
+              <a:shade val="50000"/>
+            </a:schemeClr>
+          </a:lnRef>
+          <a:fillRef idx="1">
+            <a:schemeClr val="accent1"/>
+          </a:fillRef>
+          <a:effectRef idx="0">
+            <a:schemeClr val="accent1"/>
+          </a:effectRef>
+          <a:fontRef idx="minor">
+            <a:schemeClr val="lt1"/>
+          </a:fontRef>
+        </p:style>
+        <p:txBody>
+          <a:bodyPr rtlCol="0" anchor="ctr"/>
+          <a:lstStyle/>
+          <a:p>
+            <a:pPr algn="ctr"/>
+            <a:endParaRPr lang="en-US"/>
+          </a:p>
+        </p:txBody>
+      </p:sp>
+      <p:cxnSp>
+        <p:nvCxnSpPr>
+          <p:cNvPr id="40" name="Straight Arrow Connector 39">
+            <a:extLst>
+              <a:ext uri="{FF2B5EF4-FFF2-40B4-BE49-F238E27FC236}">
+                <a16:creationId xmlns:a16="http://schemas.microsoft.com/office/drawing/2014/main" id="{B2B3F9AC-61CA-0B4A-35DE-9FD34C11306A}"/>
+              </a:ext>
+            </a:extLst>
+          </p:cNvPr>
+          <p:cNvCxnSpPr>
+            <a:cxnSpLocks/>
+            <a:stCxn id="2" idx="4"/>
+          </p:cNvCxnSpPr>
+          <p:nvPr/>
+        </p:nvCxnSpPr>
+        <p:spPr>
+          <a:xfrm>
+            <a:off x="2444820" y="2154813"/>
+            <a:ext cx="386386" cy="0"/>
           </a:xfrm>
           <a:prstGeom prst="straightConnector1">
             <a:avLst/>
@@ -6977,7 +6972,7 @@
         </p:nvSpPr>
         <p:spPr>
           <a:xfrm>
-            <a:off x="3050339" y="2594688"/>
+            <a:off x="4347981" y="2441938"/>
             <a:ext cx="425581" cy="477055"/>
           </a:xfrm>
           <a:prstGeom prst="can">
@@ -7018,6 +7013,1489 @@
     <p:extLst>
       <p:ext uri="{BB962C8B-B14F-4D97-AF65-F5344CB8AC3E}">
         <p14:creationId xmlns:p14="http://schemas.microsoft.com/office/powerpoint/2010/main" val="951073479"/>
+      </p:ext>
+    </p:extLst>
+  </p:cSld>
+  <p:clrMapOvr>
+    <a:masterClrMapping/>
+  </p:clrMapOvr>
+</p:sld>
+</file>
+
+<file path=ppt/slides/slide15.xml><?xml version="1.0" encoding="utf-8"?>
+<p:sld xmlns:a="http://schemas.openxmlformats.org/drawingml/2006/main" xmlns:r="http://schemas.openxmlformats.org/officeDocument/2006/relationships" xmlns:p="http://schemas.openxmlformats.org/presentationml/2006/main">
+  <p:cSld>
+    <p:spTree>
+      <p:nvGrpSpPr>
+        <p:cNvPr id="1" name=""/>
+        <p:cNvGrpSpPr/>
+        <p:nvPr/>
+      </p:nvGrpSpPr>
+      <p:grpSpPr>
+        <a:xfrm>
+          <a:off x="0" y="0"/>
+          <a:ext cx="0" cy="0"/>
+          <a:chOff x="0" y="0"/>
+          <a:chExt cx="0" cy="0"/>
+        </a:xfrm>
+      </p:grpSpPr>
+      <p:pic>
+        <p:nvPicPr>
+          <p:cNvPr id="4" name="Picture 3">
+            <a:extLst>
+              <a:ext uri="{FF2B5EF4-FFF2-40B4-BE49-F238E27FC236}">
+                <a16:creationId xmlns:a16="http://schemas.microsoft.com/office/drawing/2014/main" id="{FA910988-F155-75DE-CABD-1B734478A3C9}"/>
+              </a:ext>
+            </a:extLst>
+          </p:cNvPr>
+          <p:cNvPicPr>
+            <a:picLocks noChangeAspect="1"/>
+          </p:cNvPicPr>
+          <p:nvPr/>
+        </p:nvPicPr>
+        <p:blipFill>
+          <a:blip r:embed="rId2"/>
+          <a:stretch>
+            <a:fillRect/>
+          </a:stretch>
+        </p:blipFill>
+        <p:spPr>
+          <a:xfrm>
+            <a:off x="121024" y="165857"/>
+            <a:ext cx="8218332" cy="1071271"/>
+          </a:xfrm>
+          <a:prstGeom prst="rect">
+            <a:avLst/>
+          </a:prstGeom>
+        </p:spPr>
+      </p:pic>
+      <p:pic>
+        <p:nvPicPr>
+          <p:cNvPr id="5" name="Picture 4">
+            <a:extLst>
+              <a:ext uri="{FF2B5EF4-FFF2-40B4-BE49-F238E27FC236}">
+                <a16:creationId xmlns:a16="http://schemas.microsoft.com/office/drawing/2014/main" id="{27F2DF09-B148-1249-538D-5ABF37D7D038}"/>
+              </a:ext>
+            </a:extLst>
+          </p:cNvPr>
+          <p:cNvPicPr>
+            <a:picLocks noChangeAspect="1"/>
+          </p:cNvPicPr>
+          <p:nvPr/>
+        </p:nvPicPr>
+        <p:blipFill>
+          <a:blip r:embed="rId3"/>
+          <a:stretch>
+            <a:fillRect/>
+          </a:stretch>
+        </p:blipFill>
+        <p:spPr>
+          <a:xfrm>
+            <a:off x="202014" y="1514661"/>
+            <a:ext cx="5312183" cy="4518212"/>
+          </a:xfrm>
+          <a:prstGeom prst="rect">
+            <a:avLst/>
+          </a:prstGeom>
+        </p:spPr>
+      </p:pic>
+      <p:pic>
+        <p:nvPicPr>
+          <p:cNvPr id="6" name="Picture 5">
+            <a:extLst>
+              <a:ext uri="{FF2B5EF4-FFF2-40B4-BE49-F238E27FC236}">
+                <a16:creationId xmlns:a16="http://schemas.microsoft.com/office/drawing/2014/main" id="{6E4D5725-E28C-3A02-E86F-EBA4228E0061}"/>
+              </a:ext>
+            </a:extLst>
+          </p:cNvPr>
+          <p:cNvPicPr>
+            <a:picLocks noChangeAspect="1"/>
+          </p:cNvPicPr>
+          <p:nvPr/>
+        </p:nvPicPr>
+        <p:blipFill>
+          <a:blip r:embed="rId4"/>
+          <a:stretch>
+            <a:fillRect/>
+          </a:stretch>
+        </p:blipFill>
+        <p:spPr>
+          <a:xfrm>
+            <a:off x="5713470" y="1933389"/>
+            <a:ext cx="5635848" cy="3680757"/>
+          </a:xfrm>
+          <a:prstGeom prst="rect">
+            <a:avLst/>
+          </a:prstGeom>
+        </p:spPr>
+      </p:pic>
+      <p:sp>
+        <p:nvSpPr>
+          <p:cNvPr id="7" name="TextBox 6">
+            <a:extLst>
+              <a:ext uri="{FF2B5EF4-FFF2-40B4-BE49-F238E27FC236}">
+                <a16:creationId xmlns:a16="http://schemas.microsoft.com/office/drawing/2014/main" id="{4F0B1217-EE61-885E-7D24-0896A6BC5ADA}"/>
+              </a:ext>
+            </a:extLst>
+          </p:cNvPr>
+          <p:cNvSpPr txBox="1"/>
+          <p:nvPr/>
+        </p:nvSpPr>
+        <p:spPr>
+          <a:xfrm>
+            <a:off x="7853082" y="1557332"/>
+            <a:ext cx="1674159" cy="369332"/>
+          </a:xfrm>
+          <a:prstGeom prst="rect">
+            <a:avLst/>
+          </a:prstGeom>
+          <a:noFill/>
+        </p:spPr>
+        <p:txBody>
+          <a:bodyPr wrap="square" rtlCol="0">
+            <a:spAutoFit/>
+          </a:bodyPr>
+          <a:lstStyle/>
+          <a:p>
+            <a:r>
+              <a:rPr lang="en-US" dirty="0"/>
+              <a:t>Live View</a:t>
+            </a:r>
+          </a:p>
+        </p:txBody>
+      </p:sp>
+      <p:sp>
+        <p:nvSpPr>
+          <p:cNvPr id="8" name="TextBox 7">
+            <a:extLst>
+              <a:ext uri="{FF2B5EF4-FFF2-40B4-BE49-F238E27FC236}">
+                <a16:creationId xmlns:a16="http://schemas.microsoft.com/office/drawing/2014/main" id="{56147BC6-77FC-0717-28BC-8F67FD4F97B1}"/>
+              </a:ext>
+            </a:extLst>
+          </p:cNvPr>
+          <p:cNvSpPr txBox="1"/>
+          <p:nvPr/>
+        </p:nvSpPr>
+        <p:spPr>
+          <a:xfrm>
+            <a:off x="1854573" y="1188000"/>
+            <a:ext cx="1674159" cy="369332"/>
+          </a:xfrm>
+          <a:prstGeom prst="rect">
+            <a:avLst/>
+          </a:prstGeom>
+          <a:noFill/>
+        </p:spPr>
+        <p:txBody>
+          <a:bodyPr wrap="square" rtlCol="0">
+            <a:spAutoFit/>
+          </a:bodyPr>
+          <a:lstStyle/>
+          <a:p>
+            <a:r>
+              <a:rPr lang="en-US" dirty="0"/>
+              <a:t>Component</a:t>
+            </a:r>
+          </a:p>
+        </p:txBody>
+      </p:sp>
+      <p:sp>
+        <p:nvSpPr>
+          <p:cNvPr id="9" name="Round Diagonal Corner Rectangle 8">
+            <a:extLst>
+              <a:ext uri="{FF2B5EF4-FFF2-40B4-BE49-F238E27FC236}">
+                <a16:creationId xmlns:a16="http://schemas.microsoft.com/office/drawing/2014/main" id="{8ED5F09F-AC3A-41EB-E13D-1D8811080DCF}"/>
+              </a:ext>
+            </a:extLst>
+          </p:cNvPr>
+          <p:cNvSpPr/>
+          <p:nvPr/>
+        </p:nvSpPr>
+        <p:spPr>
+          <a:xfrm>
+            <a:off x="5957046" y="4558553"/>
+            <a:ext cx="4383741" cy="396688"/>
+          </a:xfrm>
+          <a:prstGeom prst="round2DiagRect">
+            <a:avLst/>
+          </a:prstGeom>
+          <a:noFill/>
+          <a:ln w="25400">
+            <a:solidFill>
+              <a:srgbClr val="FFC000"/>
+            </a:solidFill>
+            <a:prstDash val="sysDot"/>
+          </a:ln>
+        </p:spPr>
+        <p:style>
+          <a:lnRef idx="2">
+            <a:schemeClr val="accent1">
+              <a:shade val="50000"/>
+            </a:schemeClr>
+          </a:lnRef>
+          <a:fillRef idx="1">
+            <a:schemeClr val="accent1"/>
+          </a:fillRef>
+          <a:effectRef idx="0">
+            <a:schemeClr val="accent1"/>
+          </a:effectRef>
+          <a:fontRef idx="minor">
+            <a:schemeClr val="lt1"/>
+          </a:fontRef>
+        </p:style>
+        <p:txBody>
+          <a:bodyPr rtlCol="0" anchor="ctr"/>
+          <a:lstStyle/>
+          <a:p>
+            <a:pPr algn="ctr"/>
+            <a:endParaRPr lang="en-US"/>
+          </a:p>
+        </p:txBody>
+      </p:sp>
+      <p:cxnSp>
+        <p:nvCxnSpPr>
+          <p:cNvPr id="11" name="Straight Arrow Connector 10">
+            <a:extLst>
+              <a:ext uri="{FF2B5EF4-FFF2-40B4-BE49-F238E27FC236}">
+                <a16:creationId xmlns:a16="http://schemas.microsoft.com/office/drawing/2014/main" id="{25933A34-BB0E-E6A5-E259-E9334C526E86}"/>
+              </a:ext>
+            </a:extLst>
+          </p:cNvPr>
+          <p:cNvCxnSpPr>
+            <a:cxnSpLocks/>
+          </p:cNvCxnSpPr>
+          <p:nvPr/>
+        </p:nvCxnSpPr>
+        <p:spPr>
+          <a:xfrm flipH="1" flipV="1">
+            <a:off x="7362312" y="1021976"/>
+            <a:ext cx="2541447" cy="3536577"/>
+          </a:xfrm>
+          <a:prstGeom prst="straightConnector1">
+            <a:avLst/>
+          </a:prstGeom>
+          <a:ln>
+            <a:solidFill>
+              <a:srgbClr val="FFC000"/>
+            </a:solidFill>
+            <a:headEnd type="oval"/>
+            <a:tailEnd type="triangle"/>
+          </a:ln>
+        </p:spPr>
+        <p:style>
+          <a:lnRef idx="1">
+            <a:schemeClr val="accent1"/>
+          </a:lnRef>
+          <a:fillRef idx="0">
+            <a:schemeClr val="accent1"/>
+          </a:fillRef>
+          <a:effectRef idx="0">
+            <a:schemeClr val="accent1"/>
+          </a:effectRef>
+          <a:fontRef idx="minor">
+            <a:schemeClr val="tx1"/>
+          </a:fontRef>
+        </p:style>
+      </p:cxnSp>
+      <p:cxnSp>
+        <p:nvCxnSpPr>
+          <p:cNvPr id="14" name="Straight Arrow Connector 13">
+            <a:extLst>
+              <a:ext uri="{FF2B5EF4-FFF2-40B4-BE49-F238E27FC236}">
+                <a16:creationId xmlns:a16="http://schemas.microsoft.com/office/drawing/2014/main" id="{CED5A831-EE9B-75C7-42B4-B487C6E33121}"/>
+              </a:ext>
+            </a:extLst>
+          </p:cNvPr>
+          <p:cNvCxnSpPr>
+            <a:cxnSpLocks/>
+          </p:cNvCxnSpPr>
+          <p:nvPr/>
+        </p:nvCxnSpPr>
+        <p:spPr>
+          <a:xfrm flipH="1" flipV="1">
+            <a:off x="5984470" y="1021976"/>
+            <a:ext cx="3441918" cy="3536577"/>
+          </a:xfrm>
+          <a:prstGeom prst="straightConnector1">
+            <a:avLst/>
+          </a:prstGeom>
+          <a:ln>
+            <a:solidFill>
+              <a:srgbClr val="FFC000"/>
+            </a:solidFill>
+            <a:headEnd type="oval"/>
+            <a:tailEnd type="triangle"/>
+          </a:ln>
+        </p:spPr>
+        <p:style>
+          <a:lnRef idx="1">
+            <a:schemeClr val="accent1"/>
+          </a:lnRef>
+          <a:fillRef idx="0">
+            <a:schemeClr val="accent1"/>
+          </a:fillRef>
+          <a:effectRef idx="0">
+            <a:schemeClr val="accent1"/>
+          </a:effectRef>
+          <a:fontRef idx="minor">
+            <a:schemeClr val="tx1"/>
+          </a:fontRef>
+        </p:style>
+      </p:cxnSp>
+      <p:cxnSp>
+        <p:nvCxnSpPr>
+          <p:cNvPr id="16" name="Straight Arrow Connector 15">
+            <a:extLst>
+              <a:ext uri="{FF2B5EF4-FFF2-40B4-BE49-F238E27FC236}">
+                <a16:creationId xmlns:a16="http://schemas.microsoft.com/office/drawing/2014/main" id="{737FA3BA-54D6-0627-864D-05C485E8FC01}"/>
+              </a:ext>
+            </a:extLst>
+          </p:cNvPr>
+          <p:cNvCxnSpPr>
+            <a:cxnSpLocks/>
+          </p:cNvCxnSpPr>
+          <p:nvPr/>
+        </p:nvCxnSpPr>
+        <p:spPr>
+          <a:xfrm flipH="1" flipV="1">
+            <a:off x="941294" y="3213847"/>
+            <a:ext cx="5153695" cy="1418665"/>
+          </a:xfrm>
+          <a:prstGeom prst="straightConnector1">
+            <a:avLst/>
+          </a:prstGeom>
+          <a:ln>
+            <a:solidFill>
+              <a:srgbClr val="FFC000"/>
+            </a:solidFill>
+            <a:headEnd type="oval"/>
+            <a:tailEnd type="triangle"/>
+          </a:ln>
+        </p:spPr>
+        <p:style>
+          <a:lnRef idx="1">
+            <a:schemeClr val="accent1"/>
+          </a:lnRef>
+          <a:fillRef idx="0">
+            <a:schemeClr val="accent1"/>
+          </a:fillRef>
+          <a:effectRef idx="0">
+            <a:schemeClr val="accent1"/>
+          </a:effectRef>
+          <a:fontRef idx="minor">
+            <a:schemeClr val="tx1"/>
+          </a:fontRef>
+        </p:style>
+      </p:cxnSp>
+      <p:cxnSp>
+        <p:nvCxnSpPr>
+          <p:cNvPr id="19" name="Straight Arrow Connector 18">
+            <a:extLst>
+              <a:ext uri="{FF2B5EF4-FFF2-40B4-BE49-F238E27FC236}">
+                <a16:creationId xmlns:a16="http://schemas.microsoft.com/office/drawing/2014/main" id="{B1E90693-0EE2-06AD-0F40-D61A96ACDA35}"/>
+              </a:ext>
+            </a:extLst>
+          </p:cNvPr>
+          <p:cNvCxnSpPr>
+            <a:cxnSpLocks/>
+          </p:cNvCxnSpPr>
+          <p:nvPr/>
+        </p:nvCxnSpPr>
+        <p:spPr>
+          <a:xfrm flipH="1">
+            <a:off x="1051954" y="5112128"/>
+            <a:ext cx="1830604" cy="0"/>
+          </a:xfrm>
+          <a:prstGeom prst="straightConnector1">
+            <a:avLst/>
+          </a:prstGeom>
+          <a:ln>
+            <a:solidFill>
+              <a:srgbClr val="FFC000"/>
+            </a:solidFill>
+            <a:headEnd type="none"/>
+            <a:tailEnd type="none"/>
+          </a:ln>
+        </p:spPr>
+        <p:style>
+          <a:lnRef idx="1">
+            <a:schemeClr val="accent1"/>
+          </a:lnRef>
+          <a:fillRef idx="0">
+            <a:schemeClr val="accent1"/>
+          </a:fillRef>
+          <a:effectRef idx="0">
+            <a:schemeClr val="accent1"/>
+          </a:effectRef>
+          <a:fontRef idx="minor">
+            <a:schemeClr val="tx1"/>
+          </a:fontRef>
+        </p:style>
+      </p:cxnSp>
+      <p:pic>
+        <p:nvPicPr>
+          <p:cNvPr id="25" name="Picture 24">
+            <a:extLst>
+              <a:ext uri="{FF2B5EF4-FFF2-40B4-BE49-F238E27FC236}">
+                <a16:creationId xmlns:a16="http://schemas.microsoft.com/office/drawing/2014/main" id="{86614724-FC52-6E1E-C523-9F1D6AF917B5}"/>
+              </a:ext>
+            </a:extLst>
+          </p:cNvPr>
+          <p:cNvPicPr>
+            <a:picLocks noChangeAspect="1"/>
+          </p:cNvPicPr>
+          <p:nvPr/>
+        </p:nvPicPr>
+        <p:blipFill>
+          <a:blip r:embed="rId5"/>
+          <a:stretch>
+            <a:fillRect/>
+          </a:stretch>
+        </p:blipFill>
+        <p:spPr>
+          <a:xfrm>
+            <a:off x="6068095" y="6148775"/>
+            <a:ext cx="5403067" cy="460456"/>
+          </a:xfrm>
+          <a:prstGeom prst="rect">
+            <a:avLst/>
+          </a:prstGeom>
+        </p:spPr>
+      </p:pic>
+      <p:sp>
+        <p:nvSpPr>
+          <p:cNvPr id="26" name="TextBox 25">
+            <a:extLst>
+              <a:ext uri="{FF2B5EF4-FFF2-40B4-BE49-F238E27FC236}">
+                <a16:creationId xmlns:a16="http://schemas.microsoft.com/office/drawing/2014/main" id="{B12D7050-15B1-4C64-B054-5B55CEA69121}"/>
+              </a:ext>
+            </a:extLst>
+          </p:cNvPr>
+          <p:cNvSpPr txBox="1"/>
+          <p:nvPr/>
+        </p:nvSpPr>
+        <p:spPr>
+          <a:xfrm>
+            <a:off x="6029899" y="5865053"/>
+            <a:ext cx="4921624" cy="276999"/>
+          </a:xfrm>
+          <a:prstGeom prst="rect">
+            <a:avLst/>
+          </a:prstGeom>
+          <a:noFill/>
+        </p:spPr>
+        <p:txBody>
+          <a:bodyPr wrap="square" rtlCol="0">
+            <a:spAutoFit/>
+          </a:bodyPr>
+          <a:lstStyle/>
+          <a:p>
+            <a:r>
+              <a:rPr lang="en-US" sz="1200" dirty="0"/>
+              <a:t>Is it possible somehow to pass this in for entries instead?</a:t>
+            </a:r>
+          </a:p>
+        </p:txBody>
+      </p:sp>
+    </p:spTree>
+    <p:extLst>
+      <p:ext uri="{BB962C8B-B14F-4D97-AF65-F5344CB8AC3E}">
+        <p14:creationId xmlns:p14="http://schemas.microsoft.com/office/powerpoint/2010/main" val="4190159809"/>
+      </p:ext>
+    </p:extLst>
+  </p:cSld>
+  <p:clrMapOvr>
+    <a:masterClrMapping/>
+  </p:clrMapOvr>
+</p:sld>
+</file>
+
+<file path=ppt/slides/slide16.xml><?xml version="1.0" encoding="utf-8"?>
+<p:sld xmlns:a="http://schemas.openxmlformats.org/drawingml/2006/main" xmlns:r="http://schemas.openxmlformats.org/officeDocument/2006/relationships" xmlns:p="http://schemas.openxmlformats.org/presentationml/2006/main">
+  <p:cSld>
+    <p:spTree>
+      <p:nvGrpSpPr>
+        <p:cNvPr id="1" name=""/>
+        <p:cNvGrpSpPr/>
+        <p:nvPr/>
+      </p:nvGrpSpPr>
+      <p:grpSpPr>
+        <a:xfrm>
+          <a:off x="0" y="0"/>
+          <a:ext cx="0" cy="0"/>
+          <a:chOff x="0" y="0"/>
+          <a:chExt cx="0" cy="0"/>
+        </a:xfrm>
+      </p:grpSpPr>
+      <p:pic>
+        <p:nvPicPr>
+          <p:cNvPr id="2" name="Picture 1">
+            <a:extLst>
+              <a:ext uri="{FF2B5EF4-FFF2-40B4-BE49-F238E27FC236}">
+                <a16:creationId xmlns:a16="http://schemas.microsoft.com/office/drawing/2014/main" id="{ABD7C0D0-B576-DB8C-6023-504A181E9212}"/>
+              </a:ext>
+            </a:extLst>
+          </p:cNvPr>
+          <p:cNvPicPr>
+            <a:picLocks noChangeAspect="1"/>
+          </p:cNvPicPr>
+          <p:nvPr/>
+        </p:nvPicPr>
+        <p:blipFill>
+          <a:blip r:embed="rId2"/>
+          <a:stretch>
+            <a:fillRect/>
+          </a:stretch>
+        </p:blipFill>
+        <p:spPr>
+          <a:xfrm>
+            <a:off x="242047" y="484095"/>
+            <a:ext cx="8775544" cy="4249792"/>
+          </a:xfrm>
+          <a:prstGeom prst="rect">
+            <a:avLst/>
+          </a:prstGeom>
+        </p:spPr>
+      </p:pic>
+      <p:sp>
+        <p:nvSpPr>
+          <p:cNvPr id="15" name="Round Diagonal Corner Rectangle 14">
+            <a:extLst>
+              <a:ext uri="{FF2B5EF4-FFF2-40B4-BE49-F238E27FC236}">
+                <a16:creationId xmlns:a16="http://schemas.microsoft.com/office/drawing/2014/main" id="{95433771-B964-05B3-B102-9C61F4D1AA29}"/>
+              </a:ext>
+            </a:extLst>
+          </p:cNvPr>
+          <p:cNvSpPr/>
+          <p:nvPr/>
+        </p:nvSpPr>
+        <p:spPr>
+          <a:xfrm>
+            <a:off x="349623" y="2454088"/>
+            <a:ext cx="7449671" cy="605118"/>
+          </a:xfrm>
+          <a:prstGeom prst="round2DiagRect">
+            <a:avLst/>
+          </a:prstGeom>
+          <a:noFill/>
+          <a:ln w="25400">
+            <a:solidFill>
+              <a:srgbClr val="FFC000"/>
+            </a:solidFill>
+            <a:prstDash val="sysDot"/>
+          </a:ln>
+        </p:spPr>
+        <p:style>
+          <a:lnRef idx="2">
+            <a:schemeClr val="accent1">
+              <a:shade val="50000"/>
+            </a:schemeClr>
+          </a:lnRef>
+          <a:fillRef idx="1">
+            <a:schemeClr val="accent1"/>
+          </a:fillRef>
+          <a:effectRef idx="0">
+            <a:schemeClr val="accent1"/>
+          </a:effectRef>
+          <a:fontRef idx="minor">
+            <a:schemeClr val="lt1"/>
+          </a:fontRef>
+        </p:style>
+        <p:txBody>
+          <a:bodyPr rtlCol="0" anchor="ctr"/>
+          <a:lstStyle/>
+          <a:p>
+            <a:pPr algn="ctr"/>
+            <a:endParaRPr lang="en-US"/>
+          </a:p>
+        </p:txBody>
+      </p:sp>
+      <p:sp>
+        <p:nvSpPr>
+          <p:cNvPr id="3" name="TextBox 2">
+            <a:extLst>
+              <a:ext uri="{FF2B5EF4-FFF2-40B4-BE49-F238E27FC236}">
+                <a16:creationId xmlns:a16="http://schemas.microsoft.com/office/drawing/2014/main" id="{6258C8E7-6BF6-9D1F-3298-07794E59D092}"/>
+              </a:ext>
+            </a:extLst>
+          </p:cNvPr>
+          <p:cNvSpPr txBox="1"/>
+          <p:nvPr/>
+        </p:nvSpPr>
+        <p:spPr>
+          <a:xfrm>
+            <a:off x="3193676" y="2084756"/>
+            <a:ext cx="3173505" cy="369332"/>
+          </a:xfrm>
+          <a:prstGeom prst="rect">
+            <a:avLst/>
+          </a:prstGeom>
+          <a:noFill/>
+        </p:spPr>
+        <p:txBody>
+          <a:bodyPr wrap="square" rtlCol="0">
+            <a:spAutoFit/>
+          </a:bodyPr>
+          <a:lstStyle/>
+          <a:p>
+            <a:r>
+              <a:rPr lang="en-US" dirty="0">
+                <a:solidFill>
+                  <a:srgbClr val="FFC000"/>
+                </a:solidFill>
+              </a:rPr>
+              <a:t>This code works</a:t>
+            </a:r>
+          </a:p>
+        </p:txBody>
+      </p:sp>
+    </p:spTree>
+    <p:extLst>
+      <p:ext uri="{BB962C8B-B14F-4D97-AF65-F5344CB8AC3E}">
+        <p14:creationId xmlns:p14="http://schemas.microsoft.com/office/powerpoint/2010/main" val="917580923"/>
+      </p:ext>
+    </p:extLst>
+  </p:cSld>
+  <p:clrMapOvr>
+    <a:masterClrMapping/>
+  </p:clrMapOvr>
+</p:sld>
+</file>
+
+<file path=ppt/slides/slide17.xml><?xml version="1.0" encoding="utf-8"?>
+<p:sld xmlns:a="http://schemas.openxmlformats.org/drawingml/2006/main" xmlns:r="http://schemas.openxmlformats.org/officeDocument/2006/relationships" xmlns:p="http://schemas.openxmlformats.org/presentationml/2006/main">
+  <p:cSld>
+    <p:spTree>
+      <p:nvGrpSpPr>
+        <p:cNvPr id="1" name=""/>
+        <p:cNvGrpSpPr/>
+        <p:nvPr/>
+      </p:nvGrpSpPr>
+      <p:grpSpPr>
+        <a:xfrm>
+          <a:off x="0" y="0"/>
+          <a:ext cx="0" cy="0"/>
+          <a:chOff x="0" y="0"/>
+          <a:chExt cx="0" cy="0"/>
+        </a:xfrm>
+      </p:grpSpPr>
+      <p:pic>
+        <p:nvPicPr>
+          <p:cNvPr id="4" name="Picture 3">
+            <a:extLst>
+              <a:ext uri="{FF2B5EF4-FFF2-40B4-BE49-F238E27FC236}">
+                <a16:creationId xmlns:a16="http://schemas.microsoft.com/office/drawing/2014/main" id="{FA910988-F155-75DE-CABD-1B734478A3C9}"/>
+              </a:ext>
+            </a:extLst>
+          </p:cNvPr>
+          <p:cNvPicPr>
+            <a:picLocks noChangeAspect="1"/>
+          </p:cNvPicPr>
+          <p:nvPr/>
+        </p:nvPicPr>
+        <p:blipFill>
+          <a:blip r:embed="rId2"/>
+          <a:stretch>
+            <a:fillRect/>
+          </a:stretch>
+        </p:blipFill>
+        <p:spPr>
+          <a:xfrm>
+            <a:off x="302558" y="1174700"/>
+            <a:ext cx="8218332" cy="1071271"/>
+          </a:xfrm>
+          <a:prstGeom prst="rect">
+            <a:avLst/>
+          </a:prstGeom>
+        </p:spPr>
+      </p:pic>
+      <p:pic>
+        <p:nvPicPr>
+          <p:cNvPr id="5" name="Picture 4">
+            <a:extLst>
+              <a:ext uri="{FF2B5EF4-FFF2-40B4-BE49-F238E27FC236}">
+                <a16:creationId xmlns:a16="http://schemas.microsoft.com/office/drawing/2014/main" id="{27F2DF09-B148-1249-538D-5ABF37D7D038}"/>
+              </a:ext>
+            </a:extLst>
+          </p:cNvPr>
+          <p:cNvPicPr>
+            <a:picLocks noChangeAspect="1"/>
+          </p:cNvPicPr>
+          <p:nvPr/>
+        </p:nvPicPr>
+        <p:blipFill>
+          <a:blip r:embed="rId3"/>
+          <a:stretch>
+            <a:fillRect/>
+          </a:stretch>
+        </p:blipFill>
+        <p:spPr>
+          <a:xfrm>
+            <a:off x="6172810" y="2636378"/>
+            <a:ext cx="4726031" cy="4019668"/>
+          </a:xfrm>
+          <a:prstGeom prst="rect">
+            <a:avLst/>
+          </a:prstGeom>
+        </p:spPr>
+      </p:pic>
+      <p:pic>
+        <p:nvPicPr>
+          <p:cNvPr id="6" name="Picture 5">
+            <a:extLst>
+              <a:ext uri="{FF2B5EF4-FFF2-40B4-BE49-F238E27FC236}">
+                <a16:creationId xmlns:a16="http://schemas.microsoft.com/office/drawing/2014/main" id="{6E4D5725-E28C-3A02-E86F-EBA4228E0061}"/>
+              </a:ext>
+            </a:extLst>
+          </p:cNvPr>
+          <p:cNvPicPr>
+            <a:picLocks noChangeAspect="1"/>
+          </p:cNvPicPr>
+          <p:nvPr/>
+        </p:nvPicPr>
+        <p:blipFill>
+          <a:blip r:embed="rId4"/>
+          <a:stretch>
+            <a:fillRect/>
+          </a:stretch>
+        </p:blipFill>
+        <p:spPr>
+          <a:xfrm>
+            <a:off x="259157" y="2619189"/>
+            <a:ext cx="5635848" cy="3680757"/>
+          </a:xfrm>
+          <a:prstGeom prst="rect">
+            <a:avLst/>
+          </a:prstGeom>
+        </p:spPr>
+      </p:pic>
+      <p:sp>
+        <p:nvSpPr>
+          <p:cNvPr id="7" name="TextBox 6">
+            <a:extLst>
+              <a:ext uri="{FF2B5EF4-FFF2-40B4-BE49-F238E27FC236}">
+                <a16:creationId xmlns:a16="http://schemas.microsoft.com/office/drawing/2014/main" id="{4F0B1217-EE61-885E-7D24-0896A6BC5ADA}"/>
+              </a:ext>
+            </a:extLst>
+          </p:cNvPr>
+          <p:cNvSpPr txBox="1"/>
+          <p:nvPr/>
+        </p:nvSpPr>
+        <p:spPr>
+          <a:xfrm>
+            <a:off x="2383818" y="2240899"/>
+            <a:ext cx="1674159" cy="369332"/>
+          </a:xfrm>
+          <a:prstGeom prst="rect">
+            <a:avLst/>
+          </a:prstGeom>
+          <a:noFill/>
+        </p:spPr>
+        <p:txBody>
+          <a:bodyPr wrap="square" rtlCol="0">
+            <a:spAutoFit/>
+          </a:bodyPr>
+          <a:lstStyle/>
+          <a:p>
+            <a:r>
+              <a:rPr lang="en-US" dirty="0"/>
+              <a:t>Live View</a:t>
+            </a:r>
+          </a:p>
+        </p:txBody>
+      </p:sp>
+      <p:sp>
+        <p:nvSpPr>
+          <p:cNvPr id="8" name="TextBox 7">
+            <a:extLst>
+              <a:ext uri="{FF2B5EF4-FFF2-40B4-BE49-F238E27FC236}">
+                <a16:creationId xmlns:a16="http://schemas.microsoft.com/office/drawing/2014/main" id="{56147BC6-77FC-0717-28BC-8F67FD4F97B1}"/>
+              </a:ext>
+            </a:extLst>
+          </p:cNvPr>
+          <p:cNvSpPr txBox="1"/>
+          <p:nvPr/>
+        </p:nvSpPr>
+        <p:spPr>
+          <a:xfrm>
+            <a:off x="7683811" y="2304104"/>
+            <a:ext cx="1674159" cy="369332"/>
+          </a:xfrm>
+          <a:prstGeom prst="rect">
+            <a:avLst/>
+          </a:prstGeom>
+          <a:noFill/>
+        </p:spPr>
+        <p:txBody>
+          <a:bodyPr wrap="square" rtlCol="0">
+            <a:spAutoFit/>
+          </a:bodyPr>
+          <a:lstStyle/>
+          <a:p>
+            <a:r>
+              <a:rPr lang="en-US" dirty="0"/>
+              <a:t>Component</a:t>
+            </a:r>
+          </a:p>
+        </p:txBody>
+      </p:sp>
+      <p:sp>
+        <p:nvSpPr>
+          <p:cNvPr id="9" name="Round Diagonal Corner Rectangle 8">
+            <a:extLst>
+              <a:ext uri="{FF2B5EF4-FFF2-40B4-BE49-F238E27FC236}">
+                <a16:creationId xmlns:a16="http://schemas.microsoft.com/office/drawing/2014/main" id="{8ED5F09F-AC3A-41EB-E13D-1D8811080DCF}"/>
+              </a:ext>
+            </a:extLst>
+          </p:cNvPr>
+          <p:cNvSpPr/>
+          <p:nvPr/>
+        </p:nvSpPr>
+        <p:spPr>
+          <a:xfrm>
+            <a:off x="514941" y="5261765"/>
+            <a:ext cx="4278935" cy="396688"/>
+          </a:xfrm>
+          <a:prstGeom prst="round2DiagRect">
+            <a:avLst/>
+          </a:prstGeom>
+          <a:noFill/>
+          <a:ln w="25400">
+            <a:solidFill>
+              <a:srgbClr val="FFC000"/>
+            </a:solidFill>
+            <a:prstDash val="sysDot"/>
+          </a:ln>
+        </p:spPr>
+        <p:style>
+          <a:lnRef idx="2">
+            <a:schemeClr val="accent1">
+              <a:shade val="50000"/>
+            </a:schemeClr>
+          </a:lnRef>
+          <a:fillRef idx="1">
+            <a:schemeClr val="accent1"/>
+          </a:fillRef>
+          <a:effectRef idx="0">
+            <a:schemeClr val="accent1"/>
+          </a:effectRef>
+          <a:fontRef idx="minor">
+            <a:schemeClr val="lt1"/>
+          </a:fontRef>
+        </p:style>
+        <p:txBody>
+          <a:bodyPr rtlCol="0" anchor="ctr"/>
+          <a:lstStyle/>
+          <a:p>
+            <a:pPr algn="ctr"/>
+            <a:endParaRPr lang="en-US"/>
+          </a:p>
+        </p:txBody>
+      </p:sp>
+      <p:cxnSp>
+        <p:nvCxnSpPr>
+          <p:cNvPr id="11" name="Straight Arrow Connector 10">
+            <a:extLst>
+              <a:ext uri="{FF2B5EF4-FFF2-40B4-BE49-F238E27FC236}">
+                <a16:creationId xmlns:a16="http://schemas.microsoft.com/office/drawing/2014/main" id="{25933A34-BB0E-E6A5-E259-E9334C526E86}"/>
+              </a:ext>
+            </a:extLst>
+          </p:cNvPr>
+          <p:cNvCxnSpPr>
+            <a:cxnSpLocks/>
+          </p:cNvCxnSpPr>
+          <p:nvPr/>
+        </p:nvCxnSpPr>
+        <p:spPr>
+          <a:xfrm flipV="1">
+            <a:off x="3313338" y="2030506"/>
+            <a:ext cx="350651" cy="3231259"/>
+          </a:xfrm>
+          <a:prstGeom prst="straightConnector1">
+            <a:avLst/>
+          </a:prstGeom>
+          <a:ln>
+            <a:solidFill>
+              <a:srgbClr val="FFC000"/>
+            </a:solidFill>
+            <a:headEnd type="oval"/>
+            <a:tailEnd type="triangle"/>
+          </a:ln>
+        </p:spPr>
+        <p:style>
+          <a:lnRef idx="1">
+            <a:schemeClr val="accent1"/>
+          </a:lnRef>
+          <a:fillRef idx="0">
+            <a:schemeClr val="accent1"/>
+          </a:fillRef>
+          <a:effectRef idx="0">
+            <a:schemeClr val="accent1"/>
+          </a:effectRef>
+          <a:fontRef idx="minor">
+            <a:schemeClr val="tx1"/>
+          </a:fontRef>
+        </p:style>
+      </p:cxnSp>
+      <p:cxnSp>
+        <p:nvCxnSpPr>
+          <p:cNvPr id="14" name="Straight Arrow Connector 13">
+            <a:extLst>
+              <a:ext uri="{FF2B5EF4-FFF2-40B4-BE49-F238E27FC236}">
+                <a16:creationId xmlns:a16="http://schemas.microsoft.com/office/drawing/2014/main" id="{CED5A831-EE9B-75C7-42B4-B487C6E33121}"/>
+              </a:ext>
+            </a:extLst>
+          </p:cNvPr>
+          <p:cNvCxnSpPr>
+            <a:cxnSpLocks/>
+          </p:cNvCxnSpPr>
+          <p:nvPr/>
+        </p:nvCxnSpPr>
+        <p:spPr>
+          <a:xfrm flipH="1" flipV="1">
+            <a:off x="2109785" y="1976718"/>
+            <a:ext cx="892334" cy="3285047"/>
+          </a:xfrm>
+          <a:prstGeom prst="straightConnector1">
+            <a:avLst/>
+          </a:prstGeom>
+          <a:ln>
+            <a:solidFill>
+              <a:srgbClr val="FFC000"/>
+            </a:solidFill>
+            <a:headEnd type="oval"/>
+            <a:tailEnd type="triangle"/>
+          </a:ln>
+        </p:spPr>
+        <p:style>
+          <a:lnRef idx="1">
+            <a:schemeClr val="accent1"/>
+          </a:lnRef>
+          <a:fillRef idx="0">
+            <a:schemeClr val="accent1"/>
+          </a:fillRef>
+          <a:effectRef idx="0">
+            <a:schemeClr val="accent1"/>
+          </a:effectRef>
+          <a:fontRef idx="minor">
+            <a:schemeClr val="tx1"/>
+          </a:fontRef>
+        </p:style>
+      </p:cxnSp>
+      <p:cxnSp>
+        <p:nvCxnSpPr>
+          <p:cNvPr id="16" name="Straight Arrow Connector 15">
+            <a:extLst>
+              <a:ext uri="{FF2B5EF4-FFF2-40B4-BE49-F238E27FC236}">
+                <a16:creationId xmlns:a16="http://schemas.microsoft.com/office/drawing/2014/main" id="{737FA3BA-54D6-0627-864D-05C485E8FC01}"/>
+              </a:ext>
+            </a:extLst>
+          </p:cNvPr>
+          <p:cNvCxnSpPr>
+            <a:cxnSpLocks/>
+            <a:stCxn id="9" idx="3"/>
+          </p:cNvCxnSpPr>
+          <p:nvPr/>
+        </p:nvCxnSpPr>
+        <p:spPr>
+          <a:xfrm flipH="1" flipV="1">
+            <a:off x="783011" y="2030506"/>
+            <a:ext cx="1871398" cy="3231259"/>
+          </a:xfrm>
+          <a:prstGeom prst="straightConnector1">
+            <a:avLst/>
+          </a:prstGeom>
+          <a:ln>
+            <a:solidFill>
+              <a:srgbClr val="FFC000"/>
+            </a:solidFill>
+            <a:headEnd type="oval"/>
+            <a:tailEnd type="triangle"/>
+          </a:ln>
+        </p:spPr>
+        <p:style>
+          <a:lnRef idx="1">
+            <a:schemeClr val="accent1"/>
+          </a:lnRef>
+          <a:fillRef idx="0">
+            <a:schemeClr val="accent1"/>
+          </a:fillRef>
+          <a:effectRef idx="0">
+            <a:schemeClr val="accent1"/>
+          </a:effectRef>
+          <a:fontRef idx="minor">
+            <a:schemeClr val="tx1"/>
+          </a:fontRef>
+        </p:style>
+      </p:cxnSp>
+      <p:cxnSp>
+        <p:nvCxnSpPr>
+          <p:cNvPr id="19" name="Straight Arrow Connector 18">
+            <a:extLst>
+              <a:ext uri="{FF2B5EF4-FFF2-40B4-BE49-F238E27FC236}">
+                <a16:creationId xmlns:a16="http://schemas.microsoft.com/office/drawing/2014/main" id="{B1E90693-0EE2-06AD-0F40-D61A96ACDA35}"/>
+              </a:ext>
+            </a:extLst>
+          </p:cNvPr>
+          <p:cNvCxnSpPr>
+            <a:cxnSpLocks/>
+          </p:cNvCxnSpPr>
+          <p:nvPr/>
+        </p:nvCxnSpPr>
+        <p:spPr>
+          <a:xfrm flipH="1">
+            <a:off x="6881468" y="5850335"/>
+            <a:ext cx="1830604" cy="0"/>
+          </a:xfrm>
+          <a:prstGeom prst="straightConnector1">
+            <a:avLst/>
+          </a:prstGeom>
+          <a:ln>
+            <a:solidFill>
+              <a:srgbClr val="FFC000"/>
+            </a:solidFill>
+            <a:headEnd type="none"/>
+            <a:tailEnd type="none"/>
+          </a:ln>
+        </p:spPr>
+        <p:style>
+          <a:lnRef idx="1">
+            <a:schemeClr val="accent1"/>
+          </a:lnRef>
+          <a:fillRef idx="0">
+            <a:schemeClr val="accent1"/>
+          </a:fillRef>
+          <a:effectRef idx="0">
+            <a:schemeClr val="accent1"/>
+          </a:effectRef>
+          <a:fontRef idx="minor">
+            <a:schemeClr val="tx1"/>
+          </a:fontRef>
+        </p:style>
+      </p:cxnSp>
+      <p:pic>
+        <p:nvPicPr>
+          <p:cNvPr id="25" name="Picture 24">
+            <a:extLst>
+              <a:ext uri="{FF2B5EF4-FFF2-40B4-BE49-F238E27FC236}">
+                <a16:creationId xmlns:a16="http://schemas.microsoft.com/office/drawing/2014/main" id="{86614724-FC52-6E1E-C523-9F1D6AF917B5}"/>
+              </a:ext>
+            </a:extLst>
+          </p:cNvPr>
+          <p:cNvPicPr>
+            <a:picLocks noChangeAspect="1"/>
+          </p:cNvPicPr>
+          <p:nvPr/>
+        </p:nvPicPr>
+        <p:blipFill>
+          <a:blip r:embed="rId5"/>
+          <a:stretch>
+            <a:fillRect/>
+          </a:stretch>
+        </p:blipFill>
+        <p:spPr>
+          <a:xfrm>
+            <a:off x="6166005" y="283990"/>
+            <a:ext cx="5403067" cy="460456"/>
+          </a:xfrm>
+          <a:prstGeom prst="rect">
+            <a:avLst/>
+          </a:prstGeom>
+        </p:spPr>
+      </p:pic>
+      <p:sp>
+        <p:nvSpPr>
+          <p:cNvPr id="26" name="TextBox 25">
+            <a:extLst>
+              <a:ext uri="{FF2B5EF4-FFF2-40B4-BE49-F238E27FC236}">
+                <a16:creationId xmlns:a16="http://schemas.microsoft.com/office/drawing/2014/main" id="{B12D7050-15B1-4C64-B054-5B55CEA69121}"/>
+              </a:ext>
+            </a:extLst>
+          </p:cNvPr>
+          <p:cNvSpPr txBox="1"/>
+          <p:nvPr/>
+        </p:nvSpPr>
+        <p:spPr>
+          <a:xfrm>
+            <a:off x="6127808" y="268"/>
+            <a:ext cx="5441263" cy="276999"/>
+          </a:xfrm>
+          <a:prstGeom prst="rect">
+            <a:avLst/>
+          </a:prstGeom>
+          <a:noFill/>
+        </p:spPr>
+        <p:txBody>
+          <a:bodyPr wrap="square" rtlCol="0">
+            <a:spAutoFit/>
+          </a:bodyPr>
+          <a:lstStyle/>
+          <a:p>
+            <a:r>
+              <a:rPr lang="en-US" sz="1200" dirty="0"/>
+              <a:t>Is it possible somehow to pass in a list of AshPhoenix.Forms as “entries” instead? </a:t>
+            </a:r>
+          </a:p>
+        </p:txBody>
+      </p:sp>
+      <p:sp>
+        <p:nvSpPr>
+          <p:cNvPr id="2" name="TextBox 1">
+            <a:extLst>
+              <a:ext uri="{FF2B5EF4-FFF2-40B4-BE49-F238E27FC236}">
+                <a16:creationId xmlns:a16="http://schemas.microsoft.com/office/drawing/2014/main" id="{7A15721E-AEEE-5539-3DAC-7BB3DB33EB5D}"/>
+              </a:ext>
+            </a:extLst>
+          </p:cNvPr>
+          <p:cNvSpPr txBox="1"/>
+          <p:nvPr/>
+        </p:nvSpPr>
+        <p:spPr>
+          <a:xfrm>
+            <a:off x="225861" y="164354"/>
+            <a:ext cx="3845859" cy="369332"/>
+          </a:xfrm>
+          <a:prstGeom prst="rect">
+            <a:avLst/>
+          </a:prstGeom>
+          <a:noFill/>
+        </p:spPr>
+        <p:txBody>
+          <a:bodyPr wrap="square" rtlCol="0">
+            <a:spAutoFit/>
+          </a:bodyPr>
+          <a:lstStyle/>
+          <a:p>
+            <a:r>
+              <a:rPr lang="en-US" dirty="0"/>
+              <a:t>Reusable, Editable List Component</a:t>
+            </a:r>
+          </a:p>
+        </p:txBody>
+      </p:sp>
+      <p:cxnSp>
+        <p:nvCxnSpPr>
+          <p:cNvPr id="22" name="Straight Arrow Connector 21">
+            <a:extLst>
+              <a:ext uri="{FF2B5EF4-FFF2-40B4-BE49-F238E27FC236}">
+                <a16:creationId xmlns:a16="http://schemas.microsoft.com/office/drawing/2014/main" id="{27A04991-C5E1-2C90-6B68-7E4C2B5F5578}"/>
+              </a:ext>
+            </a:extLst>
+          </p:cNvPr>
+          <p:cNvCxnSpPr>
+            <a:cxnSpLocks/>
+          </p:cNvCxnSpPr>
+          <p:nvPr/>
+        </p:nvCxnSpPr>
+        <p:spPr>
+          <a:xfrm flipH="1">
+            <a:off x="688718" y="5518641"/>
+            <a:ext cx="939391" cy="0"/>
+          </a:xfrm>
+          <a:prstGeom prst="straightConnector1">
+            <a:avLst/>
+          </a:prstGeom>
+          <a:ln>
+            <a:solidFill>
+              <a:srgbClr val="FFC000"/>
+            </a:solidFill>
+            <a:headEnd type="none"/>
+            <a:tailEnd type="none"/>
+          </a:ln>
+        </p:spPr>
+        <p:style>
+          <a:lnRef idx="1">
+            <a:schemeClr val="accent1"/>
+          </a:lnRef>
+          <a:fillRef idx="0">
+            <a:schemeClr val="accent1"/>
+          </a:fillRef>
+          <a:effectRef idx="0">
+            <a:schemeClr val="accent1"/>
+          </a:effectRef>
+          <a:fontRef idx="minor">
+            <a:schemeClr val="tx1"/>
+          </a:fontRef>
+        </p:style>
+      </p:cxnSp>
+      <p:sp>
+        <p:nvSpPr>
+          <p:cNvPr id="28" name="Rounded Rectangle 27">
+            <a:extLst>
+              <a:ext uri="{FF2B5EF4-FFF2-40B4-BE49-F238E27FC236}">
+                <a16:creationId xmlns:a16="http://schemas.microsoft.com/office/drawing/2014/main" id="{3A4C3744-B7C5-2F0B-BDE7-668A937E6343}"/>
+              </a:ext>
+            </a:extLst>
+          </p:cNvPr>
+          <p:cNvSpPr/>
+          <p:nvPr/>
+        </p:nvSpPr>
+        <p:spPr>
+          <a:xfrm>
+            <a:off x="372031" y="5252498"/>
+            <a:ext cx="847164" cy="158347"/>
+          </a:xfrm>
+          <a:prstGeom prst="roundRect">
+            <a:avLst/>
+          </a:prstGeom>
+          <a:noFill/>
+          <a:ln w="19050">
+            <a:solidFill>
+              <a:srgbClr val="C00000"/>
+            </a:solidFill>
+            <a:prstDash val="sysDot"/>
+          </a:ln>
+        </p:spPr>
+        <p:style>
+          <a:lnRef idx="2">
+            <a:schemeClr val="accent1">
+              <a:shade val="50000"/>
+            </a:schemeClr>
+          </a:lnRef>
+          <a:fillRef idx="1">
+            <a:schemeClr val="accent1"/>
+          </a:fillRef>
+          <a:effectRef idx="0">
+            <a:schemeClr val="accent1"/>
+          </a:effectRef>
+          <a:fontRef idx="minor">
+            <a:schemeClr val="lt1"/>
+          </a:fontRef>
+        </p:style>
+        <p:txBody>
+          <a:bodyPr rtlCol="0" anchor="ctr"/>
+          <a:lstStyle/>
+          <a:p>
+            <a:pPr algn="ctr"/>
+            <a:endParaRPr lang="en-US"/>
+          </a:p>
+        </p:txBody>
+      </p:sp>
+      <p:sp>
+        <p:nvSpPr>
+          <p:cNvPr id="29" name="Rounded Rectangle 28">
+            <a:extLst>
+              <a:ext uri="{FF2B5EF4-FFF2-40B4-BE49-F238E27FC236}">
+                <a16:creationId xmlns:a16="http://schemas.microsoft.com/office/drawing/2014/main" id="{93407138-174F-D784-3AC4-3B870CEAD31B}"/>
+              </a:ext>
+            </a:extLst>
+          </p:cNvPr>
+          <p:cNvSpPr/>
+          <p:nvPr/>
+        </p:nvSpPr>
+        <p:spPr>
+          <a:xfrm>
+            <a:off x="6065300" y="4024365"/>
+            <a:ext cx="847164" cy="158347"/>
+          </a:xfrm>
+          <a:prstGeom prst="roundRect">
+            <a:avLst/>
+          </a:prstGeom>
+          <a:noFill/>
+          <a:ln w="19050">
+            <a:solidFill>
+              <a:srgbClr val="C00000"/>
+            </a:solidFill>
+            <a:prstDash val="sysDot"/>
+          </a:ln>
+        </p:spPr>
+        <p:style>
+          <a:lnRef idx="2">
+            <a:schemeClr val="accent1">
+              <a:shade val="50000"/>
+            </a:schemeClr>
+          </a:lnRef>
+          <a:fillRef idx="1">
+            <a:schemeClr val="accent1"/>
+          </a:fillRef>
+          <a:effectRef idx="0">
+            <a:schemeClr val="accent1"/>
+          </a:effectRef>
+          <a:fontRef idx="minor">
+            <a:schemeClr val="lt1"/>
+          </a:fontRef>
+        </p:style>
+        <p:txBody>
+          <a:bodyPr rtlCol="0" anchor="ctr"/>
+          <a:lstStyle/>
+          <a:p>
+            <a:pPr algn="ctr"/>
+            <a:endParaRPr lang="en-US"/>
+          </a:p>
+        </p:txBody>
+      </p:sp>
+      <p:cxnSp>
+        <p:nvCxnSpPr>
+          <p:cNvPr id="30" name="Straight Arrow Connector 29">
+            <a:extLst>
+              <a:ext uri="{FF2B5EF4-FFF2-40B4-BE49-F238E27FC236}">
+                <a16:creationId xmlns:a16="http://schemas.microsoft.com/office/drawing/2014/main" id="{0B03E705-B48E-7ED8-7159-DAA575F79867}"/>
+              </a:ext>
+            </a:extLst>
+          </p:cNvPr>
+          <p:cNvCxnSpPr>
+            <a:cxnSpLocks/>
+            <a:endCxn id="29" idx="1"/>
+          </p:cNvCxnSpPr>
+          <p:nvPr/>
+        </p:nvCxnSpPr>
+        <p:spPr>
+          <a:xfrm flipV="1">
+            <a:off x="4809346" y="4103539"/>
+            <a:ext cx="1255954" cy="1167184"/>
+          </a:xfrm>
+          <a:prstGeom prst="straightConnector1">
+            <a:avLst/>
+          </a:prstGeom>
+          <a:ln>
+            <a:solidFill>
+              <a:srgbClr val="C00000"/>
+            </a:solidFill>
+            <a:headEnd type="oval"/>
+            <a:tailEnd type="triangle"/>
+          </a:ln>
+        </p:spPr>
+        <p:style>
+          <a:lnRef idx="1">
+            <a:schemeClr val="accent1"/>
+          </a:lnRef>
+          <a:fillRef idx="0">
+            <a:schemeClr val="accent1"/>
+          </a:fillRef>
+          <a:effectRef idx="0">
+            <a:schemeClr val="accent1"/>
+          </a:effectRef>
+          <a:fontRef idx="minor">
+            <a:schemeClr val="tx1"/>
+          </a:fontRef>
+        </p:style>
+      </p:cxnSp>
+      <p:sp>
+        <p:nvSpPr>
+          <p:cNvPr id="33" name="Rounded Rectangle 32">
+            <a:extLst>
+              <a:ext uri="{FF2B5EF4-FFF2-40B4-BE49-F238E27FC236}">
+                <a16:creationId xmlns:a16="http://schemas.microsoft.com/office/drawing/2014/main" id="{43E8D405-6925-79CD-59C7-6B7FC96E7EB0}"/>
+              </a:ext>
+            </a:extLst>
+          </p:cNvPr>
+          <p:cNvSpPr/>
+          <p:nvPr/>
+        </p:nvSpPr>
+        <p:spPr>
+          <a:xfrm>
+            <a:off x="6001024" y="37543"/>
+            <a:ext cx="5694829" cy="934571"/>
+          </a:xfrm>
+          <a:prstGeom prst="roundRect">
+            <a:avLst/>
+          </a:prstGeom>
+          <a:solidFill>
+            <a:schemeClr val="accent1">
+              <a:alpha val="10874"/>
+            </a:schemeClr>
+          </a:solidFill>
+        </p:spPr>
+        <p:style>
+          <a:lnRef idx="2">
+            <a:schemeClr val="accent1">
+              <a:shade val="50000"/>
+            </a:schemeClr>
+          </a:lnRef>
+          <a:fillRef idx="1">
+            <a:schemeClr val="accent1"/>
+          </a:fillRef>
+          <a:effectRef idx="0">
+            <a:schemeClr val="accent1"/>
+          </a:effectRef>
+          <a:fontRef idx="minor">
+            <a:schemeClr val="lt1"/>
+          </a:fontRef>
+        </p:style>
+        <p:txBody>
+          <a:bodyPr rtlCol="0" anchor="ctr"/>
+          <a:lstStyle/>
+          <a:p>
+            <a:pPr algn="ctr"/>
+            <a:endParaRPr lang="en-US"/>
+          </a:p>
+        </p:txBody>
+      </p:sp>
+      <p:sp>
+        <p:nvSpPr>
+          <p:cNvPr id="34" name="TextBox 33">
+            <a:extLst>
+              <a:ext uri="{FF2B5EF4-FFF2-40B4-BE49-F238E27FC236}">
+                <a16:creationId xmlns:a16="http://schemas.microsoft.com/office/drawing/2014/main" id="{8DB449C1-91D3-D82C-7ABE-1769CD5550FD}"/>
+              </a:ext>
+            </a:extLst>
+          </p:cNvPr>
+          <p:cNvSpPr txBox="1"/>
+          <p:nvPr/>
+        </p:nvSpPr>
+        <p:spPr>
+          <a:xfrm>
+            <a:off x="11721353" y="221226"/>
+            <a:ext cx="470647" cy="523220"/>
+          </a:xfrm>
+          <a:prstGeom prst="rect">
+            <a:avLst/>
+          </a:prstGeom>
+          <a:noFill/>
+        </p:spPr>
+        <p:txBody>
+          <a:bodyPr wrap="square" rtlCol="0">
+            <a:spAutoFit/>
+          </a:bodyPr>
+          <a:lstStyle/>
+          <a:p>
+            <a:r>
+              <a:rPr lang="en-US" sz="2800" dirty="0"/>
+              <a:t>?</a:t>
+            </a:r>
+            <a:endParaRPr lang="en-US" dirty="0"/>
+          </a:p>
+        </p:txBody>
+      </p:sp>
+      <p:sp>
+        <p:nvSpPr>
+          <p:cNvPr id="35" name="TextBox 34">
+            <a:extLst>
+              <a:ext uri="{FF2B5EF4-FFF2-40B4-BE49-F238E27FC236}">
+                <a16:creationId xmlns:a16="http://schemas.microsoft.com/office/drawing/2014/main" id="{878EC32A-169B-928C-82AA-B6FCCA7485F1}"/>
+              </a:ext>
+            </a:extLst>
+          </p:cNvPr>
+          <p:cNvSpPr txBox="1"/>
+          <p:nvPr/>
+        </p:nvSpPr>
+        <p:spPr>
+          <a:xfrm>
+            <a:off x="6172810" y="731564"/>
+            <a:ext cx="5441263" cy="276999"/>
+          </a:xfrm>
+          <a:prstGeom prst="rect">
+            <a:avLst/>
+          </a:prstGeom>
+          <a:noFill/>
+        </p:spPr>
+        <p:txBody>
+          <a:bodyPr wrap="square" rtlCol="0">
+            <a:spAutoFit/>
+          </a:bodyPr>
+          <a:lstStyle/>
+          <a:p>
+            <a:r>
+              <a:rPr lang="en-US" sz="1200" dirty="0"/>
+              <a:t>I can’t seem to figure it out, if possible.</a:t>
+            </a:r>
+          </a:p>
+        </p:txBody>
+      </p:sp>
+    </p:spTree>
+    <p:extLst>
+      <p:ext uri="{BB962C8B-B14F-4D97-AF65-F5344CB8AC3E}">
+        <p14:creationId xmlns:p14="http://schemas.microsoft.com/office/powerpoint/2010/main" val="3468893335"/>
       </p:ext>
     </p:extLst>
   </p:cSld>

</xml_diff>